<commit_message>
Updated the presentation and mock-ups.
</commit_message>
<xml_diff>
--- a/Presentation.pptx
+++ b/Presentation.pptx
@@ -2,12 +2,14 @@
 <file path=ppt/presentation.xml><?xml version="1.0" encoding="utf-8"?>
 <p:presentation xmlns:a="http://schemas.openxmlformats.org/drawingml/2006/main" xmlns:r="http://schemas.openxmlformats.org/officeDocument/2006/relationships" xmlns:p="http://schemas.openxmlformats.org/presentationml/2006/main" saveSubsetFonts="1" autoCompressPictures="0">
   <p:sldMasterIdLst>
-    <p:sldMasterId id="2147483738" r:id="rId1"/>
+    <p:sldMasterId id="2147483739" r:id="rId1"/>
   </p:sldMasterIdLst>
   <p:sldIdLst>
     <p:sldId id="256" r:id="rId2"/>
     <p:sldId id="257" r:id="rId3"/>
     <p:sldId id="258" r:id="rId4"/>
+    <p:sldId id="259" r:id="rId5"/>
+    <p:sldId id="260" r:id="rId6"/>
   </p:sldIdLst>
   <p:sldSz cx="12192000" cy="6858000"/>
   <p:notesSz cx="6858000" cy="9144000"/>
@@ -111,7 +113,7 @@
 
 <file path=ppt/slideLayouts/slideLayout1.xml><?xml version="1.0" encoding="utf-8"?>
 <p:sldLayout xmlns:a="http://schemas.openxmlformats.org/drawingml/2006/main" xmlns:r="http://schemas.openxmlformats.org/officeDocument/2006/relationships" xmlns:p="http://schemas.openxmlformats.org/presentationml/2006/main" type="title" preserve="1">
-  <p:cSld name="Title Slide">
+  <p:cSld name="Diapositivo de Título">
     <p:spTree>
       <p:nvGrpSpPr>
         <p:cNvPr id="1" name=""/>
@@ -128,10 +130,10 @@
       </p:grpSpPr>
       <p:sp>
         <p:nvSpPr>
-          <p:cNvPr id="2" name="Title 1">
-            <a:extLst>
-              <a:ext uri="{FF2B5EF4-FFF2-40B4-BE49-F238E27FC236}">
-                <a16:creationId xmlns:a16="http://schemas.microsoft.com/office/drawing/2014/main" id="{6ADF9204-3F29-4C3A-BA41-3063400202C4}"/>
+          <p:cNvPr id="2" name="Título 1">
+            <a:extLst>
+              <a:ext uri="{FF2B5EF4-FFF2-40B4-BE49-F238E27FC236}">
+                <a16:creationId xmlns:a16="http://schemas.microsoft.com/office/drawing/2014/main" id="{C92A8843-9270-BD41-8690-98DDC5FE1B56}"/>
               </a:ext>
             </a:extLst>
           </p:cNvPr>
@@ -152,23 +154,23 @@
           <a:bodyPr anchor="b"/>
           <a:lstStyle>
             <a:lvl1pPr algn="ctr">
-              <a:defRPr sz="4400"/>
+              <a:defRPr sz="6000"/>
             </a:lvl1pPr>
           </a:lstStyle>
           <a:p>
             <a:r>
-              <a:rPr lang="en-US" dirty="0"/>
-              <a:t>Click to edit Master title style</a:t>
-            </a:r>
-          </a:p>
-        </p:txBody>
-      </p:sp>
-      <p:sp>
-        <p:nvSpPr>
-          <p:cNvPr id="3" name="Subtitle 2">
-            <a:extLst>
-              <a:ext uri="{FF2B5EF4-FFF2-40B4-BE49-F238E27FC236}">
-                <a16:creationId xmlns:a16="http://schemas.microsoft.com/office/drawing/2014/main" id="{203393CD-7262-4AC7-80E6-52FE6F3F39BA}"/>
+              <a:rPr lang="pt-PT"/>
+              <a:t>Clique para editar o estilo de título do Modelo Global</a:t>
+            </a:r>
+          </a:p>
+        </p:txBody>
+      </p:sp>
+      <p:sp>
+        <p:nvSpPr>
+          <p:cNvPr id="3" name="Subtítulo 2">
+            <a:extLst>
+              <a:ext uri="{FF2B5EF4-FFF2-40B4-BE49-F238E27FC236}">
+                <a16:creationId xmlns:a16="http://schemas.microsoft.com/office/drawing/2014/main" id="{4310F53E-9475-0B47-A56D-070FB2A0BF2D}"/>
               </a:ext>
             </a:extLst>
           </p:cNvPr>
@@ -190,9 +192,7 @@
           <a:lstStyle>
             <a:lvl1pPr marL="0" indent="0" algn="ctr">
               <a:buNone/>
-              <a:defRPr sz="2000">
-                <a:latin typeface="+mn-lt"/>
-              </a:defRPr>
+              <a:defRPr sz="2400"/>
             </a:lvl1pPr>
             <a:lvl2pPr marL="457200" indent="0" algn="ctr">
               <a:buNone/>
@@ -229,18 +229,18 @@
           </a:lstStyle>
           <a:p>
             <a:r>
-              <a:rPr lang="en-US" dirty="0"/>
-              <a:t>Click to edit Master subtitle style</a:t>
-            </a:r>
-          </a:p>
-        </p:txBody>
-      </p:sp>
-      <p:sp>
-        <p:nvSpPr>
-          <p:cNvPr id="4" name="Date Placeholder 3">
-            <a:extLst>
-              <a:ext uri="{FF2B5EF4-FFF2-40B4-BE49-F238E27FC236}">
-                <a16:creationId xmlns:a16="http://schemas.microsoft.com/office/drawing/2014/main" id="{D7D430AE-0210-4E82-AD7B-41B112DE7F7D}"/>
+              <a:rPr lang="pt-PT"/>
+              <a:t>Clique para editar o estilo de subtítulo do Modelo Global</a:t>
+            </a:r>
+          </a:p>
+        </p:txBody>
+      </p:sp>
+      <p:sp>
+        <p:nvSpPr>
+          <p:cNvPr id="4" name="Marcador de Posição da Data 3">
+            <a:extLst>
+              <a:ext uri="{FF2B5EF4-FFF2-40B4-BE49-F238E27FC236}">
+                <a16:creationId xmlns:a16="http://schemas.microsoft.com/office/drawing/2014/main" id="{F27BD9A5-1070-4247-9BD4-373C85691E06}"/>
               </a:ext>
             </a:extLst>
           </p:cNvPr>
@@ -254,29 +254,23 @@
         <p:spPr/>
         <p:txBody>
           <a:bodyPr/>
-          <a:lstStyle>
-            <a:lvl1pPr>
-              <a:defRPr>
-                <a:latin typeface="+mn-lt"/>
-              </a:defRPr>
-            </a:lvl1pPr>
-          </a:lstStyle>
-          <a:p>
-            <a:fld id="{11A6662E-FAF4-44BC-88B5-85A7CBFB6D30}" type="datetime1">
+          <a:lstStyle/>
+          <a:p>
+            <a:fld id="{57E0CF6C-748E-4B7A-BC8B-3011EF78ED13}" type="datetime1">
               <a:rPr lang="en-US" smtClean="0"/>
               <a:pPr/>
               <a:t>2/5/21</a:t>
             </a:fld>
-            <a:endParaRPr lang="en-US"/>
-          </a:p>
-        </p:txBody>
-      </p:sp>
-      <p:sp>
-        <p:nvSpPr>
-          <p:cNvPr id="5" name="Footer Placeholder 4">
-            <a:extLst>
-              <a:ext uri="{FF2B5EF4-FFF2-40B4-BE49-F238E27FC236}">
-                <a16:creationId xmlns:a16="http://schemas.microsoft.com/office/drawing/2014/main" id="{0F221974-7DEC-459D-9642-CB5B59C82771}"/>
+            <a:endParaRPr lang="en-US" dirty="0"/>
+          </a:p>
+        </p:txBody>
+      </p:sp>
+      <p:sp>
+        <p:nvSpPr>
+          <p:cNvPr id="5" name="Marcador de Posição do Rodapé 4">
+            <a:extLst>
+              <a:ext uri="{FF2B5EF4-FFF2-40B4-BE49-F238E27FC236}">
+                <a16:creationId xmlns:a16="http://schemas.microsoft.com/office/drawing/2014/main" id="{248AEA9C-B509-BE42-8062-73C9C4126D61}"/>
               </a:ext>
             </a:extLst>
           </p:cNvPr>
@@ -290,24 +284,18 @@
         <p:spPr/>
         <p:txBody>
           <a:bodyPr/>
-          <a:lstStyle>
-            <a:lvl1pPr>
-              <a:defRPr>
-                <a:latin typeface="+mn-lt"/>
-              </a:defRPr>
-            </a:lvl1pPr>
-          </a:lstStyle>
-          <a:p>
-            <a:endParaRPr lang="en-US"/>
-          </a:p>
-        </p:txBody>
-      </p:sp>
-      <p:sp>
-        <p:nvSpPr>
-          <p:cNvPr id="6" name="Slide Number Placeholder 5">
-            <a:extLst>
-              <a:ext uri="{FF2B5EF4-FFF2-40B4-BE49-F238E27FC236}">
-                <a16:creationId xmlns:a16="http://schemas.microsoft.com/office/drawing/2014/main" id="{60731837-C94E-4B5B-BCF0-110C69EDB41C}"/>
+          <a:lstStyle/>
+          <a:p>
+            <a:endParaRPr lang="en-US" dirty="0"/>
+          </a:p>
+        </p:txBody>
+      </p:sp>
+      <p:sp>
+        <p:nvSpPr>
+          <p:cNvPr id="6" name="Marcador de Posição do Número do Diapositivo 5">
+            <a:extLst>
+              <a:ext uri="{FF2B5EF4-FFF2-40B4-BE49-F238E27FC236}">
+                <a16:creationId xmlns:a16="http://schemas.microsoft.com/office/drawing/2014/main" id="{AB0DC1EC-9491-7A42-AB53-1828F2966ED7}"/>
               </a:ext>
             </a:extLst>
           </p:cNvPr>
@@ -321,39 +309,34 @@
         <p:spPr/>
         <p:txBody>
           <a:bodyPr/>
-          <a:lstStyle>
-            <a:lvl1pPr>
-              <a:defRPr>
-                <a:latin typeface="+mn-lt"/>
-              </a:defRPr>
-            </a:lvl1pPr>
-          </a:lstStyle>
+          <a:lstStyle/>
           <a:p>
             <a:fld id="{73B850FF-6169-4056-8077-06FFA93A5366}" type="slidenum">
               <a:rPr lang="en-US" smtClean="0"/>
               <a:pPr/>
               <a:t>‹nº›</a:t>
             </a:fld>
-            <a:endParaRPr lang="en-US"/>
+            <a:endParaRPr lang="en-US" dirty="0"/>
           </a:p>
         </p:txBody>
       </p:sp>
     </p:spTree>
     <p:extLst>
       <p:ext uri="{BB962C8B-B14F-4D97-AF65-F5344CB8AC3E}">
-        <p14:creationId xmlns:p14="http://schemas.microsoft.com/office/powerpoint/2010/main" val="3970860187"/>
+        <p14:creationId xmlns:p14="http://schemas.microsoft.com/office/powerpoint/2010/main" val="1358226418"/>
       </p:ext>
     </p:extLst>
   </p:cSld>
   <p:clrMapOvr>
     <a:masterClrMapping/>
   </p:clrMapOvr>
+  <p:hf sldNum="0" hdr="0" ftr="0" dt="0"/>
 </p:sldLayout>
 </file>
 
 <file path=ppt/slideLayouts/slideLayout10.xml><?xml version="1.0" encoding="utf-8"?>
 <p:sldLayout xmlns:a="http://schemas.openxmlformats.org/drawingml/2006/main" xmlns:r="http://schemas.openxmlformats.org/officeDocument/2006/relationships" xmlns:p="http://schemas.openxmlformats.org/presentationml/2006/main" type="vertTx" preserve="1">
-  <p:cSld name="Title and Vertical Text">
+  <p:cSld name="Título e Texto Vertical">
     <p:spTree>
       <p:nvGrpSpPr>
         <p:cNvPr id="1" name=""/>
@@ -370,10 +353,10 @@
       </p:grpSpPr>
       <p:sp>
         <p:nvSpPr>
-          <p:cNvPr id="2" name="Title 1">
-            <a:extLst>
-              <a:ext uri="{FF2B5EF4-FFF2-40B4-BE49-F238E27FC236}">
-                <a16:creationId xmlns:a16="http://schemas.microsoft.com/office/drawing/2014/main" id="{077ABDD2-E186-4F25-8FDE-D1E875E9C303}"/>
+          <p:cNvPr id="2" name="Título 1">
+            <a:extLst>
+              <a:ext uri="{FF2B5EF4-FFF2-40B4-BE49-F238E27FC236}">
+                <a16:creationId xmlns:a16="http://schemas.microsoft.com/office/drawing/2014/main" id="{718D6036-E093-4F44-AD85-D48E7935A17B}"/>
               </a:ext>
             </a:extLst>
           </p:cNvPr>
@@ -390,18 +373,18 @@
           <a:lstStyle/>
           <a:p>
             <a:r>
-              <a:rPr lang="en-US"/>
-              <a:t>Click to edit Master title style</a:t>
-            </a:r>
-          </a:p>
-        </p:txBody>
-      </p:sp>
-      <p:sp>
-        <p:nvSpPr>
-          <p:cNvPr id="3" name="Vertical Text Placeholder 2">
-            <a:extLst>
-              <a:ext uri="{FF2B5EF4-FFF2-40B4-BE49-F238E27FC236}">
-                <a16:creationId xmlns:a16="http://schemas.microsoft.com/office/drawing/2014/main" id="{8318CC5B-A7E0-48B1-8329-6533AC76E7B7}"/>
+              <a:rPr lang="pt-PT"/>
+              <a:t>Clique para editar o estilo de título do Modelo Global</a:t>
+            </a:r>
+          </a:p>
+        </p:txBody>
+      </p:sp>
+      <p:sp>
+        <p:nvSpPr>
+          <p:cNvPr id="3" name="Marcador de Posição de Texto Vertical 2">
+            <a:extLst>
+              <a:ext uri="{FF2B5EF4-FFF2-40B4-BE49-F238E27FC236}">
+                <a16:creationId xmlns:a16="http://schemas.microsoft.com/office/drawing/2014/main" id="{004BBE0C-F63D-D140-82DB-67A47C8717FC}"/>
               </a:ext>
             </a:extLst>
           </p:cNvPr>
@@ -419,46 +402,46 @@
           <a:p>
             <a:pPr lvl="0"/>
             <a:r>
-              <a:rPr lang="en-US"/>
-              <a:t>Click to edit Master text styles</a:t>
+              <a:rPr lang="pt-PT"/>
+              <a:t>Clique para editar os estilos do texto de Modelo Global</a:t>
             </a:r>
           </a:p>
           <a:p>
             <a:pPr lvl="1"/>
             <a:r>
-              <a:rPr lang="en-US"/>
-              <a:t>Second level</a:t>
+              <a:rPr lang="pt-PT"/>
+              <a:t>Segundo nível</a:t>
             </a:r>
           </a:p>
           <a:p>
             <a:pPr lvl="2"/>
             <a:r>
-              <a:rPr lang="en-US"/>
-              <a:t>Third level</a:t>
+              <a:rPr lang="pt-PT"/>
+              <a:t>Terceiro nível</a:t>
             </a:r>
           </a:p>
           <a:p>
             <a:pPr lvl="3"/>
             <a:r>
-              <a:rPr lang="en-US"/>
-              <a:t>Fourth level</a:t>
+              <a:rPr lang="pt-PT"/>
+              <a:t>Quarto nível</a:t>
             </a:r>
           </a:p>
           <a:p>
             <a:pPr lvl="4"/>
             <a:r>
-              <a:rPr lang="en-US"/>
-              <a:t>Fifth level</a:t>
-            </a:r>
-          </a:p>
-        </p:txBody>
-      </p:sp>
-      <p:sp>
-        <p:nvSpPr>
-          <p:cNvPr id="4" name="Date Placeholder 3">
-            <a:extLst>
-              <a:ext uri="{FF2B5EF4-FFF2-40B4-BE49-F238E27FC236}">
-                <a16:creationId xmlns:a16="http://schemas.microsoft.com/office/drawing/2014/main" id="{63905B1B-77FE-4BFC-BF87-87DA989F0082}"/>
+              <a:rPr lang="pt-PT"/>
+              <a:t>Quinto nível</a:t>
+            </a:r>
+          </a:p>
+        </p:txBody>
+      </p:sp>
+      <p:sp>
+        <p:nvSpPr>
+          <p:cNvPr id="4" name="Marcador de Posição da Data 3">
+            <a:extLst>
+              <a:ext uri="{FF2B5EF4-FFF2-40B4-BE49-F238E27FC236}">
+                <a16:creationId xmlns:a16="http://schemas.microsoft.com/office/drawing/2014/main" id="{7FACAD41-BC90-F94B-9C44-20641878D3DE}"/>
               </a:ext>
             </a:extLst>
           </p:cNvPr>
@@ -474,20 +457,21 @@
           <a:bodyPr/>
           <a:lstStyle/>
           <a:p>
-            <a:fld id="{4C559632-1575-4E14-B53B-3DC3D5ED3947}" type="datetime1">
+            <a:fld id="{57E0CF6C-748E-4B7A-BC8B-3011EF78ED13}" type="datetime1">
               <a:rPr lang="en-US" smtClean="0"/>
+              <a:pPr/>
               <a:t>2/5/21</a:t>
             </a:fld>
-            <a:endParaRPr lang="en-US"/>
-          </a:p>
-        </p:txBody>
-      </p:sp>
-      <p:sp>
-        <p:nvSpPr>
-          <p:cNvPr id="5" name="Footer Placeholder 4">
-            <a:extLst>
-              <a:ext uri="{FF2B5EF4-FFF2-40B4-BE49-F238E27FC236}">
-                <a16:creationId xmlns:a16="http://schemas.microsoft.com/office/drawing/2014/main" id="{3118531E-1B90-4631-BD37-4BB1DBFABF44}"/>
+            <a:endParaRPr lang="en-US" dirty="0"/>
+          </a:p>
+        </p:txBody>
+      </p:sp>
+      <p:sp>
+        <p:nvSpPr>
+          <p:cNvPr id="5" name="Marcador de Posição do Rodapé 4">
+            <a:extLst>
+              <a:ext uri="{FF2B5EF4-FFF2-40B4-BE49-F238E27FC236}">
+                <a16:creationId xmlns:a16="http://schemas.microsoft.com/office/drawing/2014/main" id="{4C931659-5E94-5646-A3FD-296E0C568B95}"/>
               </a:ext>
             </a:extLst>
           </p:cNvPr>
@@ -503,16 +487,16 @@
           <a:bodyPr/>
           <a:lstStyle/>
           <a:p>
-            <a:endParaRPr lang="en-US"/>
-          </a:p>
-        </p:txBody>
-      </p:sp>
-      <p:sp>
-        <p:nvSpPr>
-          <p:cNvPr id="6" name="Slide Number Placeholder 5">
-            <a:extLst>
-              <a:ext uri="{FF2B5EF4-FFF2-40B4-BE49-F238E27FC236}">
-                <a16:creationId xmlns:a16="http://schemas.microsoft.com/office/drawing/2014/main" id="{238A55E8-88DC-4280-8E04-FF50FF8EDB5A}"/>
+            <a:endParaRPr lang="en-US" dirty="0"/>
+          </a:p>
+        </p:txBody>
+      </p:sp>
+      <p:sp>
+        <p:nvSpPr>
+          <p:cNvPr id="6" name="Marcador de Posição do Número do Diapositivo 5">
+            <a:extLst>
+              <a:ext uri="{FF2B5EF4-FFF2-40B4-BE49-F238E27FC236}">
+                <a16:creationId xmlns:a16="http://schemas.microsoft.com/office/drawing/2014/main" id="{04092ED6-7921-814C-AD48-46F9E685AA64}"/>
               </a:ext>
             </a:extLst>
           </p:cNvPr>
@@ -530,28 +514,30 @@
           <a:p>
             <a:fld id="{73B850FF-6169-4056-8077-06FFA93A5366}" type="slidenum">
               <a:rPr lang="en-US" smtClean="0"/>
+              <a:pPr/>
               <a:t>‹nº›</a:t>
             </a:fld>
-            <a:endParaRPr lang="en-US"/>
+            <a:endParaRPr lang="en-US" dirty="0"/>
           </a:p>
         </p:txBody>
       </p:sp>
     </p:spTree>
     <p:extLst>
       <p:ext uri="{BB962C8B-B14F-4D97-AF65-F5344CB8AC3E}">
-        <p14:creationId xmlns:p14="http://schemas.microsoft.com/office/powerpoint/2010/main" val="3919189043"/>
+        <p14:creationId xmlns:p14="http://schemas.microsoft.com/office/powerpoint/2010/main" val="3577533317"/>
       </p:ext>
     </p:extLst>
   </p:cSld>
   <p:clrMapOvr>
     <a:masterClrMapping/>
   </p:clrMapOvr>
+  <p:hf sldNum="0" hdr="0" ftr="0" dt="0"/>
 </p:sldLayout>
 </file>
 
 <file path=ppt/slideLayouts/slideLayout11.xml><?xml version="1.0" encoding="utf-8"?>
 <p:sldLayout xmlns:a="http://schemas.openxmlformats.org/drawingml/2006/main" xmlns:r="http://schemas.openxmlformats.org/officeDocument/2006/relationships" xmlns:p="http://schemas.openxmlformats.org/presentationml/2006/main" type="vertTitleAndTx" preserve="1">
-  <p:cSld name="Vertical Title and Text">
+  <p:cSld name="Título Vertical e Texto">
     <p:spTree>
       <p:nvGrpSpPr>
         <p:cNvPr id="1" name=""/>
@@ -568,10 +554,10 @@
       </p:grpSpPr>
       <p:sp>
         <p:nvSpPr>
-          <p:cNvPr id="2" name="Vertical Title 1">
-            <a:extLst>
-              <a:ext uri="{FF2B5EF4-FFF2-40B4-BE49-F238E27FC236}">
-                <a16:creationId xmlns:a16="http://schemas.microsoft.com/office/drawing/2014/main" id="{6960633D-90E4-4F5A-9EBF-DDEC2B0B471A}"/>
+          <p:cNvPr id="2" name="Título Vertical 1">
+            <a:extLst>
+              <a:ext uri="{FF2B5EF4-FFF2-40B4-BE49-F238E27FC236}">
+                <a16:creationId xmlns:a16="http://schemas.microsoft.com/office/drawing/2014/main" id="{88DA7C92-B15A-2047-B9D8-A8D7E5F1AD5B}"/>
               </a:ext>
             </a:extLst>
           </p:cNvPr>
@@ -593,18 +579,18 @@
           <a:lstStyle/>
           <a:p>
             <a:r>
-              <a:rPr lang="en-US"/>
-              <a:t>Click to edit Master title style</a:t>
-            </a:r>
-          </a:p>
-        </p:txBody>
-      </p:sp>
-      <p:sp>
-        <p:nvSpPr>
-          <p:cNvPr id="3" name="Vertical Text Placeholder 2">
-            <a:extLst>
-              <a:ext uri="{FF2B5EF4-FFF2-40B4-BE49-F238E27FC236}">
-                <a16:creationId xmlns:a16="http://schemas.microsoft.com/office/drawing/2014/main" id="{0DDD3065-FA3D-42C8-BFDA-967C87F4F285}"/>
+              <a:rPr lang="pt-PT"/>
+              <a:t>Clique para editar o estilo de título do Modelo Global</a:t>
+            </a:r>
+          </a:p>
+        </p:txBody>
+      </p:sp>
+      <p:sp>
+        <p:nvSpPr>
+          <p:cNvPr id="3" name="Marcador de Posição de Texto Vertical 2">
+            <a:extLst>
+              <a:ext uri="{FF2B5EF4-FFF2-40B4-BE49-F238E27FC236}">
+                <a16:creationId xmlns:a16="http://schemas.microsoft.com/office/drawing/2014/main" id="{CC33C1AE-F3DE-ED4C-8A4C-E27B6A645CAB}"/>
               </a:ext>
             </a:extLst>
           </p:cNvPr>
@@ -627,46 +613,46 @@
           <a:p>
             <a:pPr lvl="0"/>
             <a:r>
-              <a:rPr lang="en-US"/>
-              <a:t>Click to edit Master text styles</a:t>
+              <a:rPr lang="pt-PT"/>
+              <a:t>Clique para editar os estilos do texto de Modelo Global</a:t>
             </a:r>
           </a:p>
           <a:p>
             <a:pPr lvl="1"/>
             <a:r>
-              <a:rPr lang="en-US"/>
-              <a:t>Second level</a:t>
+              <a:rPr lang="pt-PT"/>
+              <a:t>Segundo nível</a:t>
             </a:r>
           </a:p>
           <a:p>
             <a:pPr lvl="2"/>
             <a:r>
-              <a:rPr lang="en-US"/>
-              <a:t>Third level</a:t>
+              <a:rPr lang="pt-PT"/>
+              <a:t>Terceiro nível</a:t>
             </a:r>
           </a:p>
           <a:p>
             <a:pPr lvl="3"/>
             <a:r>
-              <a:rPr lang="en-US"/>
-              <a:t>Fourth level</a:t>
+              <a:rPr lang="pt-PT"/>
+              <a:t>Quarto nível</a:t>
             </a:r>
           </a:p>
           <a:p>
             <a:pPr lvl="4"/>
             <a:r>
-              <a:rPr lang="en-US"/>
-              <a:t>Fifth level</a:t>
-            </a:r>
-          </a:p>
-        </p:txBody>
-      </p:sp>
-      <p:sp>
-        <p:nvSpPr>
-          <p:cNvPr id="4" name="Date Placeholder 3">
-            <a:extLst>
-              <a:ext uri="{FF2B5EF4-FFF2-40B4-BE49-F238E27FC236}">
-                <a16:creationId xmlns:a16="http://schemas.microsoft.com/office/drawing/2014/main" id="{E4DC126F-38E2-4425-861F-98ED432284BA}"/>
+              <a:rPr lang="pt-PT"/>
+              <a:t>Quinto nível</a:t>
+            </a:r>
+          </a:p>
+        </p:txBody>
+      </p:sp>
+      <p:sp>
+        <p:nvSpPr>
+          <p:cNvPr id="4" name="Marcador de Posição da Data 3">
+            <a:extLst>
+              <a:ext uri="{FF2B5EF4-FFF2-40B4-BE49-F238E27FC236}">
+                <a16:creationId xmlns:a16="http://schemas.microsoft.com/office/drawing/2014/main" id="{5EE92B87-4125-DB42-8565-3814984F2689}"/>
               </a:ext>
             </a:extLst>
           </p:cNvPr>
@@ -682,20 +668,21 @@
           <a:bodyPr/>
           <a:lstStyle/>
           <a:p>
-            <a:fld id="{CC4A6868-2568-4CC9-B302-F37117B01A6E}" type="datetime1">
+            <a:fld id="{57E0CF6C-748E-4B7A-BC8B-3011EF78ED13}" type="datetime1">
               <a:rPr lang="en-US" smtClean="0"/>
+              <a:pPr/>
               <a:t>2/5/21</a:t>
             </a:fld>
-            <a:endParaRPr lang="en-US"/>
-          </a:p>
-        </p:txBody>
-      </p:sp>
-      <p:sp>
-        <p:nvSpPr>
-          <p:cNvPr id="5" name="Footer Placeholder 4">
-            <a:extLst>
-              <a:ext uri="{FF2B5EF4-FFF2-40B4-BE49-F238E27FC236}">
-                <a16:creationId xmlns:a16="http://schemas.microsoft.com/office/drawing/2014/main" id="{CA9645D8-F22A-4354-A8B3-96E8A2D232AE}"/>
+            <a:endParaRPr lang="en-US" dirty="0"/>
+          </a:p>
+        </p:txBody>
+      </p:sp>
+      <p:sp>
+        <p:nvSpPr>
+          <p:cNvPr id="5" name="Marcador de Posição do Rodapé 4">
+            <a:extLst>
+              <a:ext uri="{FF2B5EF4-FFF2-40B4-BE49-F238E27FC236}">
+                <a16:creationId xmlns:a16="http://schemas.microsoft.com/office/drawing/2014/main" id="{F8599781-813A-9D4C-80C2-E0A86250F8BC}"/>
               </a:ext>
             </a:extLst>
           </p:cNvPr>
@@ -711,16 +698,16 @@
           <a:bodyPr/>
           <a:lstStyle/>
           <a:p>
-            <a:endParaRPr lang="en-US"/>
-          </a:p>
-        </p:txBody>
-      </p:sp>
-      <p:sp>
-        <p:nvSpPr>
-          <p:cNvPr id="6" name="Slide Number Placeholder 5">
-            <a:extLst>
-              <a:ext uri="{FF2B5EF4-FFF2-40B4-BE49-F238E27FC236}">
-                <a16:creationId xmlns:a16="http://schemas.microsoft.com/office/drawing/2014/main" id="{E59E2295-A616-4D57-8800-7B7E213A8CC8}"/>
+            <a:endParaRPr lang="en-US" dirty="0"/>
+          </a:p>
+        </p:txBody>
+      </p:sp>
+      <p:sp>
+        <p:nvSpPr>
+          <p:cNvPr id="6" name="Marcador de Posição do Número do Diapositivo 5">
+            <a:extLst>
+              <a:ext uri="{FF2B5EF4-FFF2-40B4-BE49-F238E27FC236}">
+                <a16:creationId xmlns:a16="http://schemas.microsoft.com/office/drawing/2014/main" id="{673B1442-D3DE-874B-A463-03CD1DA34529}"/>
               </a:ext>
             </a:extLst>
           </p:cNvPr>
@@ -738,28 +725,30 @@
           <a:p>
             <a:fld id="{73B850FF-6169-4056-8077-06FFA93A5366}" type="slidenum">
               <a:rPr lang="en-US" smtClean="0"/>
+              <a:pPr/>
               <a:t>‹nº›</a:t>
             </a:fld>
-            <a:endParaRPr lang="en-US"/>
+            <a:endParaRPr lang="en-US" dirty="0"/>
           </a:p>
         </p:txBody>
       </p:sp>
     </p:spTree>
     <p:extLst>
       <p:ext uri="{BB962C8B-B14F-4D97-AF65-F5344CB8AC3E}">
-        <p14:creationId xmlns:p14="http://schemas.microsoft.com/office/powerpoint/2010/main" val="13321776"/>
+        <p14:creationId xmlns:p14="http://schemas.microsoft.com/office/powerpoint/2010/main" val="1402647758"/>
       </p:ext>
     </p:extLst>
   </p:cSld>
   <p:clrMapOvr>
     <a:masterClrMapping/>
   </p:clrMapOvr>
+  <p:hf sldNum="0" hdr="0" ftr="0" dt="0"/>
 </p:sldLayout>
 </file>
 
 <file path=ppt/slideLayouts/slideLayout2.xml><?xml version="1.0" encoding="utf-8"?>
 <p:sldLayout xmlns:a="http://schemas.openxmlformats.org/drawingml/2006/main" xmlns:r="http://schemas.openxmlformats.org/officeDocument/2006/relationships" xmlns:p="http://schemas.openxmlformats.org/presentationml/2006/main" type="obj" preserve="1">
-  <p:cSld name="Title and Content">
+  <p:cSld name="Título e Objeto">
     <p:spTree>
       <p:nvGrpSpPr>
         <p:cNvPr id="1" name=""/>
@@ -776,10 +765,10 @@
       </p:grpSpPr>
       <p:sp>
         <p:nvSpPr>
-          <p:cNvPr id="2" name="Title 1">
-            <a:extLst>
-              <a:ext uri="{FF2B5EF4-FFF2-40B4-BE49-F238E27FC236}">
-                <a16:creationId xmlns:a16="http://schemas.microsoft.com/office/drawing/2014/main" id="{7D4CC1FC-ADE8-488C-A1DA-2FD569FD4D09}"/>
+          <p:cNvPr id="2" name="Título 1">
+            <a:extLst>
+              <a:ext uri="{FF2B5EF4-FFF2-40B4-BE49-F238E27FC236}">
+                <a16:creationId xmlns:a16="http://schemas.microsoft.com/office/drawing/2014/main" id="{48DAC25A-A22D-7F4E-A7DF-FF26768D9B53}"/>
               </a:ext>
             </a:extLst>
           </p:cNvPr>
@@ -790,29 +779,24 @@
             <p:ph type="title"/>
           </p:nvPr>
         </p:nvSpPr>
-        <p:spPr>
-          <a:xfrm>
-            <a:off x="838200" y="365760"/>
-            <a:ext cx="10515600" cy="1325563"/>
-          </a:xfrm>
-        </p:spPr>
+        <p:spPr/>
         <p:txBody>
           <a:bodyPr/>
           <a:lstStyle/>
           <a:p>
             <a:r>
-              <a:rPr lang="en-US" dirty="0"/>
-              <a:t>Click to edit Master title style</a:t>
-            </a:r>
-          </a:p>
-        </p:txBody>
-      </p:sp>
-      <p:sp>
-        <p:nvSpPr>
-          <p:cNvPr id="3" name="Content Placeholder 2">
-            <a:extLst>
-              <a:ext uri="{FF2B5EF4-FFF2-40B4-BE49-F238E27FC236}">
-                <a16:creationId xmlns:a16="http://schemas.microsoft.com/office/drawing/2014/main" id="{57F02842-38C3-46D6-8527-0F6FE623C511}"/>
+              <a:rPr lang="pt-PT"/>
+              <a:t>Clique para editar o estilo de título do Modelo Global</a:t>
+            </a:r>
+          </a:p>
+        </p:txBody>
+      </p:sp>
+      <p:sp>
+        <p:nvSpPr>
+          <p:cNvPr id="3" name="Marcador de Posição de Conteúdo 2">
+            <a:extLst>
+              <a:ext uri="{FF2B5EF4-FFF2-40B4-BE49-F238E27FC236}">
+                <a16:creationId xmlns:a16="http://schemas.microsoft.com/office/drawing/2014/main" id="{C5AEB1B7-9F2C-3F43-A448-1C207A624A7B}"/>
               </a:ext>
             </a:extLst>
           </p:cNvPr>
@@ -830,46 +814,46 @@
           <a:p>
             <a:pPr lvl="0"/>
             <a:r>
-              <a:rPr lang="en-US" dirty="0"/>
-              <a:t>Click to edit Master text styles</a:t>
+              <a:rPr lang="pt-PT"/>
+              <a:t>Clique para editar os estilos do texto de Modelo Global</a:t>
             </a:r>
           </a:p>
           <a:p>
             <a:pPr lvl="1"/>
             <a:r>
-              <a:rPr lang="en-US" dirty="0"/>
-              <a:t>Second level</a:t>
+              <a:rPr lang="pt-PT"/>
+              <a:t>Segundo nível</a:t>
             </a:r>
           </a:p>
           <a:p>
             <a:pPr lvl="2"/>
             <a:r>
-              <a:rPr lang="en-US" dirty="0"/>
-              <a:t>Third level</a:t>
+              <a:rPr lang="pt-PT"/>
+              <a:t>Terceiro nível</a:t>
             </a:r>
           </a:p>
           <a:p>
             <a:pPr lvl="3"/>
             <a:r>
-              <a:rPr lang="en-US" dirty="0"/>
-              <a:t>Fourth level</a:t>
+              <a:rPr lang="pt-PT"/>
+              <a:t>Quarto nível</a:t>
             </a:r>
           </a:p>
           <a:p>
             <a:pPr lvl="4"/>
             <a:r>
-              <a:rPr lang="en-US" dirty="0"/>
-              <a:t>Fifth level</a:t>
-            </a:r>
-          </a:p>
-        </p:txBody>
-      </p:sp>
-      <p:sp>
-        <p:nvSpPr>
-          <p:cNvPr id="4" name="Date Placeholder 3">
-            <a:extLst>
-              <a:ext uri="{FF2B5EF4-FFF2-40B4-BE49-F238E27FC236}">
-                <a16:creationId xmlns:a16="http://schemas.microsoft.com/office/drawing/2014/main" id="{0E864CF5-F681-40C2-88CC-E02206C9CECB}"/>
+              <a:rPr lang="pt-PT"/>
+              <a:t>Quinto nível</a:t>
+            </a:r>
+          </a:p>
+        </p:txBody>
+      </p:sp>
+      <p:sp>
+        <p:nvSpPr>
+          <p:cNvPr id="4" name="Marcador de Posição da Data 3">
+            <a:extLst>
+              <a:ext uri="{FF2B5EF4-FFF2-40B4-BE49-F238E27FC236}">
+                <a16:creationId xmlns:a16="http://schemas.microsoft.com/office/drawing/2014/main" id="{580226E5-15A7-0247-8411-EAC389724C5D}"/>
               </a:ext>
             </a:extLst>
           </p:cNvPr>
@@ -885,8 +869,9 @@
           <a:bodyPr/>
           <a:lstStyle/>
           <a:p>
-            <a:fld id="{0055F08A-1E71-4B2B-BB49-E743F2903911}" type="datetime1">
+            <a:fld id="{57E0CF6C-748E-4B7A-BC8B-3011EF78ED13}" type="datetime1">
               <a:rPr lang="en-US" smtClean="0"/>
+              <a:pPr/>
               <a:t>2/5/21</a:t>
             </a:fld>
             <a:endParaRPr lang="en-US" dirty="0"/>
@@ -895,10 +880,10 @@
       </p:sp>
       <p:sp>
         <p:nvSpPr>
-          <p:cNvPr id="5" name="Footer Placeholder 4">
-            <a:extLst>
-              <a:ext uri="{FF2B5EF4-FFF2-40B4-BE49-F238E27FC236}">
-                <a16:creationId xmlns:a16="http://schemas.microsoft.com/office/drawing/2014/main" id="{82C04753-4FE4-4A6F-99BB-CFFC92E0CD06}"/>
+          <p:cNvPr id="5" name="Marcador de Posição do Rodapé 4">
+            <a:extLst>
+              <a:ext uri="{FF2B5EF4-FFF2-40B4-BE49-F238E27FC236}">
+                <a16:creationId xmlns:a16="http://schemas.microsoft.com/office/drawing/2014/main" id="{9CC7A8F7-BA22-194F-87FB-F52D26B78E60}"/>
               </a:ext>
             </a:extLst>
           </p:cNvPr>
@@ -914,16 +899,16 @@
           <a:bodyPr/>
           <a:lstStyle/>
           <a:p>
-            <a:endParaRPr lang="en-US"/>
-          </a:p>
-        </p:txBody>
-      </p:sp>
-      <p:sp>
-        <p:nvSpPr>
-          <p:cNvPr id="6" name="Slide Number Placeholder 5">
-            <a:extLst>
-              <a:ext uri="{FF2B5EF4-FFF2-40B4-BE49-F238E27FC236}">
-                <a16:creationId xmlns:a16="http://schemas.microsoft.com/office/drawing/2014/main" id="{80A569D1-DB13-4BD9-8BA9-0DEAD98F893F}"/>
+            <a:endParaRPr lang="en-US" dirty="0"/>
+          </a:p>
+        </p:txBody>
+      </p:sp>
+      <p:sp>
+        <p:nvSpPr>
+          <p:cNvPr id="6" name="Marcador de Posição do Número do Diapositivo 5">
+            <a:extLst>
+              <a:ext uri="{FF2B5EF4-FFF2-40B4-BE49-F238E27FC236}">
+                <a16:creationId xmlns:a16="http://schemas.microsoft.com/office/drawing/2014/main" id="{66F7E061-46D1-2440-86AF-1FF72DF55E5A}"/>
               </a:ext>
             </a:extLst>
           </p:cNvPr>
@@ -941,28 +926,30 @@
           <a:p>
             <a:fld id="{73B850FF-6169-4056-8077-06FFA93A5366}" type="slidenum">
               <a:rPr lang="en-US" smtClean="0"/>
+              <a:pPr/>
               <a:t>‹nº›</a:t>
             </a:fld>
-            <a:endParaRPr lang="en-US"/>
+            <a:endParaRPr lang="en-US" dirty="0"/>
           </a:p>
         </p:txBody>
       </p:sp>
     </p:spTree>
     <p:extLst>
       <p:ext uri="{BB962C8B-B14F-4D97-AF65-F5344CB8AC3E}">
-        <p14:creationId xmlns:p14="http://schemas.microsoft.com/office/powerpoint/2010/main" val="2724357213"/>
+        <p14:creationId xmlns:p14="http://schemas.microsoft.com/office/powerpoint/2010/main" val="522733345"/>
       </p:ext>
     </p:extLst>
   </p:cSld>
   <p:clrMapOvr>
     <a:masterClrMapping/>
   </p:clrMapOvr>
+  <p:hf sldNum="0" hdr="0" ftr="0" dt="0"/>
 </p:sldLayout>
 </file>
 
 <file path=ppt/slideLayouts/slideLayout3.xml><?xml version="1.0" encoding="utf-8"?>
 <p:sldLayout xmlns:a="http://schemas.openxmlformats.org/drawingml/2006/main" xmlns:r="http://schemas.openxmlformats.org/officeDocument/2006/relationships" xmlns:p="http://schemas.openxmlformats.org/presentationml/2006/main" type="secHead" preserve="1">
-  <p:cSld name="Section Header">
+  <p:cSld name="Cabeçalho da Secção">
     <p:spTree>
       <p:nvGrpSpPr>
         <p:cNvPr id="1" name=""/>
@@ -979,10 +966,10 @@
       </p:grpSpPr>
       <p:sp>
         <p:nvSpPr>
-          <p:cNvPr id="2" name="Title 1">
-            <a:extLst>
-              <a:ext uri="{FF2B5EF4-FFF2-40B4-BE49-F238E27FC236}">
-                <a16:creationId xmlns:a16="http://schemas.microsoft.com/office/drawing/2014/main" id="{AE020B05-7BF6-4073-9106-FA19E97273CB}"/>
+          <p:cNvPr id="2" name="Título 1">
+            <a:extLst>
+              <a:ext uri="{FF2B5EF4-FFF2-40B4-BE49-F238E27FC236}">
+                <a16:creationId xmlns:a16="http://schemas.microsoft.com/office/drawing/2014/main" id="{0CF22505-0E2A-BB48-80C1-E0F6D0B219F1}"/>
               </a:ext>
             </a:extLst>
           </p:cNvPr>
@@ -1003,24 +990,23 @@
           <a:bodyPr anchor="b"/>
           <a:lstStyle>
             <a:lvl1pPr>
-              <a:defRPr sz="4400"/>
+              <a:defRPr sz="6000"/>
             </a:lvl1pPr>
           </a:lstStyle>
           <a:p>
             <a:r>
-              <a:rPr lang="en-US"/>
-              <a:t>Click to edit Master title style</a:t>
-            </a:r>
-            <a:endParaRPr lang="en-US" dirty="0"/>
-          </a:p>
-        </p:txBody>
-      </p:sp>
-      <p:sp>
-        <p:nvSpPr>
-          <p:cNvPr id="3" name="Text Placeholder 2">
-            <a:extLst>
-              <a:ext uri="{FF2B5EF4-FFF2-40B4-BE49-F238E27FC236}">
-                <a16:creationId xmlns:a16="http://schemas.microsoft.com/office/drawing/2014/main" id="{4E8EE8D7-6B58-4A3F-9DD5-E563D5192A68}"/>
+              <a:rPr lang="pt-PT"/>
+              <a:t>Clique para editar o estilo de título do Modelo Global</a:t>
+            </a:r>
+          </a:p>
+        </p:txBody>
+      </p:sp>
+      <p:sp>
+        <p:nvSpPr>
+          <p:cNvPr id="3" name="Marcador de Posição do Texto 2">
+            <a:extLst>
+              <a:ext uri="{FF2B5EF4-FFF2-40B4-BE49-F238E27FC236}">
+                <a16:creationId xmlns:a16="http://schemas.microsoft.com/office/drawing/2014/main" id="{B7350984-3BC3-7149-AEFD-A425DE5FC137}"/>
               </a:ext>
             </a:extLst>
           </p:cNvPr>
@@ -1044,7 +1030,9 @@
               <a:buNone/>
               <a:defRPr sz="2400">
                 <a:solidFill>
-                  <a:schemeClr val="bg1"/>
+                  <a:schemeClr val="tx1">
+                    <a:tint val="75000"/>
+                  </a:schemeClr>
                 </a:solidFill>
               </a:defRPr>
             </a:lvl1pPr>
@@ -1132,18 +1120,18 @@
           <a:p>
             <a:pPr lvl="0"/>
             <a:r>
-              <a:rPr lang="en-US"/>
-              <a:t>Click to edit Master text styles</a:t>
-            </a:r>
-          </a:p>
-        </p:txBody>
-      </p:sp>
-      <p:sp>
-        <p:nvSpPr>
-          <p:cNvPr id="4" name="Date Placeholder 3">
-            <a:extLst>
-              <a:ext uri="{FF2B5EF4-FFF2-40B4-BE49-F238E27FC236}">
-                <a16:creationId xmlns:a16="http://schemas.microsoft.com/office/drawing/2014/main" id="{2102990E-9F0A-446A-B5B8-459CA8D98D92}"/>
+              <a:rPr lang="pt-PT"/>
+              <a:t>Clique para editar os estilos do texto de Modelo Global</a:t>
+            </a:r>
+          </a:p>
+        </p:txBody>
+      </p:sp>
+      <p:sp>
+        <p:nvSpPr>
+          <p:cNvPr id="4" name="Marcador de Posição da Data 3">
+            <a:extLst>
+              <a:ext uri="{FF2B5EF4-FFF2-40B4-BE49-F238E27FC236}">
+                <a16:creationId xmlns:a16="http://schemas.microsoft.com/office/drawing/2014/main" id="{02257672-B275-324C-AFDA-D43E7AC8D501}"/>
               </a:ext>
             </a:extLst>
           </p:cNvPr>
@@ -1159,20 +1147,21 @@
           <a:bodyPr/>
           <a:lstStyle/>
           <a:p>
-            <a:fld id="{15417D9E-721A-44BB-8863-9873FE64DA75}" type="datetime1">
+            <a:fld id="{57E0CF6C-748E-4B7A-BC8B-3011EF78ED13}" type="datetime1">
               <a:rPr lang="en-US" smtClean="0"/>
+              <a:pPr/>
               <a:t>2/5/21</a:t>
             </a:fld>
-            <a:endParaRPr lang="en-US"/>
-          </a:p>
-        </p:txBody>
-      </p:sp>
-      <p:sp>
-        <p:nvSpPr>
-          <p:cNvPr id="5" name="Footer Placeholder 4">
-            <a:extLst>
-              <a:ext uri="{FF2B5EF4-FFF2-40B4-BE49-F238E27FC236}">
-                <a16:creationId xmlns:a16="http://schemas.microsoft.com/office/drawing/2014/main" id="{89E68EAA-4377-45FF-9D7C-9E77BC9F275D}"/>
+            <a:endParaRPr lang="en-US" dirty="0"/>
+          </a:p>
+        </p:txBody>
+      </p:sp>
+      <p:sp>
+        <p:nvSpPr>
+          <p:cNvPr id="5" name="Marcador de Posição do Rodapé 4">
+            <a:extLst>
+              <a:ext uri="{FF2B5EF4-FFF2-40B4-BE49-F238E27FC236}">
+                <a16:creationId xmlns:a16="http://schemas.microsoft.com/office/drawing/2014/main" id="{7E8955FC-4AA8-4941-826D-CBE64356ABF2}"/>
               </a:ext>
             </a:extLst>
           </p:cNvPr>
@@ -1188,16 +1177,16 @@
           <a:bodyPr/>
           <a:lstStyle/>
           <a:p>
-            <a:endParaRPr lang="en-US"/>
-          </a:p>
-        </p:txBody>
-      </p:sp>
-      <p:sp>
-        <p:nvSpPr>
-          <p:cNvPr id="6" name="Slide Number Placeholder 5">
-            <a:extLst>
-              <a:ext uri="{FF2B5EF4-FFF2-40B4-BE49-F238E27FC236}">
-                <a16:creationId xmlns:a16="http://schemas.microsoft.com/office/drawing/2014/main" id="{8207FA71-74C3-44B8-A0AC-E18A1E76B43D}"/>
+            <a:endParaRPr lang="en-US" dirty="0"/>
+          </a:p>
+        </p:txBody>
+      </p:sp>
+      <p:sp>
+        <p:nvSpPr>
+          <p:cNvPr id="6" name="Marcador de Posição do Número do Diapositivo 5">
+            <a:extLst>
+              <a:ext uri="{FF2B5EF4-FFF2-40B4-BE49-F238E27FC236}">
+                <a16:creationId xmlns:a16="http://schemas.microsoft.com/office/drawing/2014/main" id="{E29D6639-F0DB-AD42-9EE3-BBAC334CD050}"/>
               </a:ext>
             </a:extLst>
           </p:cNvPr>
@@ -1215,28 +1204,30 @@
           <a:p>
             <a:fld id="{73B850FF-6169-4056-8077-06FFA93A5366}" type="slidenum">
               <a:rPr lang="en-US" smtClean="0"/>
+              <a:pPr/>
               <a:t>‹nº›</a:t>
             </a:fld>
-            <a:endParaRPr lang="en-US"/>
+            <a:endParaRPr lang="en-US" dirty="0"/>
           </a:p>
         </p:txBody>
       </p:sp>
     </p:spTree>
     <p:extLst>
       <p:ext uri="{BB962C8B-B14F-4D97-AF65-F5344CB8AC3E}">
-        <p14:creationId xmlns:p14="http://schemas.microsoft.com/office/powerpoint/2010/main" val="3895079223"/>
+        <p14:creationId xmlns:p14="http://schemas.microsoft.com/office/powerpoint/2010/main" val="3288935199"/>
       </p:ext>
     </p:extLst>
   </p:cSld>
   <p:clrMapOvr>
     <a:masterClrMapping/>
   </p:clrMapOvr>
+  <p:hf sldNum="0" hdr="0" ftr="0" dt="0"/>
 </p:sldLayout>
 </file>
 
 <file path=ppt/slideLayouts/slideLayout4.xml><?xml version="1.0" encoding="utf-8"?>
 <p:sldLayout xmlns:a="http://schemas.openxmlformats.org/drawingml/2006/main" xmlns:r="http://schemas.openxmlformats.org/officeDocument/2006/relationships" xmlns:p="http://schemas.openxmlformats.org/presentationml/2006/main" type="twoObj" preserve="1">
-  <p:cSld name="Two Content">
+  <p:cSld name="Conteúdo Duplo">
     <p:spTree>
       <p:nvGrpSpPr>
         <p:cNvPr id="1" name=""/>
@@ -1253,10 +1244,10 @@
       </p:grpSpPr>
       <p:sp>
         <p:nvSpPr>
-          <p:cNvPr id="2" name="Title 1">
-            <a:extLst>
-              <a:ext uri="{FF2B5EF4-FFF2-40B4-BE49-F238E27FC236}">
-                <a16:creationId xmlns:a16="http://schemas.microsoft.com/office/drawing/2014/main" id="{9AB71F12-2D88-4F76-AF46-BD5156C127A9}"/>
+          <p:cNvPr id="2" name="Título 1">
+            <a:extLst>
+              <a:ext uri="{FF2B5EF4-FFF2-40B4-BE49-F238E27FC236}">
+                <a16:creationId xmlns:a16="http://schemas.microsoft.com/office/drawing/2014/main" id="{82085786-BE7D-E746-8B08-35666508E486}"/>
               </a:ext>
             </a:extLst>
           </p:cNvPr>
@@ -1267,29 +1258,24 @@
             <p:ph type="title"/>
           </p:nvPr>
         </p:nvSpPr>
-        <p:spPr>
-          <a:xfrm>
-            <a:off x="838200" y="365760"/>
-            <a:ext cx="10515600" cy="1325563"/>
-          </a:xfrm>
-        </p:spPr>
+        <p:spPr/>
         <p:txBody>
           <a:bodyPr/>
           <a:lstStyle/>
           <a:p>
             <a:r>
-              <a:rPr lang="en-US"/>
-              <a:t>Click to edit Master title style</a:t>
-            </a:r>
-          </a:p>
-        </p:txBody>
-      </p:sp>
-      <p:sp>
-        <p:nvSpPr>
-          <p:cNvPr id="3" name="Content Placeholder 2">
-            <a:extLst>
-              <a:ext uri="{FF2B5EF4-FFF2-40B4-BE49-F238E27FC236}">
-                <a16:creationId xmlns:a16="http://schemas.microsoft.com/office/drawing/2014/main" id="{E6E1AA46-E3EB-4704-B019-F90F1E6177A5}"/>
+              <a:rPr lang="pt-PT"/>
+              <a:t>Clique para editar o estilo de título do Modelo Global</a:t>
+            </a:r>
+          </a:p>
+        </p:txBody>
+      </p:sp>
+      <p:sp>
+        <p:nvSpPr>
+          <p:cNvPr id="3" name="Marcador de Posição de Conteúdo 2">
+            <a:extLst>
+              <a:ext uri="{FF2B5EF4-FFF2-40B4-BE49-F238E27FC236}">
+                <a16:creationId xmlns:a16="http://schemas.microsoft.com/office/drawing/2014/main" id="{E13332B7-C92B-7B4A-9022-318916B031A5}"/>
               </a:ext>
             </a:extLst>
           </p:cNvPr>
@@ -1312,46 +1298,46 @@
           <a:p>
             <a:pPr lvl="0"/>
             <a:r>
-              <a:rPr lang="en-US" dirty="0"/>
-              <a:t>Click to edit Master text styles</a:t>
+              <a:rPr lang="pt-PT"/>
+              <a:t>Clique para editar os estilos do texto de Modelo Global</a:t>
             </a:r>
           </a:p>
           <a:p>
             <a:pPr lvl="1"/>
             <a:r>
-              <a:rPr lang="en-US" dirty="0"/>
-              <a:t>Second level</a:t>
+              <a:rPr lang="pt-PT"/>
+              <a:t>Segundo nível</a:t>
             </a:r>
           </a:p>
           <a:p>
             <a:pPr lvl="2"/>
             <a:r>
-              <a:rPr lang="en-US" dirty="0"/>
-              <a:t>Third level</a:t>
+              <a:rPr lang="pt-PT"/>
+              <a:t>Terceiro nível</a:t>
             </a:r>
           </a:p>
           <a:p>
             <a:pPr lvl="3"/>
             <a:r>
-              <a:rPr lang="en-US" dirty="0"/>
-              <a:t>Fourth level</a:t>
+              <a:rPr lang="pt-PT"/>
+              <a:t>Quarto nível</a:t>
             </a:r>
           </a:p>
           <a:p>
             <a:pPr lvl="4"/>
             <a:r>
-              <a:rPr lang="en-US" dirty="0"/>
-              <a:t>Fifth level</a:t>
-            </a:r>
-          </a:p>
-        </p:txBody>
-      </p:sp>
-      <p:sp>
-        <p:nvSpPr>
-          <p:cNvPr id="4" name="Content Placeholder 3">
-            <a:extLst>
-              <a:ext uri="{FF2B5EF4-FFF2-40B4-BE49-F238E27FC236}">
-                <a16:creationId xmlns:a16="http://schemas.microsoft.com/office/drawing/2014/main" id="{5C17480F-A530-4D05-9A22-E573FB4BA620}"/>
+              <a:rPr lang="pt-PT"/>
+              <a:t>Quinto nível</a:t>
+            </a:r>
+          </a:p>
+        </p:txBody>
+      </p:sp>
+      <p:sp>
+        <p:nvSpPr>
+          <p:cNvPr id="4" name="Marcador de Posição de Conteúdo 3">
+            <a:extLst>
+              <a:ext uri="{FF2B5EF4-FFF2-40B4-BE49-F238E27FC236}">
+                <a16:creationId xmlns:a16="http://schemas.microsoft.com/office/drawing/2014/main" id="{09FE3B17-ACBD-1A49-8C45-559E1AE385B8}"/>
               </a:ext>
             </a:extLst>
           </p:cNvPr>
@@ -1374,46 +1360,46 @@
           <a:p>
             <a:pPr lvl="0"/>
             <a:r>
-              <a:rPr lang="en-US"/>
-              <a:t>Click to edit Master text styles</a:t>
+              <a:rPr lang="pt-PT"/>
+              <a:t>Clique para editar os estilos do texto de Modelo Global</a:t>
             </a:r>
           </a:p>
           <a:p>
             <a:pPr lvl="1"/>
             <a:r>
-              <a:rPr lang="en-US"/>
-              <a:t>Second level</a:t>
+              <a:rPr lang="pt-PT"/>
+              <a:t>Segundo nível</a:t>
             </a:r>
           </a:p>
           <a:p>
             <a:pPr lvl="2"/>
             <a:r>
-              <a:rPr lang="en-US"/>
-              <a:t>Third level</a:t>
+              <a:rPr lang="pt-PT"/>
+              <a:t>Terceiro nível</a:t>
             </a:r>
           </a:p>
           <a:p>
             <a:pPr lvl="3"/>
             <a:r>
-              <a:rPr lang="en-US"/>
-              <a:t>Fourth level</a:t>
+              <a:rPr lang="pt-PT"/>
+              <a:t>Quarto nível</a:t>
             </a:r>
           </a:p>
           <a:p>
             <a:pPr lvl="4"/>
             <a:r>
-              <a:rPr lang="en-US"/>
-              <a:t>Fifth level</a:t>
-            </a:r>
-          </a:p>
-        </p:txBody>
-      </p:sp>
-      <p:sp>
-        <p:nvSpPr>
-          <p:cNvPr id="5" name="Date Placeholder 4">
-            <a:extLst>
-              <a:ext uri="{FF2B5EF4-FFF2-40B4-BE49-F238E27FC236}">
-                <a16:creationId xmlns:a16="http://schemas.microsoft.com/office/drawing/2014/main" id="{55B56FDA-C47A-4F4A-A364-BA60A25AB90A}"/>
+              <a:rPr lang="pt-PT"/>
+              <a:t>Quinto nível</a:t>
+            </a:r>
+          </a:p>
+        </p:txBody>
+      </p:sp>
+      <p:sp>
+        <p:nvSpPr>
+          <p:cNvPr id="5" name="Marcador de Posição da Data 4">
+            <a:extLst>
+              <a:ext uri="{FF2B5EF4-FFF2-40B4-BE49-F238E27FC236}">
+                <a16:creationId xmlns:a16="http://schemas.microsoft.com/office/drawing/2014/main" id="{74BE8638-C81B-0244-B5B8-5E10016EF428}"/>
               </a:ext>
             </a:extLst>
           </p:cNvPr>
@@ -1429,20 +1415,21 @@
           <a:bodyPr/>
           <a:lstStyle/>
           <a:p>
-            <a:fld id="{5F31DA2F-80B8-49CF-99FB-5ABCA53A607A}" type="datetime1">
+            <a:fld id="{57E0CF6C-748E-4B7A-BC8B-3011EF78ED13}" type="datetime1">
               <a:rPr lang="en-US" smtClean="0"/>
+              <a:pPr/>
               <a:t>2/5/21</a:t>
             </a:fld>
-            <a:endParaRPr lang="en-US"/>
-          </a:p>
-        </p:txBody>
-      </p:sp>
-      <p:sp>
-        <p:nvSpPr>
-          <p:cNvPr id="6" name="Footer Placeholder 5">
-            <a:extLst>
-              <a:ext uri="{FF2B5EF4-FFF2-40B4-BE49-F238E27FC236}">
-                <a16:creationId xmlns:a16="http://schemas.microsoft.com/office/drawing/2014/main" id="{7326D8DD-6D84-44D4-8A1B-57615B3ED835}"/>
+            <a:endParaRPr lang="en-US" dirty="0"/>
+          </a:p>
+        </p:txBody>
+      </p:sp>
+      <p:sp>
+        <p:nvSpPr>
+          <p:cNvPr id="6" name="Marcador de Posição do Rodapé 5">
+            <a:extLst>
+              <a:ext uri="{FF2B5EF4-FFF2-40B4-BE49-F238E27FC236}">
+                <a16:creationId xmlns:a16="http://schemas.microsoft.com/office/drawing/2014/main" id="{763CE51E-0A1F-2541-877A-07C11680A0AA}"/>
               </a:ext>
             </a:extLst>
           </p:cNvPr>
@@ -1458,16 +1445,16 @@
           <a:bodyPr/>
           <a:lstStyle/>
           <a:p>
-            <a:endParaRPr lang="en-US"/>
-          </a:p>
-        </p:txBody>
-      </p:sp>
-      <p:sp>
-        <p:nvSpPr>
-          <p:cNvPr id="7" name="Slide Number Placeholder 6">
-            <a:extLst>
-              <a:ext uri="{FF2B5EF4-FFF2-40B4-BE49-F238E27FC236}">
-                <a16:creationId xmlns:a16="http://schemas.microsoft.com/office/drawing/2014/main" id="{14C8FE31-B577-4017-8AFE-A8BA09596E9C}"/>
+            <a:endParaRPr lang="en-US" dirty="0"/>
+          </a:p>
+        </p:txBody>
+      </p:sp>
+      <p:sp>
+        <p:nvSpPr>
+          <p:cNvPr id="7" name="Marcador de Posição do Número do Diapositivo 6">
+            <a:extLst>
+              <a:ext uri="{FF2B5EF4-FFF2-40B4-BE49-F238E27FC236}">
+                <a16:creationId xmlns:a16="http://schemas.microsoft.com/office/drawing/2014/main" id="{5393C9AC-7827-8043-AE38-F4878CFCF8D0}"/>
               </a:ext>
             </a:extLst>
           </p:cNvPr>
@@ -1485,28 +1472,30 @@
           <a:p>
             <a:fld id="{73B850FF-6169-4056-8077-06FFA93A5366}" type="slidenum">
               <a:rPr lang="en-US" smtClean="0"/>
+              <a:pPr/>
               <a:t>‹nº›</a:t>
             </a:fld>
-            <a:endParaRPr lang="en-US"/>
+            <a:endParaRPr lang="en-US" dirty="0"/>
           </a:p>
         </p:txBody>
       </p:sp>
     </p:spTree>
     <p:extLst>
       <p:ext uri="{BB962C8B-B14F-4D97-AF65-F5344CB8AC3E}">
-        <p14:creationId xmlns:p14="http://schemas.microsoft.com/office/powerpoint/2010/main" val="1948937175"/>
+        <p14:creationId xmlns:p14="http://schemas.microsoft.com/office/powerpoint/2010/main" val="2381314206"/>
       </p:ext>
     </p:extLst>
   </p:cSld>
   <p:clrMapOvr>
     <a:masterClrMapping/>
   </p:clrMapOvr>
+  <p:hf sldNum="0" hdr="0" ftr="0" dt="0"/>
 </p:sldLayout>
 </file>
 
 <file path=ppt/slideLayouts/slideLayout5.xml><?xml version="1.0" encoding="utf-8"?>
 <p:sldLayout xmlns:a="http://schemas.openxmlformats.org/drawingml/2006/main" xmlns:r="http://schemas.openxmlformats.org/officeDocument/2006/relationships" xmlns:p="http://schemas.openxmlformats.org/presentationml/2006/main" type="twoTxTwoObj" preserve="1">
-  <p:cSld name="Comparison">
+  <p:cSld name="Comparação">
     <p:spTree>
       <p:nvGrpSpPr>
         <p:cNvPr id="1" name=""/>
@@ -1523,10 +1512,10 @@
       </p:grpSpPr>
       <p:sp>
         <p:nvSpPr>
-          <p:cNvPr id="2" name="Title 1">
-            <a:extLst>
-              <a:ext uri="{FF2B5EF4-FFF2-40B4-BE49-F238E27FC236}">
-                <a16:creationId xmlns:a16="http://schemas.microsoft.com/office/drawing/2014/main" id="{A1EC28C9-B8CC-413F-9FFA-626680E4A828}"/>
+          <p:cNvPr id="2" name="Título 1">
+            <a:extLst>
+              <a:ext uri="{FF2B5EF4-FFF2-40B4-BE49-F238E27FC236}">
+                <a16:creationId xmlns:a16="http://schemas.microsoft.com/office/drawing/2014/main" id="{9EF2C91F-8F32-734F-AD39-4148C890FBB5}"/>
               </a:ext>
             </a:extLst>
           </p:cNvPr>
@@ -1548,18 +1537,18 @@
           <a:lstStyle/>
           <a:p>
             <a:r>
-              <a:rPr lang="en-US"/>
-              <a:t>Click to edit Master title style</a:t>
-            </a:r>
-          </a:p>
-        </p:txBody>
-      </p:sp>
-      <p:sp>
-        <p:nvSpPr>
-          <p:cNvPr id="3" name="Text Placeholder 2">
-            <a:extLst>
-              <a:ext uri="{FF2B5EF4-FFF2-40B4-BE49-F238E27FC236}">
-                <a16:creationId xmlns:a16="http://schemas.microsoft.com/office/drawing/2014/main" id="{CB53FE72-9D42-45F5-A37F-B12130388AD5}"/>
+              <a:rPr lang="pt-PT"/>
+              <a:t>Clique para editar o estilo de título do Modelo Global</a:t>
+            </a:r>
+          </a:p>
+        </p:txBody>
+      </p:sp>
+      <p:sp>
+        <p:nvSpPr>
+          <p:cNvPr id="3" name="Marcador de Posição do Texto 2">
+            <a:extLst>
+              <a:ext uri="{FF2B5EF4-FFF2-40B4-BE49-F238E27FC236}">
+                <a16:creationId xmlns:a16="http://schemas.microsoft.com/office/drawing/2014/main" id="{6639E737-7E00-D546-B53D-6BED429AB6C0}"/>
               </a:ext>
             </a:extLst>
           </p:cNvPr>
@@ -1572,7 +1561,7 @@
         </p:nvSpPr>
         <p:spPr>
           <a:xfrm>
-            <a:off x="839788" y="1752600"/>
+            <a:off x="839788" y="1681163"/>
             <a:ext cx="5157787" cy="823912"/>
           </a:xfrm>
         </p:spPr>
@@ -1619,18 +1608,18 @@
           <a:p>
             <a:pPr lvl="0"/>
             <a:r>
-              <a:rPr lang="en-US"/>
-              <a:t>Click to edit Master text styles</a:t>
-            </a:r>
-          </a:p>
-        </p:txBody>
-      </p:sp>
-      <p:sp>
-        <p:nvSpPr>
-          <p:cNvPr id="4" name="Content Placeholder 3">
-            <a:extLst>
-              <a:ext uri="{FF2B5EF4-FFF2-40B4-BE49-F238E27FC236}">
-                <a16:creationId xmlns:a16="http://schemas.microsoft.com/office/drawing/2014/main" id="{5EE3A31D-9B5F-4DE3-B18D-F7F77782EB46}"/>
+              <a:rPr lang="pt-PT"/>
+              <a:t>Clique para editar os estilos do texto de Modelo Global</a:t>
+            </a:r>
+          </a:p>
+        </p:txBody>
+      </p:sp>
+      <p:sp>
+        <p:nvSpPr>
+          <p:cNvPr id="4" name="Marcador de Posição de Conteúdo 3">
+            <a:extLst>
+              <a:ext uri="{FF2B5EF4-FFF2-40B4-BE49-F238E27FC236}">
+                <a16:creationId xmlns:a16="http://schemas.microsoft.com/office/drawing/2014/main" id="{EBD26778-31B8-1B48-AEE0-15A46705391D}"/>
               </a:ext>
             </a:extLst>
           </p:cNvPr>
@@ -1643,8 +1632,8 @@
         </p:nvSpPr>
         <p:spPr>
           <a:xfrm>
-            <a:off x="839788" y="2666999"/>
-            <a:ext cx="5157787" cy="3522663"/>
+            <a:off x="839788" y="2505075"/>
+            <a:ext cx="5157787" cy="3684588"/>
           </a:xfrm>
         </p:spPr>
         <p:txBody>
@@ -1653,47 +1642,46 @@
           <a:p>
             <a:pPr lvl="0"/>
             <a:r>
-              <a:rPr lang="en-US"/>
-              <a:t>Click to edit Master text styles</a:t>
+              <a:rPr lang="pt-PT"/>
+              <a:t>Clique para editar os estilos do texto de Modelo Global</a:t>
             </a:r>
           </a:p>
           <a:p>
             <a:pPr lvl="1"/>
             <a:r>
-              <a:rPr lang="en-US"/>
-              <a:t>Second level</a:t>
+              <a:rPr lang="pt-PT"/>
+              <a:t>Segundo nível</a:t>
             </a:r>
           </a:p>
           <a:p>
             <a:pPr lvl="2"/>
             <a:r>
-              <a:rPr lang="en-US"/>
-              <a:t>Third level</a:t>
+              <a:rPr lang="pt-PT"/>
+              <a:t>Terceiro nível</a:t>
             </a:r>
           </a:p>
           <a:p>
             <a:pPr lvl="3"/>
             <a:r>
-              <a:rPr lang="en-US"/>
-              <a:t>Fourth level</a:t>
+              <a:rPr lang="pt-PT"/>
+              <a:t>Quarto nível</a:t>
             </a:r>
           </a:p>
           <a:p>
             <a:pPr lvl="4"/>
             <a:r>
-              <a:rPr lang="en-US"/>
-              <a:t>Fifth level</a:t>
-            </a:r>
-            <a:endParaRPr lang="en-US" dirty="0"/>
-          </a:p>
-        </p:txBody>
-      </p:sp>
-      <p:sp>
-        <p:nvSpPr>
-          <p:cNvPr id="5" name="Text Placeholder 4">
-            <a:extLst>
-              <a:ext uri="{FF2B5EF4-FFF2-40B4-BE49-F238E27FC236}">
-                <a16:creationId xmlns:a16="http://schemas.microsoft.com/office/drawing/2014/main" id="{F0BE1D2D-822C-466C-A7B9-1A2D97366A41}"/>
+              <a:rPr lang="pt-PT"/>
+              <a:t>Quinto nível</a:t>
+            </a:r>
+          </a:p>
+        </p:txBody>
+      </p:sp>
+      <p:sp>
+        <p:nvSpPr>
+          <p:cNvPr id="5" name="Marcador de Posição do Texto 4">
+            <a:extLst>
+              <a:ext uri="{FF2B5EF4-FFF2-40B4-BE49-F238E27FC236}">
+                <a16:creationId xmlns:a16="http://schemas.microsoft.com/office/drawing/2014/main" id="{C0BF0FF0-170A-6541-B851-21FEFBFD9BC0}"/>
               </a:ext>
             </a:extLst>
           </p:cNvPr>
@@ -1706,7 +1694,7 @@
         </p:nvSpPr>
         <p:spPr>
           <a:xfrm>
-            <a:off x="6172200" y="1752600"/>
+            <a:off x="6172200" y="1681163"/>
             <a:ext cx="5183188" cy="823912"/>
           </a:xfrm>
         </p:spPr>
@@ -1753,18 +1741,18 @@
           <a:p>
             <a:pPr lvl="0"/>
             <a:r>
-              <a:rPr lang="en-US"/>
-              <a:t>Click to edit Master text styles</a:t>
-            </a:r>
-          </a:p>
-        </p:txBody>
-      </p:sp>
-      <p:sp>
-        <p:nvSpPr>
-          <p:cNvPr id="6" name="Content Placeholder 5">
-            <a:extLst>
-              <a:ext uri="{FF2B5EF4-FFF2-40B4-BE49-F238E27FC236}">
-                <a16:creationId xmlns:a16="http://schemas.microsoft.com/office/drawing/2014/main" id="{F6F13B2C-44CA-49C4-BC84-02AF1638F381}"/>
+              <a:rPr lang="pt-PT"/>
+              <a:t>Clique para editar os estilos do texto de Modelo Global</a:t>
+            </a:r>
+          </a:p>
+        </p:txBody>
+      </p:sp>
+      <p:sp>
+        <p:nvSpPr>
+          <p:cNvPr id="6" name="Marcador de Posição de Conteúdo 5">
+            <a:extLst>
+              <a:ext uri="{FF2B5EF4-FFF2-40B4-BE49-F238E27FC236}">
+                <a16:creationId xmlns:a16="http://schemas.microsoft.com/office/drawing/2014/main" id="{360BFCFC-7C29-E44F-80AB-33B4D91BB0F2}"/>
               </a:ext>
             </a:extLst>
           </p:cNvPr>
@@ -1777,8 +1765,8 @@
         </p:nvSpPr>
         <p:spPr>
           <a:xfrm>
-            <a:off x="6172200" y="2666999"/>
-            <a:ext cx="5183188" cy="3522663"/>
+            <a:off x="6172200" y="2505075"/>
+            <a:ext cx="5183188" cy="3684588"/>
           </a:xfrm>
         </p:spPr>
         <p:txBody>
@@ -1787,46 +1775,46 @@
           <a:p>
             <a:pPr lvl="0"/>
             <a:r>
-              <a:rPr lang="en-US"/>
-              <a:t>Click to edit Master text styles</a:t>
+              <a:rPr lang="pt-PT"/>
+              <a:t>Clique para editar os estilos do texto de Modelo Global</a:t>
             </a:r>
           </a:p>
           <a:p>
             <a:pPr lvl="1"/>
             <a:r>
-              <a:rPr lang="en-US"/>
-              <a:t>Second level</a:t>
+              <a:rPr lang="pt-PT"/>
+              <a:t>Segundo nível</a:t>
             </a:r>
           </a:p>
           <a:p>
             <a:pPr lvl="2"/>
             <a:r>
-              <a:rPr lang="en-US"/>
-              <a:t>Third level</a:t>
+              <a:rPr lang="pt-PT"/>
+              <a:t>Terceiro nível</a:t>
             </a:r>
           </a:p>
           <a:p>
             <a:pPr lvl="3"/>
             <a:r>
-              <a:rPr lang="en-US"/>
-              <a:t>Fourth level</a:t>
+              <a:rPr lang="pt-PT"/>
+              <a:t>Quarto nível</a:t>
             </a:r>
           </a:p>
           <a:p>
             <a:pPr lvl="4"/>
             <a:r>
-              <a:rPr lang="en-US"/>
-              <a:t>Fifth level</a:t>
-            </a:r>
-          </a:p>
-        </p:txBody>
-      </p:sp>
-      <p:sp>
-        <p:nvSpPr>
-          <p:cNvPr id="7" name="Date Placeholder 6">
-            <a:extLst>
-              <a:ext uri="{FF2B5EF4-FFF2-40B4-BE49-F238E27FC236}">
-                <a16:creationId xmlns:a16="http://schemas.microsoft.com/office/drawing/2014/main" id="{3793CB55-E9C1-4CE6-9B61-81B71475B960}"/>
+              <a:rPr lang="pt-PT"/>
+              <a:t>Quinto nível</a:t>
+            </a:r>
+          </a:p>
+        </p:txBody>
+      </p:sp>
+      <p:sp>
+        <p:nvSpPr>
+          <p:cNvPr id="7" name="Marcador de Posição da Data 6">
+            <a:extLst>
+              <a:ext uri="{FF2B5EF4-FFF2-40B4-BE49-F238E27FC236}">
+                <a16:creationId xmlns:a16="http://schemas.microsoft.com/office/drawing/2014/main" id="{A1CA104F-3FAE-0F4D-A96A-CC5E43DF2165}"/>
               </a:ext>
             </a:extLst>
           </p:cNvPr>
@@ -1842,20 +1830,21 @@
           <a:bodyPr/>
           <a:lstStyle/>
           <a:p>
-            <a:fld id="{28852172-E6C9-4B6C-929A-A9DE3837BBF1}" type="datetime1">
+            <a:fld id="{57E0CF6C-748E-4B7A-BC8B-3011EF78ED13}" type="datetime1">
               <a:rPr lang="en-US" smtClean="0"/>
+              <a:pPr/>
               <a:t>2/5/21</a:t>
             </a:fld>
-            <a:endParaRPr lang="en-US"/>
-          </a:p>
-        </p:txBody>
-      </p:sp>
-      <p:sp>
-        <p:nvSpPr>
-          <p:cNvPr id="8" name="Footer Placeholder 7">
-            <a:extLst>
-              <a:ext uri="{FF2B5EF4-FFF2-40B4-BE49-F238E27FC236}">
-                <a16:creationId xmlns:a16="http://schemas.microsoft.com/office/drawing/2014/main" id="{0DF22318-747B-4EC9-862C-D9FD488CCCE9}"/>
+            <a:endParaRPr lang="en-US" dirty="0"/>
+          </a:p>
+        </p:txBody>
+      </p:sp>
+      <p:sp>
+        <p:nvSpPr>
+          <p:cNvPr id="8" name="Marcador de Posição do Rodapé 7">
+            <a:extLst>
+              <a:ext uri="{FF2B5EF4-FFF2-40B4-BE49-F238E27FC236}">
+                <a16:creationId xmlns:a16="http://schemas.microsoft.com/office/drawing/2014/main" id="{DF62250A-9798-9441-87A6-4E42969EB501}"/>
               </a:ext>
             </a:extLst>
           </p:cNvPr>
@@ -1871,16 +1860,16 @@
           <a:bodyPr/>
           <a:lstStyle/>
           <a:p>
-            <a:endParaRPr lang="en-US"/>
-          </a:p>
-        </p:txBody>
-      </p:sp>
-      <p:sp>
-        <p:nvSpPr>
-          <p:cNvPr id="9" name="Slide Number Placeholder 8">
-            <a:extLst>
-              <a:ext uri="{FF2B5EF4-FFF2-40B4-BE49-F238E27FC236}">
-                <a16:creationId xmlns:a16="http://schemas.microsoft.com/office/drawing/2014/main" id="{0CFBDDDF-16BD-438D-937D-0E3E30E74E86}"/>
+            <a:endParaRPr lang="en-US" dirty="0"/>
+          </a:p>
+        </p:txBody>
+      </p:sp>
+      <p:sp>
+        <p:nvSpPr>
+          <p:cNvPr id="9" name="Marcador de Posição do Número do Diapositivo 8">
+            <a:extLst>
+              <a:ext uri="{FF2B5EF4-FFF2-40B4-BE49-F238E27FC236}">
+                <a16:creationId xmlns:a16="http://schemas.microsoft.com/office/drawing/2014/main" id="{2F26B409-B173-9843-A1B7-D5267C53739A}"/>
               </a:ext>
             </a:extLst>
           </p:cNvPr>
@@ -1898,28 +1887,30 @@
           <a:p>
             <a:fld id="{73B850FF-6169-4056-8077-06FFA93A5366}" type="slidenum">
               <a:rPr lang="en-US" smtClean="0"/>
+              <a:pPr/>
               <a:t>‹nº›</a:t>
             </a:fld>
-            <a:endParaRPr lang="en-US"/>
+            <a:endParaRPr lang="en-US" dirty="0"/>
           </a:p>
         </p:txBody>
       </p:sp>
     </p:spTree>
     <p:extLst>
       <p:ext uri="{BB962C8B-B14F-4D97-AF65-F5344CB8AC3E}">
-        <p14:creationId xmlns:p14="http://schemas.microsoft.com/office/powerpoint/2010/main" val="3103130108"/>
+        <p14:creationId xmlns:p14="http://schemas.microsoft.com/office/powerpoint/2010/main" val="2277125152"/>
       </p:ext>
     </p:extLst>
   </p:cSld>
   <p:clrMapOvr>
     <a:masterClrMapping/>
   </p:clrMapOvr>
+  <p:hf sldNum="0" hdr="0" ftr="0" dt="0"/>
 </p:sldLayout>
 </file>
 
 <file path=ppt/slideLayouts/slideLayout6.xml><?xml version="1.0" encoding="utf-8"?>
 <p:sldLayout xmlns:a="http://schemas.openxmlformats.org/drawingml/2006/main" xmlns:r="http://schemas.openxmlformats.org/officeDocument/2006/relationships" xmlns:p="http://schemas.openxmlformats.org/presentationml/2006/main" type="titleOnly" preserve="1">
-  <p:cSld name="Title Only">
+  <p:cSld name="Só Título">
     <p:spTree>
       <p:nvGrpSpPr>
         <p:cNvPr id="1" name=""/>
@@ -1936,10 +1927,10 @@
       </p:grpSpPr>
       <p:sp>
         <p:nvSpPr>
-          <p:cNvPr id="2" name="Title 1">
-            <a:extLst>
-              <a:ext uri="{FF2B5EF4-FFF2-40B4-BE49-F238E27FC236}">
-                <a16:creationId xmlns:a16="http://schemas.microsoft.com/office/drawing/2014/main" id="{35792D5F-0BD4-4517-9233-E08AF405B6DE}"/>
+          <p:cNvPr id="2" name="Título 1">
+            <a:extLst>
+              <a:ext uri="{FF2B5EF4-FFF2-40B4-BE49-F238E27FC236}">
+                <a16:creationId xmlns:a16="http://schemas.microsoft.com/office/drawing/2014/main" id="{BDEA5E0D-8AEC-3C48-BFED-A1D2778D7CC4}"/>
               </a:ext>
             </a:extLst>
           </p:cNvPr>
@@ -1950,29 +1941,24 @@
             <p:ph type="title"/>
           </p:nvPr>
         </p:nvSpPr>
-        <p:spPr>
-          <a:xfrm>
-            <a:off x="838200" y="365760"/>
-            <a:ext cx="10515600" cy="1325563"/>
-          </a:xfrm>
-        </p:spPr>
+        <p:spPr/>
         <p:txBody>
           <a:bodyPr/>
           <a:lstStyle/>
           <a:p>
             <a:r>
-              <a:rPr lang="en-US"/>
-              <a:t>Click to edit Master title style</a:t>
-            </a:r>
-          </a:p>
-        </p:txBody>
-      </p:sp>
-      <p:sp>
-        <p:nvSpPr>
-          <p:cNvPr id="3" name="Date Placeholder 2">
-            <a:extLst>
-              <a:ext uri="{FF2B5EF4-FFF2-40B4-BE49-F238E27FC236}">
-                <a16:creationId xmlns:a16="http://schemas.microsoft.com/office/drawing/2014/main" id="{B83523B8-51E3-48B8-BFD8-CE950619804E}"/>
+              <a:rPr lang="pt-PT"/>
+              <a:t>Clique para editar o estilo de título do Modelo Global</a:t>
+            </a:r>
+          </a:p>
+        </p:txBody>
+      </p:sp>
+      <p:sp>
+        <p:nvSpPr>
+          <p:cNvPr id="3" name="Marcador de Posição da Data 2">
+            <a:extLst>
+              <a:ext uri="{FF2B5EF4-FFF2-40B4-BE49-F238E27FC236}">
+                <a16:creationId xmlns:a16="http://schemas.microsoft.com/office/drawing/2014/main" id="{C17E0032-1666-BB4F-8528-B3F862E8DD00}"/>
               </a:ext>
             </a:extLst>
           </p:cNvPr>
@@ -1988,20 +1974,21 @@
           <a:bodyPr/>
           <a:lstStyle/>
           <a:p>
-            <a:fld id="{3AB41CFF-90C9-47B3-9DA1-F2BF8D839F7E}" type="datetime1">
+            <a:fld id="{57E0CF6C-748E-4B7A-BC8B-3011EF78ED13}" type="datetime1">
               <a:rPr lang="en-US" smtClean="0"/>
+              <a:pPr/>
               <a:t>2/5/21</a:t>
             </a:fld>
-            <a:endParaRPr lang="en-US"/>
-          </a:p>
-        </p:txBody>
-      </p:sp>
-      <p:sp>
-        <p:nvSpPr>
-          <p:cNvPr id="4" name="Footer Placeholder 3">
-            <a:extLst>
-              <a:ext uri="{FF2B5EF4-FFF2-40B4-BE49-F238E27FC236}">
-                <a16:creationId xmlns:a16="http://schemas.microsoft.com/office/drawing/2014/main" id="{7D739B90-5D50-4424-B51D-53C391621869}"/>
+            <a:endParaRPr lang="en-US" dirty="0"/>
+          </a:p>
+        </p:txBody>
+      </p:sp>
+      <p:sp>
+        <p:nvSpPr>
+          <p:cNvPr id="4" name="Marcador de Posição do Rodapé 3">
+            <a:extLst>
+              <a:ext uri="{FF2B5EF4-FFF2-40B4-BE49-F238E27FC236}">
+                <a16:creationId xmlns:a16="http://schemas.microsoft.com/office/drawing/2014/main" id="{873811D6-17C7-034E-8130-EECAE8CDFB95}"/>
               </a:ext>
             </a:extLst>
           </p:cNvPr>
@@ -2017,16 +2004,16 @@
           <a:bodyPr/>
           <a:lstStyle/>
           <a:p>
-            <a:endParaRPr lang="en-US"/>
-          </a:p>
-        </p:txBody>
-      </p:sp>
-      <p:sp>
-        <p:nvSpPr>
-          <p:cNvPr id="5" name="Slide Number Placeholder 4">
-            <a:extLst>
-              <a:ext uri="{FF2B5EF4-FFF2-40B4-BE49-F238E27FC236}">
-                <a16:creationId xmlns:a16="http://schemas.microsoft.com/office/drawing/2014/main" id="{216F9286-3A00-4D3C-A3F0-50AC9045C4E1}"/>
+            <a:endParaRPr lang="en-US" dirty="0"/>
+          </a:p>
+        </p:txBody>
+      </p:sp>
+      <p:sp>
+        <p:nvSpPr>
+          <p:cNvPr id="5" name="Marcador de Posição do Número do Diapositivo 4">
+            <a:extLst>
+              <a:ext uri="{FF2B5EF4-FFF2-40B4-BE49-F238E27FC236}">
+                <a16:creationId xmlns:a16="http://schemas.microsoft.com/office/drawing/2014/main" id="{EE62B930-E1C9-CE41-B060-AA921B653BAC}"/>
               </a:ext>
             </a:extLst>
           </p:cNvPr>
@@ -2044,28 +2031,30 @@
           <a:p>
             <a:fld id="{73B850FF-6169-4056-8077-06FFA93A5366}" type="slidenum">
               <a:rPr lang="en-US" smtClean="0"/>
+              <a:pPr/>
               <a:t>‹nº›</a:t>
             </a:fld>
-            <a:endParaRPr lang="en-US"/>
+            <a:endParaRPr lang="en-US" dirty="0"/>
           </a:p>
         </p:txBody>
       </p:sp>
     </p:spTree>
     <p:extLst>
       <p:ext uri="{BB962C8B-B14F-4D97-AF65-F5344CB8AC3E}">
-        <p14:creationId xmlns:p14="http://schemas.microsoft.com/office/powerpoint/2010/main" val="985380814"/>
+        <p14:creationId xmlns:p14="http://schemas.microsoft.com/office/powerpoint/2010/main" val="3704901947"/>
       </p:ext>
     </p:extLst>
   </p:cSld>
   <p:clrMapOvr>
     <a:masterClrMapping/>
   </p:clrMapOvr>
+  <p:hf sldNum="0" hdr="0" ftr="0" dt="0"/>
 </p:sldLayout>
 </file>
 
 <file path=ppt/slideLayouts/slideLayout7.xml><?xml version="1.0" encoding="utf-8"?>
 <p:sldLayout xmlns:a="http://schemas.openxmlformats.org/drawingml/2006/main" xmlns:r="http://schemas.openxmlformats.org/officeDocument/2006/relationships" xmlns:p="http://schemas.openxmlformats.org/presentationml/2006/main" type="blank" preserve="1">
-  <p:cSld name="Blank">
+  <p:cSld name="Em branco">
     <p:spTree>
       <p:nvGrpSpPr>
         <p:cNvPr id="1" name=""/>
@@ -2082,10 +2071,10 @@
       </p:grpSpPr>
       <p:sp>
         <p:nvSpPr>
-          <p:cNvPr id="2" name="Date Placeholder 1">
-            <a:extLst>
-              <a:ext uri="{FF2B5EF4-FFF2-40B4-BE49-F238E27FC236}">
-                <a16:creationId xmlns:a16="http://schemas.microsoft.com/office/drawing/2014/main" id="{72933BE2-665A-42DA-A3B7-835F81A3F46B}"/>
+          <p:cNvPr id="2" name="Marcador de Posição da Data 1">
+            <a:extLst>
+              <a:ext uri="{FF2B5EF4-FFF2-40B4-BE49-F238E27FC236}">
+                <a16:creationId xmlns:a16="http://schemas.microsoft.com/office/drawing/2014/main" id="{4DF6CF41-5D89-604F-BF67-37D124A829AB}"/>
               </a:ext>
             </a:extLst>
           </p:cNvPr>
@@ -2101,20 +2090,21 @@
           <a:bodyPr/>
           <a:lstStyle/>
           <a:p>
-            <a:fld id="{F06048FA-06AB-4884-A69B-986B96E68A24}" type="datetime1">
+            <a:fld id="{57E0CF6C-748E-4B7A-BC8B-3011EF78ED13}" type="datetime1">
               <a:rPr lang="en-US" smtClean="0"/>
+              <a:pPr/>
               <a:t>2/5/21</a:t>
             </a:fld>
-            <a:endParaRPr lang="en-US"/>
-          </a:p>
-        </p:txBody>
-      </p:sp>
-      <p:sp>
-        <p:nvSpPr>
-          <p:cNvPr id="3" name="Footer Placeholder 2">
-            <a:extLst>
-              <a:ext uri="{FF2B5EF4-FFF2-40B4-BE49-F238E27FC236}">
-                <a16:creationId xmlns:a16="http://schemas.microsoft.com/office/drawing/2014/main" id="{634DBCBD-AD42-432D-ABA9-20D616AF3ED7}"/>
+            <a:endParaRPr lang="en-US" dirty="0"/>
+          </a:p>
+        </p:txBody>
+      </p:sp>
+      <p:sp>
+        <p:nvSpPr>
+          <p:cNvPr id="3" name="Marcador de Posição do Rodapé 2">
+            <a:extLst>
+              <a:ext uri="{FF2B5EF4-FFF2-40B4-BE49-F238E27FC236}">
+                <a16:creationId xmlns:a16="http://schemas.microsoft.com/office/drawing/2014/main" id="{5404B5AC-D1F3-6647-AC0D-7705B636160E}"/>
               </a:ext>
             </a:extLst>
           </p:cNvPr>
@@ -2130,16 +2120,16 @@
           <a:bodyPr/>
           <a:lstStyle/>
           <a:p>
-            <a:endParaRPr lang="en-US"/>
-          </a:p>
-        </p:txBody>
-      </p:sp>
-      <p:sp>
-        <p:nvSpPr>
-          <p:cNvPr id="4" name="Slide Number Placeholder 3">
-            <a:extLst>
-              <a:ext uri="{FF2B5EF4-FFF2-40B4-BE49-F238E27FC236}">
-                <a16:creationId xmlns:a16="http://schemas.microsoft.com/office/drawing/2014/main" id="{EE140251-3596-4673-B24B-59A6F9ED8FB3}"/>
+            <a:endParaRPr lang="en-US" dirty="0"/>
+          </a:p>
+        </p:txBody>
+      </p:sp>
+      <p:sp>
+        <p:nvSpPr>
+          <p:cNvPr id="4" name="Marcador de Posição do Número do Diapositivo 3">
+            <a:extLst>
+              <a:ext uri="{FF2B5EF4-FFF2-40B4-BE49-F238E27FC236}">
+                <a16:creationId xmlns:a16="http://schemas.microsoft.com/office/drawing/2014/main" id="{25021B14-6390-0742-853C-B0495B261186}"/>
               </a:ext>
             </a:extLst>
           </p:cNvPr>
@@ -2157,28 +2147,30 @@
           <a:p>
             <a:fld id="{73B850FF-6169-4056-8077-06FFA93A5366}" type="slidenum">
               <a:rPr lang="en-US" smtClean="0"/>
+              <a:pPr/>
               <a:t>‹nº›</a:t>
             </a:fld>
-            <a:endParaRPr lang="en-US"/>
+            <a:endParaRPr lang="en-US" dirty="0"/>
           </a:p>
         </p:txBody>
       </p:sp>
     </p:spTree>
     <p:extLst>
       <p:ext uri="{BB962C8B-B14F-4D97-AF65-F5344CB8AC3E}">
-        <p14:creationId xmlns:p14="http://schemas.microsoft.com/office/powerpoint/2010/main" val="172658733"/>
+        <p14:creationId xmlns:p14="http://schemas.microsoft.com/office/powerpoint/2010/main" val="2267198158"/>
       </p:ext>
     </p:extLst>
   </p:cSld>
   <p:clrMapOvr>
     <a:masterClrMapping/>
   </p:clrMapOvr>
+  <p:hf sldNum="0" hdr="0" ftr="0" dt="0"/>
 </p:sldLayout>
 </file>
 
 <file path=ppt/slideLayouts/slideLayout8.xml><?xml version="1.0" encoding="utf-8"?>
 <p:sldLayout xmlns:a="http://schemas.openxmlformats.org/drawingml/2006/main" xmlns:r="http://schemas.openxmlformats.org/officeDocument/2006/relationships" xmlns:p="http://schemas.openxmlformats.org/presentationml/2006/main" type="objTx" preserve="1">
-  <p:cSld name="Content with Caption">
+  <p:cSld name="Conteúdo com Legenda">
     <p:spTree>
       <p:nvGrpSpPr>
         <p:cNvPr id="1" name=""/>
@@ -2195,10 +2187,10 @@
       </p:grpSpPr>
       <p:sp>
         <p:nvSpPr>
-          <p:cNvPr id="2" name="Title 1">
-            <a:extLst>
-              <a:ext uri="{FF2B5EF4-FFF2-40B4-BE49-F238E27FC236}">
-                <a16:creationId xmlns:a16="http://schemas.microsoft.com/office/drawing/2014/main" id="{2D6A81A1-6D8E-4DD6-8E49-DABDE6D107E4}"/>
+          <p:cNvPr id="2" name="Título 1">
+            <a:extLst>
+              <a:ext uri="{FF2B5EF4-FFF2-40B4-BE49-F238E27FC236}">
+                <a16:creationId xmlns:a16="http://schemas.microsoft.com/office/drawing/2014/main" id="{E3E214A6-3447-9942-A685-796C73044CF0}"/>
               </a:ext>
             </a:extLst>
           </p:cNvPr>
@@ -2224,18 +2216,18 @@
           </a:lstStyle>
           <a:p>
             <a:r>
-              <a:rPr lang="en-US"/>
-              <a:t>Click to edit Master title style</a:t>
-            </a:r>
-          </a:p>
-        </p:txBody>
-      </p:sp>
-      <p:sp>
-        <p:nvSpPr>
-          <p:cNvPr id="3" name="Content Placeholder 2">
-            <a:extLst>
-              <a:ext uri="{FF2B5EF4-FFF2-40B4-BE49-F238E27FC236}">
-                <a16:creationId xmlns:a16="http://schemas.microsoft.com/office/drawing/2014/main" id="{1693F18F-F78D-4A31-A6BC-6552105BCFDA}"/>
+              <a:rPr lang="pt-PT"/>
+              <a:t>Clique para editar o estilo de título do Modelo Global</a:t>
+            </a:r>
+          </a:p>
+        </p:txBody>
+      </p:sp>
+      <p:sp>
+        <p:nvSpPr>
+          <p:cNvPr id="3" name="Marcador de Posição de Conteúdo 2">
+            <a:extLst>
+              <a:ext uri="{FF2B5EF4-FFF2-40B4-BE49-F238E27FC236}">
+                <a16:creationId xmlns:a16="http://schemas.microsoft.com/office/drawing/2014/main" id="{79DE2EB2-9192-D546-89F6-C27D69888962}"/>
               </a:ext>
             </a:extLst>
           </p:cNvPr>
@@ -2286,46 +2278,46 @@
           <a:p>
             <a:pPr lvl="0"/>
             <a:r>
-              <a:rPr lang="en-US"/>
-              <a:t>Click to edit Master text styles</a:t>
+              <a:rPr lang="pt-PT"/>
+              <a:t>Clique para editar os estilos do texto de Modelo Global</a:t>
             </a:r>
           </a:p>
           <a:p>
             <a:pPr lvl="1"/>
             <a:r>
-              <a:rPr lang="en-US"/>
-              <a:t>Second level</a:t>
+              <a:rPr lang="pt-PT"/>
+              <a:t>Segundo nível</a:t>
             </a:r>
           </a:p>
           <a:p>
             <a:pPr lvl="2"/>
             <a:r>
-              <a:rPr lang="en-US"/>
-              <a:t>Third level</a:t>
+              <a:rPr lang="pt-PT"/>
+              <a:t>Terceiro nível</a:t>
             </a:r>
           </a:p>
           <a:p>
             <a:pPr lvl="3"/>
             <a:r>
-              <a:rPr lang="en-US"/>
-              <a:t>Fourth level</a:t>
+              <a:rPr lang="pt-PT"/>
+              <a:t>Quarto nível</a:t>
             </a:r>
           </a:p>
           <a:p>
             <a:pPr lvl="4"/>
             <a:r>
-              <a:rPr lang="en-US"/>
-              <a:t>Fifth level</a:t>
-            </a:r>
-          </a:p>
-        </p:txBody>
-      </p:sp>
-      <p:sp>
-        <p:nvSpPr>
-          <p:cNvPr id="4" name="Text Placeholder 3">
-            <a:extLst>
-              <a:ext uri="{FF2B5EF4-FFF2-40B4-BE49-F238E27FC236}">
-                <a16:creationId xmlns:a16="http://schemas.microsoft.com/office/drawing/2014/main" id="{8582C2F4-BDF4-4A4F-AA3D-52692932C24C}"/>
+              <a:rPr lang="pt-PT"/>
+              <a:t>Quinto nível</a:t>
+            </a:r>
+          </a:p>
+        </p:txBody>
+      </p:sp>
+      <p:sp>
+        <p:nvSpPr>
+          <p:cNvPr id="4" name="Marcador de Posição do Texto 3">
+            <a:extLst>
+              <a:ext uri="{FF2B5EF4-FFF2-40B4-BE49-F238E27FC236}">
+                <a16:creationId xmlns:a16="http://schemas.microsoft.com/office/drawing/2014/main" id="{FCEFC953-1F87-B942-AF52-9A8D067E057E}"/>
               </a:ext>
             </a:extLst>
           </p:cNvPr>
@@ -2385,18 +2377,18 @@
           <a:p>
             <a:pPr lvl="0"/>
             <a:r>
-              <a:rPr lang="en-US"/>
-              <a:t>Click to edit Master text styles</a:t>
-            </a:r>
-          </a:p>
-        </p:txBody>
-      </p:sp>
-      <p:sp>
-        <p:nvSpPr>
-          <p:cNvPr id="5" name="Date Placeholder 4">
-            <a:extLst>
-              <a:ext uri="{FF2B5EF4-FFF2-40B4-BE49-F238E27FC236}">
-                <a16:creationId xmlns:a16="http://schemas.microsoft.com/office/drawing/2014/main" id="{0113850F-5C87-4F08-9658-EAF049B60EB0}"/>
+              <a:rPr lang="pt-PT"/>
+              <a:t>Clique para editar os estilos do texto de Modelo Global</a:t>
+            </a:r>
+          </a:p>
+        </p:txBody>
+      </p:sp>
+      <p:sp>
+        <p:nvSpPr>
+          <p:cNvPr id="5" name="Marcador de Posição da Data 4">
+            <a:extLst>
+              <a:ext uri="{FF2B5EF4-FFF2-40B4-BE49-F238E27FC236}">
+                <a16:creationId xmlns:a16="http://schemas.microsoft.com/office/drawing/2014/main" id="{4CF22732-7DA7-DF4D-BC22-76FF9AF65B4A}"/>
               </a:ext>
             </a:extLst>
           </p:cNvPr>
@@ -2412,20 +2404,21 @@
           <a:bodyPr/>
           <a:lstStyle/>
           <a:p>
-            <a:fld id="{50DB7ABA-0172-4F9C-889D-567164F66BCD}" type="datetime1">
+            <a:fld id="{57E0CF6C-748E-4B7A-BC8B-3011EF78ED13}" type="datetime1">
               <a:rPr lang="en-US" smtClean="0"/>
+              <a:pPr/>
               <a:t>2/5/21</a:t>
             </a:fld>
-            <a:endParaRPr lang="en-US"/>
-          </a:p>
-        </p:txBody>
-      </p:sp>
-      <p:sp>
-        <p:nvSpPr>
-          <p:cNvPr id="6" name="Footer Placeholder 5">
-            <a:extLst>
-              <a:ext uri="{FF2B5EF4-FFF2-40B4-BE49-F238E27FC236}">
-                <a16:creationId xmlns:a16="http://schemas.microsoft.com/office/drawing/2014/main" id="{210BCE9A-A746-4439-B5D3-966FBC8E5FC2}"/>
+            <a:endParaRPr lang="en-US" dirty="0"/>
+          </a:p>
+        </p:txBody>
+      </p:sp>
+      <p:sp>
+        <p:nvSpPr>
+          <p:cNvPr id="6" name="Marcador de Posição do Rodapé 5">
+            <a:extLst>
+              <a:ext uri="{FF2B5EF4-FFF2-40B4-BE49-F238E27FC236}">
+                <a16:creationId xmlns:a16="http://schemas.microsoft.com/office/drawing/2014/main" id="{1A55161B-B5BA-A148-913F-3B2EC6C62FC0}"/>
               </a:ext>
             </a:extLst>
           </p:cNvPr>
@@ -2441,16 +2434,16 @@
           <a:bodyPr/>
           <a:lstStyle/>
           <a:p>
-            <a:endParaRPr lang="en-US"/>
-          </a:p>
-        </p:txBody>
-      </p:sp>
-      <p:sp>
-        <p:nvSpPr>
-          <p:cNvPr id="7" name="Slide Number Placeholder 6">
-            <a:extLst>
-              <a:ext uri="{FF2B5EF4-FFF2-40B4-BE49-F238E27FC236}">
-                <a16:creationId xmlns:a16="http://schemas.microsoft.com/office/drawing/2014/main" id="{E41D3B51-AA2E-4AA1-8062-A0D476D80CCB}"/>
+            <a:endParaRPr lang="en-US" dirty="0"/>
+          </a:p>
+        </p:txBody>
+      </p:sp>
+      <p:sp>
+        <p:nvSpPr>
+          <p:cNvPr id="7" name="Marcador de Posição do Número do Diapositivo 6">
+            <a:extLst>
+              <a:ext uri="{FF2B5EF4-FFF2-40B4-BE49-F238E27FC236}">
+                <a16:creationId xmlns:a16="http://schemas.microsoft.com/office/drawing/2014/main" id="{07F10A2A-D4EF-D845-971C-061BAF1A6A55}"/>
               </a:ext>
             </a:extLst>
           </p:cNvPr>
@@ -2468,28 +2461,30 @@
           <a:p>
             <a:fld id="{73B850FF-6169-4056-8077-06FFA93A5366}" type="slidenum">
               <a:rPr lang="en-US" smtClean="0"/>
+              <a:pPr/>
               <a:t>‹nº›</a:t>
             </a:fld>
-            <a:endParaRPr lang="en-US"/>
+            <a:endParaRPr lang="en-US" dirty="0"/>
           </a:p>
         </p:txBody>
       </p:sp>
     </p:spTree>
     <p:extLst>
       <p:ext uri="{BB962C8B-B14F-4D97-AF65-F5344CB8AC3E}">
-        <p14:creationId xmlns:p14="http://schemas.microsoft.com/office/powerpoint/2010/main" val="371845844"/>
+        <p14:creationId xmlns:p14="http://schemas.microsoft.com/office/powerpoint/2010/main" val="2889794348"/>
       </p:ext>
     </p:extLst>
   </p:cSld>
   <p:clrMapOvr>
     <a:masterClrMapping/>
   </p:clrMapOvr>
+  <p:hf sldNum="0" hdr="0" ftr="0" dt="0"/>
 </p:sldLayout>
 </file>
 
 <file path=ppt/slideLayouts/slideLayout9.xml><?xml version="1.0" encoding="utf-8"?>
 <p:sldLayout xmlns:a="http://schemas.openxmlformats.org/drawingml/2006/main" xmlns:r="http://schemas.openxmlformats.org/officeDocument/2006/relationships" xmlns:p="http://schemas.openxmlformats.org/presentationml/2006/main" type="picTx" preserve="1">
-  <p:cSld name="Picture with Caption">
+  <p:cSld name="Imagem com Legenda">
     <p:spTree>
       <p:nvGrpSpPr>
         <p:cNvPr id="1" name=""/>
@@ -2506,10 +2501,10 @@
       </p:grpSpPr>
       <p:sp>
         <p:nvSpPr>
-          <p:cNvPr id="2" name="Title 1">
-            <a:extLst>
-              <a:ext uri="{FF2B5EF4-FFF2-40B4-BE49-F238E27FC236}">
-                <a16:creationId xmlns:a16="http://schemas.microsoft.com/office/drawing/2014/main" id="{4ED02CF7-F453-4B3E-9510-D747979878A9}"/>
+          <p:cNvPr id="2" name="Título 1">
+            <a:extLst>
+              <a:ext uri="{FF2B5EF4-FFF2-40B4-BE49-F238E27FC236}">
+                <a16:creationId xmlns:a16="http://schemas.microsoft.com/office/drawing/2014/main" id="{D99FE781-F7E6-5B49-8712-46B0C3A454A6}"/>
               </a:ext>
             </a:extLst>
           </p:cNvPr>
@@ -2535,18 +2530,18 @@
           </a:lstStyle>
           <a:p>
             <a:r>
-              <a:rPr lang="en-US"/>
-              <a:t>Click to edit Master title style</a:t>
-            </a:r>
-          </a:p>
-        </p:txBody>
-      </p:sp>
-      <p:sp>
-        <p:nvSpPr>
-          <p:cNvPr id="3" name="Picture Placeholder 2">
-            <a:extLst>
-              <a:ext uri="{FF2B5EF4-FFF2-40B4-BE49-F238E27FC236}">
-                <a16:creationId xmlns:a16="http://schemas.microsoft.com/office/drawing/2014/main" id="{63E2A1B9-8A2A-4B49-8B79-76D3EEB36B43}"/>
+              <a:rPr lang="pt-PT"/>
+              <a:t>Clique para editar o estilo de título do Modelo Global</a:t>
+            </a:r>
+          </a:p>
+        </p:txBody>
+      </p:sp>
+      <p:sp>
+        <p:nvSpPr>
+          <p:cNvPr id="3" name="Marcador de Posição da Imagem 2">
+            <a:extLst>
+              <a:ext uri="{FF2B5EF4-FFF2-40B4-BE49-F238E27FC236}">
+                <a16:creationId xmlns:a16="http://schemas.microsoft.com/office/drawing/2014/main" id="{76B3D4C6-1523-0D4D-91A7-C71F3F404715}"/>
               </a:ext>
             </a:extLst>
           </p:cNvPr>
@@ -2604,19 +2599,16 @@
             </a:lvl9pPr>
           </a:lstStyle>
           <a:p>
-            <a:r>
-              <a:rPr lang="en-US"/>
-              <a:t>Click icon to add picture</a:t>
-            </a:r>
-          </a:p>
-        </p:txBody>
-      </p:sp>
-      <p:sp>
-        <p:nvSpPr>
-          <p:cNvPr id="4" name="Text Placeholder 3">
-            <a:extLst>
-              <a:ext uri="{FF2B5EF4-FFF2-40B4-BE49-F238E27FC236}">
-                <a16:creationId xmlns:a16="http://schemas.microsoft.com/office/drawing/2014/main" id="{BD9FEA03-0EC4-4085-AE63-4AA492D61A97}"/>
+            <a:endParaRPr lang="pt-PT"/>
+          </a:p>
+        </p:txBody>
+      </p:sp>
+      <p:sp>
+        <p:nvSpPr>
+          <p:cNvPr id="4" name="Marcador de Posição do Texto 3">
+            <a:extLst>
+              <a:ext uri="{FF2B5EF4-FFF2-40B4-BE49-F238E27FC236}">
+                <a16:creationId xmlns:a16="http://schemas.microsoft.com/office/drawing/2014/main" id="{153BD6E8-D6C5-A34D-8F2B-A582BB61C34C}"/>
               </a:ext>
             </a:extLst>
           </p:cNvPr>
@@ -2676,18 +2668,18 @@
           <a:p>
             <a:pPr lvl="0"/>
             <a:r>
-              <a:rPr lang="en-US"/>
-              <a:t>Click to edit Master text styles</a:t>
-            </a:r>
-          </a:p>
-        </p:txBody>
-      </p:sp>
-      <p:sp>
-        <p:nvSpPr>
-          <p:cNvPr id="5" name="Date Placeholder 4">
-            <a:extLst>
-              <a:ext uri="{FF2B5EF4-FFF2-40B4-BE49-F238E27FC236}">
-                <a16:creationId xmlns:a16="http://schemas.microsoft.com/office/drawing/2014/main" id="{9605AD5B-0DEA-4C6F-94D2-FAA99F2E5DA9}"/>
+              <a:rPr lang="pt-PT"/>
+              <a:t>Clique para editar os estilos do texto de Modelo Global</a:t>
+            </a:r>
+          </a:p>
+        </p:txBody>
+      </p:sp>
+      <p:sp>
+        <p:nvSpPr>
+          <p:cNvPr id="5" name="Marcador de Posição da Data 4">
+            <a:extLst>
+              <a:ext uri="{FF2B5EF4-FFF2-40B4-BE49-F238E27FC236}">
+                <a16:creationId xmlns:a16="http://schemas.microsoft.com/office/drawing/2014/main" id="{F401B835-A2B4-C641-8CB0-F19C3CC1D86D}"/>
               </a:ext>
             </a:extLst>
           </p:cNvPr>
@@ -2703,20 +2695,21 @@
           <a:bodyPr/>
           <a:lstStyle/>
           <a:p>
-            <a:fld id="{78AC6A5B-8AE7-4A41-B5A7-9ADC6686DC18}" type="datetime1">
+            <a:fld id="{57E0CF6C-748E-4B7A-BC8B-3011EF78ED13}" type="datetime1">
               <a:rPr lang="en-US" smtClean="0"/>
+              <a:pPr/>
               <a:t>2/5/21</a:t>
             </a:fld>
-            <a:endParaRPr lang="en-US"/>
-          </a:p>
-        </p:txBody>
-      </p:sp>
-      <p:sp>
-        <p:nvSpPr>
-          <p:cNvPr id="6" name="Footer Placeholder 5">
-            <a:extLst>
-              <a:ext uri="{FF2B5EF4-FFF2-40B4-BE49-F238E27FC236}">
-                <a16:creationId xmlns:a16="http://schemas.microsoft.com/office/drawing/2014/main" id="{F0DC6744-7CBA-4A1D-8F87-10699F9812F3}"/>
+            <a:endParaRPr lang="en-US" dirty="0"/>
+          </a:p>
+        </p:txBody>
+      </p:sp>
+      <p:sp>
+        <p:nvSpPr>
+          <p:cNvPr id="6" name="Marcador de Posição do Rodapé 5">
+            <a:extLst>
+              <a:ext uri="{FF2B5EF4-FFF2-40B4-BE49-F238E27FC236}">
+                <a16:creationId xmlns:a16="http://schemas.microsoft.com/office/drawing/2014/main" id="{ECEDFBFE-9C3D-0C43-B59C-049A6B26B329}"/>
               </a:ext>
             </a:extLst>
           </p:cNvPr>
@@ -2732,16 +2725,16 @@
           <a:bodyPr/>
           <a:lstStyle/>
           <a:p>
-            <a:endParaRPr lang="en-US"/>
-          </a:p>
-        </p:txBody>
-      </p:sp>
-      <p:sp>
-        <p:nvSpPr>
-          <p:cNvPr id="7" name="Slide Number Placeholder 6">
-            <a:extLst>
-              <a:ext uri="{FF2B5EF4-FFF2-40B4-BE49-F238E27FC236}">
-                <a16:creationId xmlns:a16="http://schemas.microsoft.com/office/drawing/2014/main" id="{DEAD9048-35FF-4BE9-8157-BE4BAA1C7251}"/>
+            <a:endParaRPr lang="en-US" dirty="0"/>
+          </a:p>
+        </p:txBody>
+      </p:sp>
+      <p:sp>
+        <p:nvSpPr>
+          <p:cNvPr id="7" name="Marcador de Posição do Número do Diapositivo 6">
+            <a:extLst>
+              <a:ext uri="{FF2B5EF4-FFF2-40B4-BE49-F238E27FC236}">
+                <a16:creationId xmlns:a16="http://schemas.microsoft.com/office/drawing/2014/main" id="{E7B3962D-3381-1248-9B28-338286BF6884}"/>
               </a:ext>
             </a:extLst>
           </p:cNvPr>
@@ -2759,22 +2752,24 @@
           <a:p>
             <a:fld id="{73B850FF-6169-4056-8077-06FFA93A5366}" type="slidenum">
               <a:rPr lang="en-US" smtClean="0"/>
+              <a:pPr/>
               <a:t>‹nº›</a:t>
             </a:fld>
-            <a:endParaRPr lang="en-US"/>
+            <a:endParaRPr lang="en-US" dirty="0"/>
           </a:p>
         </p:txBody>
       </p:sp>
     </p:spTree>
     <p:extLst>
       <p:ext uri="{BB962C8B-B14F-4D97-AF65-F5344CB8AC3E}">
-        <p14:creationId xmlns:p14="http://schemas.microsoft.com/office/powerpoint/2010/main" val="3519735908"/>
+        <p14:creationId xmlns:p14="http://schemas.microsoft.com/office/powerpoint/2010/main" val="815148582"/>
       </p:ext>
     </p:extLst>
   </p:cSld>
   <p:clrMapOvr>
     <a:masterClrMapping/>
   </p:clrMapOvr>
+  <p:hf sldNum="0" hdr="0" ftr="0" dt="0"/>
 </p:sldLayout>
 </file>
 
@@ -2802,126 +2797,23 @@
       </p:grpSpPr>
       <p:sp>
         <p:nvSpPr>
-          <p:cNvPr id="12" name="Rectangle 11">
-            <a:extLst>
-              <a:ext uri="{FF2B5EF4-FFF2-40B4-BE49-F238E27FC236}">
-                <a16:creationId xmlns:a16="http://schemas.microsoft.com/office/drawing/2014/main" id="{0BABF38A-8A0D-492E-BD20-6CF4D46B50BD}"/>
-              </a:ext>
-              <a:ext uri="{C183D7F6-B498-43B3-948B-1728B52AA6E4}">
-                <adec:decorative xmlns:adec="http://schemas.microsoft.com/office/drawing/2017/decorative" val="1"/>
-              </a:ext>
-            </a:extLst>
-          </p:cNvPr>
-          <p:cNvSpPr/>
-          <p:nvPr/>
+          <p:cNvPr id="2" name="Marcador de Posição do Título 1">
+            <a:extLst>
+              <a:ext uri="{FF2B5EF4-FFF2-40B4-BE49-F238E27FC236}">
+                <a16:creationId xmlns:a16="http://schemas.microsoft.com/office/drawing/2014/main" id="{D9177D3C-FC94-654D-B84B-CD7477AA678C}"/>
+              </a:ext>
+            </a:extLst>
+          </p:cNvPr>
+          <p:cNvSpPr>
+            <a:spLocks noGrp="1"/>
+          </p:cNvSpPr>
+          <p:nvPr>
+            <p:ph type="title"/>
+          </p:nvPr>
         </p:nvSpPr>
         <p:spPr>
           <a:xfrm>
-            <a:off x="0" y="1"/>
-            <a:ext cx="12192000" cy="6858004"/>
-          </a:xfrm>
-          <a:prstGeom prst="rect">
-            <a:avLst/>
-          </a:prstGeom>
-          <a:solidFill>
-            <a:schemeClr val="tx2">
-              <a:lumMod val="90000"/>
-              <a:lumOff val="10000"/>
-            </a:schemeClr>
-          </a:solidFill>
-          <a:ln>
-            <a:noFill/>
-          </a:ln>
-        </p:spPr>
-        <p:style>
-          <a:lnRef idx="2">
-            <a:schemeClr val="accent1">
-              <a:shade val="50000"/>
-            </a:schemeClr>
-          </a:lnRef>
-          <a:fillRef idx="1">
-            <a:schemeClr val="accent1"/>
-          </a:fillRef>
-          <a:effectRef idx="0">
-            <a:schemeClr val="accent1"/>
-          </a:effectRef>
-          <a:fontRef idx="minor">
-            <a:schemeClr val="lt1"/>
-          </a:fontRef>
-        </p:style>
-        <p:txBody>
-          <a:bodyPr rtlCol="0" anchor="ctr"/>
-          <a:lstStyle/>
-          <a:p>
-            <a:pPr algn="ctr"/>
-            <a:endParaRPr lang="en-US" dirty="0">
-              <a:solidFill>
-                <a:schemeClr val="tx1">
-                  <a:lumMod val="65000"/>
-                  <a:lumOff val="35000"/>
-                </a:schemeClr>
-              </a:solidFill>
-              <a:latin typeface="AvenirNext LT Pro Medium" panose="020B0504020202020204" pitchFamily="34" charset="0"/>
-            </a:endParaRPr>
-          </a:p>
-        </p:txBody>
-      </p:sp>
-      <p:pic>
-        <p:nvPicPr>
-          <p:cNvPr id="40" name="Picture 39">
-            <a:extLst>
-              <a:ext uri="{FF2B5EF4-FFF2-40B4-BE49-F238E27FC236}">
-                <a16:creationId xmlns:a16="http://schemas.microsoft.com/office/drawing/2014/main" id="{1CB7E8AE-A3AC-4BB7-A5C6-F00EC697B265}"/>
-              </a:ext>
-            </a:extLst>
-          </p:cNvPr>
-          <p:cNvPicPr>
-            <a:picLocks noChangeAspect="1"/>
-          </p:cNvPicPr>
-          <p:nvPr/>
-        </p:nvPicPr>
-        <p:blipFill>
-          <a:blip r:embed="rId13">
-            <a:alphaModFix amt="35000"/>
-            <a:extLst>
-              <a:ext uri="{28A0092B-C50C-407E-A947-70E740481C1C}">
-                <a14:useLocalDpi xmlns:a14="http://schemas.microsoft.com/office/drawing/2010/main" val="0"/>
-              </a:ext>
-            </a:extLst>
-          </a:blip>
-          <a:stretch>
-            <a:fillRect/>
-          </a:stretch>
-        </p:blipFill>
-        <p:spPr>
-          <a:xfrm>
-            <a:off x="0" y="1"/>
-            <a:ext cx="12192000" cy="1392401"/>
-          </a:xfrm>
-          <a:prstGeom prst="rect">
-            <a:avLst/>
-          </a:prstGeom>
-        </p:spPr>
-      </p:pic>
-      <p:sp>
-        <p:nvSpPr>
-          <p:cNvPr id="2" name="Title Placeholder 1">
-            <a:extLst>
-              <a:ext uri="{FF2B5EF4-FFF2-40B4-BE49-F238E27FC236}">
-                <a16:creationId xmlns:a16="http://schemas.microsoft.com/office/drawing/2014/main" id="{E9984D45-0ED3-4D03-8E44-5E355C9134F1}"/>
-              </a:ext>
-            </a:extLst>
-          </p:cNvPr>
-          <p:cNvSpPr>
-            <a:spLocks noGrp="1"/>
-          </p:cNvSpPr>
-          <p:nvPr>
-            <p:ph type="title"/>
-          </p:nvPr>
-        </p:nvSpPr>
-        <p:spPr>
-          <a:xfrm>
-            <a:off x="838200" y="425450"/>
+            <a:off x="838200" y="365125"/>
             <a:ext cx="10515600" cy="1325563"/>
           </a:xfrm>
           <a:prstGeom prst="rect">
@@ -2935,18 +2827,18 @@
           <a:lstStyle/>
           <a:p>
             <a:r>
-              <a:rPr lang="en-US" dirty="0"/>
-              <a:t>Click to edit Master title style</a:t>
-            </a:r>
-          </a:p>
-        </p:txBody>
-      </p:sp>
-      <p:sp>
-        <p:nvSpPr>
-          <p:cNvPr id="3" name="Text Placeholder 2">
-            <a:extLst>
-              <a:ext uri="{FF2B5EF4-FFF2-40B4-BE49-F238E27FC236}">
-                <a16:creationId xmlns:a16="http://schemas.microsoft.com/office/drawing/2014/main" id="{1F687D6E-D1E9-489C-9AA9-3575C39BAA0B}"/>
+              <a:rPr lang="pt-PT"/>
+              <a:t>Clique para editar o estilo de título do Modelo Global</a:t>
+            </a:r>
+          </a:p>
+        </p:txBody>
+      </p:sp>
+      <p:sp>
+        <p:nvSpPr>
+          <p:cNvPr id="3" name="Marcador de Posição do Texto 2">
+            <a:extLst>
+              <a:ext uri="{FF2B5EF4-FFF2-40B4-BE49-F238E27FC236}">
+                <a16:creationId xmlns:a16="http://schemas.microsoft.com/office/drawing/2014/main" id="{2AA4EF4E-718D-EC47-9FE8-E49F51FEEB38}"/>
               </a:ext>
             </a:extLst>
           </p:cNvPr>
@@ -2959,8 +2851,8 @@
         </p:nvSpPr>
         <p:spPr>
           <a:xfrm>
-            <a:off x="838200" y="1949450"/>
-            <a:ext cx="10515600" cy="4195763"/>
+            <a:off x="838200" y="1825625"/>
+            <a:ext cx="10515600" cy="4351338"/>
           </a:xfrm>
           <a:prstGeom prst="rect">
             <a:avLst/>
@@ -2974,46 +2866,46 @@
           <a:p>
             <a:pPr lvl="0"/>
             <a:r>
-              <a:rPr lang="en-US" dirty="0"/>
-              <a:t>Click to edit Master text styles</a:t>
+              <a:rPr lang="pt-PT"/>
+              <a:t>Clique para editar os estilos do texto de Modelo Global</a:t>
             </a:r>
           </a:p>
           <a:p>
             <a:pPr lvl="1"/>
             <a:r>
-              <a:rPr lang="en-US" dirty="0"/>
-              <a:t>Second level</a:t>
+              <a:rPr lang="pt-PT"/>
+              <a:t>Segundo nível</a:t>
             </a:r>
           </a:p>
           <a:p>
             <a:pPr lvl="2"/>
             <a:r>
-              <a:rPr lang="en-US" dirty="0"/>
-              <a:t>Third level</a:t>
+              <a:rPr lang="pt-PT"/>
+              <a:t>Terceiro nível</a:t>
             </a:r>
           </a:p>
           <a:p>
             <a:pPr lvl="3"/>
             <a:r>
-              <a:rPr lang="en-US" dirty="0"/>
-              <a:t>Fourth level</a:t>
+              <a:rPr lang="pt-PT"/>
+              <a:t>Quarto nível</a:t>
             </a:r>
           </a:p>
           <a:p>
             <a:pPr lvl="4"/>
             <a:r>
-              <a:rPr lang="en-US" dirty="0"/>
-              <a:t>Fifth level</a:t>
-            </a:r>
-          </a:p>
-        </p:txBody>
-      </p:sp>
-      <p:sp>
-        <p:nvSpPr>
-          <p:cNvPr id="4" name="Date Placeholder 3">
-            <a:extLst>
-              <a:ext uri="{FF2B5EF4-FFF2-40B4-BE49-F238E27FC236}">
-                <a16:creationId xmlns:a16="http://schemas.microsoft.com/office/drawing/2014/main" id="{86364E9C-08EE-4B1B-B3FC-D6D997F4EA38}"/>
+              <a:rPr lang="pt-PT"/>
+              <a:t>Quinto nível</a:t>
+            </a:r>
+          </a:p>
+        </p:txBody>
+      </p:sp>
+      <p:sp>
+        <p:nvSpPr>
+          <p:cNvPr id="4" name="Marcador de Posição da Data 3">
+            <a:extLst>
+              <a:ext uri="{FF2B5EF4-FFF2-40B4-BE49-F238E27FC236}">
+                <a16:creationId xmlns:a16="http://schemas.microsoft.com/office/drawing/2014/main" id="{70F0C6E9-11A6-EA4D-A078-8E9AF953EF28}"/>
               </a:ext>
             </a:extLst>
           </p:cNvPr>
@@ -3026,7 +2918,7 @@
         </p:nvSpPr>
         <p:spPr>
           <a:xfrm>
-            <a:off x="838200" y="6324600"/>
+            <a:off x="838200" y="6356350"/>
             <a:ext cx="2743200" cy="365125"/>
           </a:xfrm>
           <a:prstGeom prst="rect">
@@ -3037,13 +2929,12 @@
           <a:bodyPr vert="horz" lIns="91440" tIns="45720" rIns="91440" bIns="45720" rtlCol="0" anchor="ctr"/>
           <a:lstStyle>
             <a:lvl1pPr algn="l">
-              <a:defRPr sz="900">
+              <a:defRPr sz="1200">
                 <a:solidFill>
-                  <a:schemeClr val="bg1">
-                    <a:alpha val="60000"/>
+                  <a:schemeClr val="tx1">
+                    <a:tint val="75000"/>
                   </a:schemeClr>
                 </a:solidFill>
-                <a:latin typeface="+mn-lt"/>
               </a:defRPr>
             </a:lvl1pPr>
           </a:lstStyle>
@@ -3059,10 +2950,10 @@
       </p:sp>
       <p:sp>
         <p:nvSpPr>
-          <p:cNvPr id="5" name="Footer Placeholder 4">
-            <a:extLst>
-              <a:ext uri="{FF2B5EF4-FFF2-40B4-BE49-F238E27FC236}">
-                <a16:creationId xmlns:a16="http://schemas.microsoft.com/office/drawing/2014/main" id="{BAB0A1F1-38FE-4C27-81E6-A43A54793FC3}"/>
+          <p:cNvPr id="5" name="Marcador de Posição do Rodapé 4">
+            <a:extLst>
+              <a:ext uri="{FF2B5EF4-FFF2-40B4-BE49-F238E27FC236}">
+                <a16:creationId xmlns:a16="http://schemas.microsoft.com/office/drawing/2014/main" id="{744332E8-8617-0443-BF31-B0269FD63BCB}"/>
               </a:ext>
             </a:extLst>
           </p:cNvPr>
@@ -3075,7 +2966,7 @@
         </p:nvSpPr>
         <p:spPr>
           <a:xfrm>
-            <a:off x="4038600" y="6324600"/>
+            <a:off x="4038600" y="6356350"/>
             <a:ext cx="4114800" cy="365125"/>
           </a:xfrm>
           <a:prstGeom prst="rect">
@@ -3086,13 +2977,12 @@
           <a:bodyPr vert="horz" lIns="91440" tIns="45720" rIns="91440" bIns="45720" rtlCol="0" anchor="ctr"/>
           <a:lstStyle>
             <a:lvl1pPr algn="ctr">
-              <a:defRPr sz="900">
+              <a:defRPr sz="1200">
                 <a:solidFill>
-                  <a:schemeClr val="bg1">
-                    <a:alpha val="60000"/>
+                  <a:schemeClr val="tx1">
+                    <a:tint val="75000"/>
                   </a:schemeClr>
                 </a:solidFill>
-                <a:latin typeface="+mn-lt"/>
               </a:defRPr>
             </a:lvl1pPr>
           </a:lstStyle>
@@ -3103,10 +2993,10 @@
       </p:sp>
       <p:sp>
         <p:nvSpPr>
-          <p:cNvPr id="6" name="Slide Number Placeholder 5">
-            <a:extLst>
-              <a:ext uri="{FF2B5EF4-FFF2-40B4-BE49-F238E27FC236}">
-                <a16:creationId xmlns:a16="http://schemas.microsoft.com/office/drawing/2014/main" id="{5E26B39A-FFD8-42EF-ADC7-7DB3B302F8B2}"/>
+          <p:cNvPr id="6" name="Marcador de Posição do Número do Diapositivo 5">
+            <a:extLst>
+              <a:ext uri="{FF2B5EF4-FFF2-40B4-BE49-F238E27FC236}">
+                <a16:creationId xmlns:a16="http://schemas.microsoft.com/office/drawing/2014/main" id="{02E51083-8A77-E64E-968E-6941859AD22F}"/>
               </a:ext>
             </a:extLst>
           </p:cNvPr>
@@ -3119,7 +3009,7 @@
         </p:nvSpPr>
         <p:spPr>
           <a:xfrm>
-            <a:off x="8610600" y="6324600"/>
+            <a:off x="8610600" y="6356350"/>
             <a:ext cx="2743200" cy="365125"/>
           </a:xfrm>
           <a:prstGeom prst="rect">
@@ -3130,13 +3020,12 @@
           <a:bodyPr vert="horz" lIns="91440" tIns="45720" rIns="91440" bIns="45720" rtlCol="0" anchor="ctr"/>
           <a:lstStyle>
             <a:lvl1pPr algn="r">
-              <a:defRPr sz="900">
+              <a:defRPr sz="1200">
                 <a:solidFill>
-                  <a:schemeClr val="bg1">
-                    <a:alpha val="60000"/>
+                  <a:schemeClr val="tx1">
+                    <a:tint val="75000"/>
                   </a:schemeClr>
                 </a:solidFill>
-                <a:latin typeface="+mn-lt"/>
               </a:defRPr>
             </a:lvl1pPr>
           </a:lstStyle>
@@ -3153,38 +3042,38 @@
     </p:spTree>
     <p:extLst>
       <p:ext uri="{BB962C8B-B14F-4D97-AF65-F5344CB8AC3E}">
-        <p14:creationId xmlns:p14="http://schemas.microsoft.com/office/powerpoint/2010/main" val="633538739"/>
+        <p14:creationId xmlns:p14="http://schemas.microsoft.com/office/powerpoint/2010/main" val="4020438116"/>
       </p:ext>
     </p:extLst>
   </p:cSld>
   <p:clrMap bg1="lt1" tx1="dk1" bg2="lt2" tx2="dk2" accent1="accent1" accent2="accent2" accent3="accent3" accent4="accent4" accent5="accent5" accent6="accent6" hlink="hlink" folHlink="folHlink"/>
   <p:sldLayoutIdLst>
-    <p:sldLayoutId id="2147483727" r:id="rId1"/>
-    <p:sldLayoutId id="2147483728" r:id="rId2"/>
-    <p:sldLayoutId id="2147483729" r:id="rId3"/>
-    <p:sldLayoutId id="2147483730" r:id="rId4"/>
-    <p:sldLayoutId id="2147483731" r:id="rId5"/>
-    <p:sldLayoutId id="2147483732" r:id="rId6"/>
-    <p:sldLayoutId id="2147483733" r:id="rId7"/>
-    <p:sldLayoutId id="2147483734" r:id="rId8"/>
-    <p:sldLayoutId id="2147483737" r:id="rId9"/>
-    <p:sldLayoutId id="2147483735" r:id="rId10"/>
-    <p:sldLayoutId id="2147483736" r:id="rId11"/>
+    <p:sldLayoutId id="2147483740" r:id="rId1"/>
+    <p:sldLayoutId id="2147483741" r:id="rId2"/>
+    <p:sldLayoutId id="2147483742" r:id="rId3"/>
+    <p:sldLayoutId id="2147483743" r:id="rId4"/>
+    <p:sldLayoutId id="2147483744" r:id="rId5"/>
+    <p:sldLayoutId id="2147483745" r:id="rId6"/>
+    <p:sldLayoutId id="2147483746" r:id="rId7"/>
+    <p:sldLayoutId id="2147483747" r:id="rId8"/>
+    <p:sldLayoutId id="2147483748" r:id="rId9"/>
+    <p:sldLayoutId id="2147483749" r:id="rId10"/>
+    <p:sldLayoutId id="2147483750" r:id="rId11"/>
   </p:sldLayoutIdLst>
   <p:hf sldNum="0" hdr="0" ftr="0" dt="0"/>
   <p:txStyles>
     <p:titleStyle>
       <a:lvl1pPr algn="l" defTabSz="914400" rtl="0" eaLnBrk="1" latinLnBrk="0" hangingPunct="1">
         <a:lnSpc>
-          <a:spcPct val="100000"/>
+          <a:spcPct val="90000"/>
         </a:lnSpc>
         <a:spcBef>
           <a:spcPct val="0"/>
         </a:spcBef>
         <a:buNone/>
-        <a:defRPr sz="4400" b="1" kern="1200">
+        <a:defRPr sz="4400" kern="1200">
           <a:solidFill>
-            <a:schemeClr val="bg1"/>
+            <a:schemeClr val="tx1"/>
           </a:solidFill>
           <a:latin typeface="+mj-lt"/>
           <a:ea typeface="+mj-ea"/>
@@ -3195,19 +3084,16 @@
     <p:bodyStyle>
       <a:lvl1pPr marL="228600" indent="-228600" algn="l" defTabSz="914400" rtl="0" eaLnBrk="1" latinLnBrk="0" hangingPunct="1">
         <a:lnSpc>
-          <a:spcPct val="110000"/>
+          <a:spcPct val="90000"/>
         </a:lnSpc>
         <a:spcBef>
           <a:spcPts val="1000"/>
         </a:spcBef>
-        <a:buClr>
-          <a:schemeClr val="accent1"/>
-        </a:buClr>
         <a:buFont typeface="Arial" panose="020B0604020202020204" pitchFamily="34" charset="0"/>
         <a:buChar char="•"/>
         <a:defRPr sz="2800" kern="1200">
           <a:solidFill>
-            <a:schemeClr val="bg1"/>
+            <a:schemeClr val="tx1"/>
           </a:solidFill>
           <a:latin typeface="+mn-lt"/>
           <a:ea typeface="+mn-ea"/>
@@ -3216,19 +3102,16 @@
       </a:lvl1pPr>
       <a:lvl2pPr marL="685800" indent="-228600" algn="l" defTabSz="914400" rtl="0" eaLnBrk="1" latinLnBrk="0" hangingPunct="1">
         <a:lnSpc>
-          <a:spcPct val="110000"/>
+          <a:spcPct val="90000"/>
         </a:lnSpc>
         <a:spcBef>
           <a:spcPts val="500"/>
         </a:spcBef>
-        <a:buClr>
-          <a:schemeClr val="accent1"/>
-        </a:buClr>
         <a:buFont typeface="Arial" panose="020B0604020202020204" pitchFamily="34" charset="0"/>
         <a:buChar char="•"/>
         <a:defRPr sz="2400" kern="1200">
           <a:solidFill>
-            <a:schemeClr val="bg1"/>
+            <a:schemeClr val="tx1"/>
           </a:solidFill>
           <a:latin typeface="+mn-lt"/>
           <a:ea typeface="+mn-ea"/>
@@ -3237,19 +3120,16 @@
       </a:lvl2pPr>
       <a:lvl3pPr marL="1143000" indent="-228600" algn="l" defTabSz="914400" rtl="0" eaLnBrk="1" latinLnBrk="0" hangingPunct="1">
         <a:lnSpc>
-          <a:spcPct val="110000"/>
+          <a:spcPct val="90000"/>
         </a:lnSpc>
         <a:spcBef>
           <a:spcPts val="500"/>
         </a:spcBef>
-        <a:buClr>
-          <a:schemeClr val="accent1"/>
-        </a:buClr>
         <a:buFont typeface="Arial" panose="020B0604020202020204" pitchFamily="34" charset="0"/>
         <a:buChar char="•"/>
         <a:defRPr sz="2000" kern="1200">
           <a:solidFill>
-            <a:schemeClr val="bg1"/>
+            <a:schemeClr val="tx1"/>
           </a:solidFill>
           <a:latin typeface="+mn-lt"/>
           <a:ea typeface="+mn-ea"/>
@@ -3258,19 +3138,16 @@
       </a:lvl3pPr>
       <a:lvl4pPr marL="1600200" indent="-228600" algn="l" defTabSz="914400" rtl="0" eaLnBrk="1" latinLnBrk="0" hangingPunct="1">
         <a:lnSpc>
-          <a:spcPct val="110000"/>
+          <a:spcPct val="90000"/>
         </a:lnSpc>
         <a:spcBef>
           <a:spcPts val="500"/>
         </a:spcBef>
-        <a:buClr>
-          <a:schemeClr val="accent1"/>
-        </a:buClr>
         <a:buFont typeface="Arial" panose="020B0604020202020204" pitchFamily="34" charset="0"/>
         <a:buChar char="•"/>
         <a:defRPr sz="1800" kern="1200">
           <a:solidFill>
-            <a:schemeClr val="bg1"/>
+            <a:schemeClr val="tx1"/>
           </a:solidFill>
           <a:latin typeface="+mn-lt"/>
           <a:ea typeface="+mn-ea"/>
@@ -3279,19 +3156,16 @@
       </a:lvl4pPr>
       <a:lvl5pPr marL="2057400" indent="-228600" algn="l" defTabSz="914400" rtl="0" eaLnBrk="1" latinLnBrk="0" hangingPunct="1">
         <a:lnSpc>
-          <a:spcPct val="110000"/>
+          <a:spcPct val="90000"/>
         </a:lnSpc>
         <a:spcBef>
           <a:spcPts val="500"/>
         </a:spcBef>
-        <a:buClr>
-          <a:schemeClr val="accent1"/>
-        </a:buClr>
         <a:buFont typeface="Arial" panose="020B0604020202020204" pitchFamily="34" charset="0"/>
         <a:buChar char="•"/>
         <a:defRPr sz="1800" kern="1200">
           <a:solidFill>
-            <a:schemeClr val="bg1"/>
+            <a:schemeClr val="tx1"/>
           </a:solidFill>
           <a:latin typeface="+mn-lt"/>
           <a:ea typeface="+mn-ea"/>
@@ -3373,7 +3247,7 @@
     </p:bodyStyle>
     <p:otherStyle>
       <a:defPPr>
-        <a:defRPr lang="en-US"/>
+        <a:defRPr lang="pt-PT"/>
       </a:defPPr>
       <a:lvl1pPr marL="0" algn="l" defTabSz="914400" rtl="0" eaLnBrk="1" latinLnBrk="0" hangingPunct="1">
         <a:defRPr sz="1800" kern="1200">
@@ -3473,14 +3347,6 @@
 <file path=ppt/slides/slide1.xml><?xml version="1.0" encoding="utf-8"?>
 <p:sld xmlns:a="http://schemas.openxmlformats.org/drawingml/2006/main" xmlns:r="http://schemas.openxmlformats.org/officeDocument/2006/relationships" xmlns:p="http://schemas.openxmlformats.org/presentationml/2006/main">
   <p:cSld>
-    <p:bg>
-      <p:bgPr>
-        <a:solidFill>
-          <a:schemeClr val="bg1"/>
-        </a:solidFill>
-        <a:effectLst/>
-      </p:bgPr>
-    </p:bg>
     <p:spTree>
       <p:nvGrpSpPr>
         <p:cNvPr id="1" name=""/>
@@ -3495,212 +3361,6 @@
           <a:chExt cx="0" cy="0"/>
         </a:xfrm>
       </p:grpSpPr>
-      <p:sp useBgFill="1">
-        <p:nvSpPr>
-          <p:cNvPr id="9" name="Rectangle 8">
-            <a:extLst>
-              <a:ext uri="{FF2B5EF4-FFF2-40B4-BE49-F238E27FC236}">
-                <a16:creationId xmlns:a16="http://schemas.microsoft.com/office/drawing/2014/main" id="{37FDDF72-DE39-4F99-A3C1-DD9D7815D7DB}"/>
-              </a:ext>
-              <a:ext uri="{C183D7F6-B498-43B3-948B-1728B52AA6E4}">
-                <adec:decorative xmlns:adec="http://schemas.microsoft.com/office/drawing/2017/decorative" val="1"/>
-              </a:ext>
-            </a:extLst>
-          </p:cNvPr>
-          <p:cNvSpPr>
-            <a:spLocks noGrp="1" noRot="1" noChangeAspect="1" noMove="1" noResize="1" noEditPoints="1" noAdjustHandles="1" noChangeArrowheads="1" noChangeShapeType="1" noTextEdit="1"/>
-          </p:cNvSpPr>
-          <p:nvPr>
-            <p:extLst>
-              <p:ext uri="{386F3935-93C4-4BCD-93E2-E3B085C9AB24}">
-                <p16:designElem xmlns:p16="http://schemas.microsoft.com/office/powerpoint/2015/main" val="1"/>
-              </p:ext>
-            </p:extLst>
-          </p:nvPr>
-        </p:nvSpPr>
-        <p:spPr>
-          <a:xfrm>
-            <a:off x="0" y="0"/>
-            <a:ext cx="12188952" cy="6858000"/>
-          </a:xfrm>
-          <a:prstGeom prst="rect">
-            <a:avLst/>
-          </a:prstGeom>
-          <a:ln>
-            <a:noFill/>
-          </a:ln>
-        </p:spPr>
-        <p:style>
-          <a:lnRef idx="2">
-            <a:schemeClr val="accent1">
-              <a:shade val="50000"/>
-            </a:schemeClr>
-          </a:lnRef>
-          <a:fillRef idx="1">
-            <a:schemeClr val="accent1"/>
-          </a:fillRef>
-          <a:effectRef idx="0">
-            <a:schemeClr val="accent1"/>
-          </a:effectRef>
-          <a:fontRef idx="minor">
-            <a:schemeClr val="lt1"/>
-          </a:fontRef>
-        </p:style>
-        <p:txBody>
-          <a:bodyPr rtlCol="0" anchor="ctr"/>
-          <a:lstStyle/>
-          <a:p>
-            <a:pPr algn="ctr"/>
-            <a:endParaRPr lang="en-US" dirty="0">
-              <a:solidFill>
-                <a:schemeClr val="tx1">
-                  <a:lumMod val="65000"/>
-                  <a:lumOff val="35000"/>
-                </a:schemeClr>
-              </a:solidFill>
-              <a:latin typeface="AvenirNext LT Pro Medium" panose="020B0504020202020204" pitchFamily="34" charset="0"/>
-            </a:endParaRPr>
-          </a:p>
-        </p:txBody>
-      </p:sp>
-      <p:sp>
-        <p:nvSpPr>
-          <p:cNvPr id="11" name="Rectangle 10">
-            <a:extLst>
-              <a:ext uri="{FF2B5EF4-FFF2-40B4-BE49-F238E27FC236}">
-                <a16:creationId xmlns:a16="http://schemas.microsoft.com/office/drawing/2014/main" id="{5E4ECE80-3AD1-450C-B62A-98788F193948}"/>
-              </a:ext>
-              <a:ext uri="{C183D7F6-B498-43B3-948B-1728B52AA6E4}">
-                <adec:decorative xmlns:adec="http://schemas.microsoft.com/office/drawing/2017/decorative" val="1"/>
-              </a:ext>
-            </a:extLst>
-          </p:cNvPr>
-          <p:cNvSpPr>
-            <a:spLocks noGrp="1" noRot="1" noChangeAspect="1" noMove="1" noResize="1" noEditPoints="1" noAdjustHandles="1" noChangeArrowheads="1" noChangeShapeType="1" noTextEdit="1"/>
-          </p:cNvSpPr>
-          <p:nvPr>
-            <p:extLst>
-              <p:ext uri="{386F3935-93C4-4BCD-93E2-E3B085C9AB24}">
-                <p16:designElem xmlns:p16="http://schemas.microsoft.com/office/powerpoint/2015/main" val="1"/>
-              </p:ext>
-            </p:extLst>
-          </p:nvPr>
-        </p:nvSpPr>
-        <p:spPr>
-          <a:xfrm>
-            <a:off x="0" y="0"/>
-            <a:ext cx="12188952" cy="6858000"/>
-          </a:xfrm>
-          <a:prstGeom prst="rect">
-            <a:avLst/>
-          </a:prstGeom>
-          <a:solidFill>
-            <a:srgbClr val="000000"/>
-          </a:solidFill>
-          <a:ln>
-            <a:noFill/>
-          </a:ln>
-        </p:spPr>
-        <p:style>
-          <a:lnRef idx="2">
-            <a:schemeClr val="accent1">
-              <a:shade val="50000"/>
-            </a:schemeClr>
-          </a:lnRef>
-          <a:fillRef idx="1">
-            <a:schemeClr val="accent1"/>
-          </a:fillRef>
-          <a:effectRef idx="0">
-            <a:schemeClr val="accent1"/>
-          </a:effectRef>
-          <a:fontRef idx="minor">
-            <a:schemeClr val="lt1"/>
-          </a:fontRef>
-        </p:style>
-        <p:txBody>
-          <a:bodyPr rtlCol="0" anchor="ctr"/>
-          <a:lstStyle/>
-          <a:p>
-            <a:pPr algn="ctr"/>
-            <a:endParaRPr lang="en-US" dirty="0">
-              <a:solidFill>
-                <a:schemeClr val="tx1">
-                  <a:lumMod val="65000"/>
-                  <a:lumOff val="35000"/>
-                </a:schemeClr>
-              </a:solidFill>
-              <a:latin typeface="AvenirNext LT Pro Medium" panose="020B0504020202020204" pitchFamily="34" charset="0"/>
-            </a:endParaRPr>
-          </a:p>
-        </p:txBody>
-      </p:sp>
-      <p:sp>
-        <p:nvSpPr>
-          <p:cNvPr id="13" name="Rectangle 12">
-            <a:extLst>
-              <a:ext uri="{FF2B5EF4-FFF2-40B4-BE49-F238E27FC236}">
-                <a16:creationId xmlns:a16="http://schemas.microsoft.com/office/drawing/2014/main" id="{C4056FD6-9767-4B1A-ACC2-9883F6A5B86D}"/>
-              </a:ext>
-              <a:ext uri="{C183D7F6-B498-43B3-948B-1728B52AA6E4}">
-                <adec:decorative xmlns:adec="http://schemas.microsoft.com/office/drawing/2017/decorative" val="1"/>
-              </a:ext>
-            </a:extLst>
-          </p:cNvPr>
-          <p:cNvSpPr>
-            <a:spLocks noGrp="1" noRot="1" noChangeAspect="1" noMove="1" noResize="1" noEditPoints="1" noAdjustHandles="1" noChangeArrowheads="1" noChangeShapeType="1" noTextEdit="1"/>
-          </p:cNvSpPr>
-          <p:nvPr>
-            <p:extLst>
-              <p:ext uri="{386F3935-93C4-4BCD-93E2-E3B085C9AB24}">
-                <p16:designElem xmlns:p16="http://schemas.microsoft.com/office/powerpoint/2015/main" val="1"/>
-              </p:ext>
-            </p:extLst>
-          </p:nvPr>
-        </p:nvSpPr>
-        <p:spPr>
-          <a:xfrm>
-            <a:off x="0" y="0"/>
-            <a:ext cx="12179928" cy="6858000"/>
-          </a:xfrm>
-          <a:prstGeom prst="rect">
-            <a:avLst/>
-          </a:prstGeom>
-          <a:blipFill dpi="0" rotWithShape="1">
-            <a:blip r:embed="rId2">
-              <a:alphaModFix amt="20000"/>
-            </a:blip>
-            <a:srcRect/>
-            <a:tile tx="889000" ty="0" sx="100000" sy="100000" flip="none" algn="tl"/>
-          </a:blipFill>
-          <a:ln>
-            <a:noFill/>
-          </a:ln>
-        </p:spPr>
-        <p:style>
-          <a:lnRef idx="2">
-            <a:schemeClr val="accent1">
-              <a:shade val="50000"/>
-            </a:schemeClr>
-          </a:lnRef>
-          <a:fillRef idx="1">
-            <a:schemeClr val="accent1"/>
-          </a:fillRef>
-          <a:effectRef idx="0">
-            <a:schemeClr val="accent1"/>
-          </a:effectRef>
-          <a:fontRef idx="minor">
-            <a:schemeClr val="lt1"/>
-          </a:fontRef>
-        </p:style>
-        <p:txBody>
-          <a:bodyPr rtlCol="0" anchor="ctr"/>
-          <a:lstStyle/>
-          <a:p>
-            <a:pPr algn="ctr"/>
-            <a:endParaRPr lang="en-US" dirty="0"/>
-          </a:p>
-        </p:txBody>
-      </p:sp>
       <p:pic>
         <p:nvPicPr>
           <p:cNvPr id="4" name="Picture 3">
@@ -3716,7 +3376,7 @@
           <p:nvPr/>
         </p:nvPicPr>
         <p:blipFill rotWithShape="1">
-          <a:blip r:embed="rId3">
+          <a:blip r:embed="rId2">
             <a:alphaModFix amt="70000"/>
           </a:blip>
           <a:srcRect t="18546" r="-1" b="3594"/>
@@ -3761,11 +3421,7 @@
           <a:lstStyle/>
           <a:p>
             <a:r>
-              <a:rPr lang="pt-PT" sz="5200" dirty="0">
-                <a:solidFill>
-                  <a:srgbClr val="FFFFFF"/>
-                </a:solidFill>
-              </a:rPr>
+              <a:rPr lang="pt-PT" sz="5200" dirty="0"/>
               <a:t>PARLARQUIVO</a:t>
             </a:r>
           </a:p>
@@ -3800,11 +3456,7 @@
           <a:lstStyle/>
           <a:p>
             <a:r>
-              <a:rPr lang="pt-PT" sz="2200" dirty="0">
-                <a:solidFill>
-                  <a:srgbClr val="FFFFFF"/>
-                </a:solidFill>
-              </a:rPr>
+              <a:rPr lang="pt-PT" sz="2200" dirty="0"/>
               <a:t>ARQUIVO REPOSITÓRIO DO TRABALHO DO PARLAMENTO PORTUGUÊS</a:t>
             </a:r>
           </a:p>
@@ -3939,7 +3591,7 @@
               <a:t>Candidatura ao prémio </a:t>
             </a:r>
             <a:r>
-              <a:rPr lang="pt-PT"/>
+              <a:rPr lang="pt-PT" dirty="0" err="1"/>
               <a:t>arquivo.pt</a:t>
             </a:r>
             <a:endParaRPr lang="pt-PT" dirty="0"/>
@@ -4071,57 +3723,1415 @@
 </p:sld>
 </file>
 
+<file path=ppt/slides/slide4.xml><?xml version="1.0" encoding="utf-8"?>
+<p:sld xmlns:a="http://schemas.openxmlformats.org/drawingml/2006/main" xmlns:r="http://schemas.openxmlformats.org/officeDocument/2006/relationships" xmlns:p="http://schemas.openxmlformats.org/presentationml/2006/main">
+  <p:cSld>
+    <p:bg>
+      <p:bgPr>
+        <a:solidFill>
+          <a:schemeClr val="bg1"/>
+        </a:solidFill>
+        <a:effectLst/>
+      </p:bgPr>
+    </p:bg>
+    <p:spTree>
+      <p:nvGrpSpPr>
+        <p:cNvPr id="1" name=""/>
+        <p:cNvGrpSpPr/>
+        <p:nvPr/>
+      </p:nvGrpSpPr>
+      <p:grpSpPr>
+        <a:xfrm>
+          <a:off x="0" y="0"/>
+          <a:ext cx="0" cy="0"/>
+          <a:chOff x="0" y="0"/>
+          <a:chExt cx="0" cy="0"/>
+        </a:xfrm>
+      </p:grpSpPr>
+      <p:sp>
+        <p:nvSpPr>
+          <p:cNvPr id="2" name="Título 1">
+            <a:extLst>
+              <a:ext uri="{FF2B5EF4-FFF2-40B4-BE49-F238E27FC236}">
+                <a16:creationId xmlns:a16="http://schemas.microsoft.com/office/drawing/2014/main" id="{3F8B59C9-2C43-E94B-A032-AEC26714766E}"/>
+              </a:ext>
+            </a:extLst>
+          </p:cNvPr>
+          <p:cNvSpPr>
+            <a:spLocks noGrp="1"/>
+          </p:cNvSpPr>
+          <p:nvPr>
+            <p:ph type="title"/>
+          </p:nvPr>
+        </p:nvSpPr>
+        <p:spPr>
+          <a:xfrm>
+            <a:off x="1198182" y="381000"/>
+            <a:ext cx="10003218" cy="1600124"/>
+          </a:xfrm>
+        </p:spPr>
+        <p:txBody>
+          <a:bodyPr>
+            <a:normAutofit/>
+          </a:bodyPr>
+          <a:lstStyle/>
+          <a:p>
+            <a:r>
+              <a:rPr lang="pt-PT" dirty="0"/>
+              <a:t>DESENHO</a:t>
+            </a:r>
+          </a:p>
+        </p:txBody>
+      </p:sp>
+      <p:sp>
+        <p:nvSpPr>
+          <p:cNvPr id="4" name="CaixaDeTexto 3">
+            <a:extLst>
+              <a:ext uri="{FF2B5EF4-FFF2-40B4-BE49-F238E27FC236}">
+                <a16:creationId xmlns:a16="http://schemas.microsoft.com/office/drawing/2014/main" id="{4ED75CBD-E052-1941-AA78-D8031480C64B}"/>
+              </a:ext>
+            </a:extLst>
+          </p:cNvPr>
+          <p:cNvSpPr txBox="1"/>
+          <p:nvPr/>
+        </p:nvSpPr>
+        <p:spPr>
+          <a:xfrm>
+            <a:off x="3215545" y="2921837"/>
+            <a:ext cx="5757862" cy="3240000"/>
+          </a:xfrm>
+          <a:prstGeom prst="rect">
+            <a:avLst/>
+          </a:prstGeom>
+          <a:noFill/>
+          <a:ln>
+            <a:solidFill>
+              <a:schemeClr val="tx1"/>
+            </a:solidFill>
+          </a:ln>
+        </p:spPr>
+        <p:txBody>
+          <a:bodyPr wrap="square" rtlCol="0">
+            <a:spAutoFit/>
+          </a:bodyPr>
+          <a:lstStyle/>
+          <a:p>
+            <a:endParaRPr lang="pt-PT" dirty="0"/>
+          </a:p>
+        </p:txBody>
+      </p:sp>
+      <p:sp>
+        <p:nvSpPr>
+          <p:cNvPr id="9" name="CaixaDeTexto 8">
+            <a:extLst>
+              <a:ext uri="{FF2B5EF4-FFF2-40B4-BE49-F238E27FC236}">
+                <a16:creationId xmlns:a16="http://schemas.microsoft.com/office/drawing/2014/main" id="{D4F4E78E-AED3-EF46-88B1-C8E8F7E5F161}"/>
+              </a:ext>
+            </a:extLst>
+          </p:cNvPr>
+          <p:cNvSpPr txBox="1"/>
+          <p:nvPr/>
+        </p:nvSpPr>
+        <p:spPr>
+          <a:xfrm>
+            <a:off x="3215546" y="2921837"/>
+            <a:ext cx="5757862" cy="640760"/>
+          </a:xfrm>
+          <a:prstGeom prst="rect">
+            <a:avLst/>
+          </a:prstGeom>
+          <a:noFill/>
+          <a:ln>
+            <a:solidFill>
+              <a:schemeClr val="tx1"/>
+            </a:solidFill>
+          </a:ln>
+        </p:spPr>
+        <p:txBody>
+          <a:bodyPr wrap="square" rtlCol="0">
+            <a:spAutoFit/>
+          </a:bodyPr>
+          <a:lstStyle/>
+          <a:p>
+            <a:endParaRPr lang="pt-PT" dirty="0"/>
+          </a:p>
+        </p:txBody>
+      </p:sp>
+      <p:sp>
+        <p:nvSpPr>
+          <p:cNvPr id="11" name="CaixaDeTexto 10">
+            <a:extLst>
+              <a:ext uri="{FF2B5EF4-FFF2-40B4-BE49-F238E27FC236}">
+                <a16:creationId xmlns:a16="http://schemas.microsoft.com/office/drawing/2014/main" id="{F3E664B0-BF11-3F46-A50F-16C91FA5708A}"/>
+              </a:ext>
+            </a:extLst>
+          </p:cNvPr>
+          <p:cNvSpPr txBox="1"/>
+          <p:nvPr/>
+        </p:nvSpPr>
+        <p:spPr>
+          <a:xfrm>
+            <a:off x="3367944" y="3074237"/>
+            <a:ext cx="2723483" cy="338554"/>
+          </a:xfrm>
+          <a:prstGeom prst="rect">
+            <a:avLst/>
+          </a:prstGeom>
+          <a:noFill/>
+          <a:ln>
+            <a:noFill/>
+          </a:ln>
+        </p:spPr>
+        <p:txBody>
+          <a:bodyPr wrap="square" rtlCol="0">
+            <a:spAutoFit/>
+          </a:bodyPr>
+          <a:lstStyle/>
+          <a:p>
+            <a:r>
+              <a:rPr lang="pt-PT" sz="1600" dirty="0"/>
+              <a:t>PARLARQUIVO (LOGO)</a:t>
+            </a:r>
+          </a:p>
+        </p:txBody>
+      </p:sp>
+      <p:sp>
+        <p:nvSpPr>
+          <p:cNvPr id="13" name="CaixaDeTexto 12">
+            <a:extLst>
+              <a:ext uri="{FF2B5EF4-FFF2-40B4-BE49-F238E27FC236}">
+                <a16:creationId xmlns:a16="http://schemas.microsoft.com/office/drawing/2014/main" id="{5033E058-BE04-7442-BFF6-90DFF0C3C897}"/>
+              </a:ext>
+            </a:extLst>
+          </p:cNvPr>
+          <p:cNvSpPr txBox="1"/>
+          <p:nvPr/>
+        </p:nvSpPr>
+        <p:spPr>
+          <a:xfrm>
+            <a:off x="6094476" y="3072940"/>
+            <a:ext cx="2728890" cy="338554"/>
+          </a:xfrm>
+          <a:prstGeom prst="rect">
+            <a:avLst/>
+          </a:prstGeom>
+          <a:noFill/>
+          <a:ln>
+            <a:noFill/>
+          </a:ln>
+        </p:spPr>
+        <p:txBody>
+          <a:bodyPr wrap="square" rtlCol="0">
+            <a:spAutoFit/>
+          </a:bodyPr>
+          <a:lstStyle/>
+          <a:p>
+            <a:pPr algn="r"/>
+            <a:r>
+              <a:rPr lang="pt-PT" sz="1600" dirty="0"/>
+              <a:t>SOBRE   CONTACTOS </a:t>
+            </a:r>
+          </a:p>
+        </p:txBody>
+      </p:sp>
+      <p:sp>
+        <p:nvSpPr>
+          <p:cNvPr id="15" name="CaixaDeTexto 14">
+            <a:extLst>
+              <a:ext uri="{FF2B5EF4-FFF2-40B4-BE49-F238E27FC236}">
+                <a16:creationId xmlns:a16="http://schemas.microsoft.com/office/drawing/2014/main" id="{77C34F36-92B7-5E44-83A4-BB4BD86296EB}"/>
+              </a:ext>
+            </a:extLst>
+          </p:cNvPr>
+          <p:cNvSpPr txBox="1"/>
+          <p:nvPr/>
+        </p:nvSpPr>
+        <p:spPr>
+          <a:xfrm>
+            <a:off x="3947666" y="4203283"/>
+            <a:ext cx="4293619" cy="338554"/>
+          </a:xfrm>
+          <a:prstGeom prst="rect">
+            <a:avLst/>
+          </a:prstGeom>
+          <a:noFill/>
+          <a:ln>
+            <a:solidFill>
+              <a:schemeClr val="tx1"/>
+            </a:solidFill>
+          </a:ln>
+        </p:spPr>
+        <p:txBody>
+          <a:bodyPr wrap="square" rtlCol="0">
+            <a:spAutoFit/>
+          </a:bodyPr>
+          <a:lstStyle/>
+          <a:p>
+            <a:r>
+              <a:rPr lang="pt-PT" sz="1600" dirty="0"/>
+              <a:t>(INSERIR TEXTO)</a:t>
+            </a:r>
+          </a:p>
+        </p:txBody>
+      </p:sp>
+      <p:sp>
+        <p:nvSpPr>
+          <p:cNvPr id="16" name="CaixaDeTexto 15">
+            <a:extLst>
+              <a:ext uri="{FF2B5EF4-FFF2-40B4-BE49-F238E27FC236}">
+                <a16:creationId xmlns:a16="http://schemas.microsoft.com/office/drawing/2014/main" id="{B4C545C9-BAA8-844C-AE83-4D3D469C0493}"/>
+              </a:ext>
+            </a:extLst>
+          </p:cNvPr>
+          <p:cNvSpPr txBox="1"/>
+          <p:nvPr/>
+        </p:nvSpPr>
+        <p:spPr>
+          <a:xfrm>
+            <a:off x="3944618" y="3864729"/>
+            <a:ext cx="3821844" cy="338554"/>
+          </a:xfrm>
+          <a:prstGeom prst="rect">
+            <a:avLst/>
+          </a:prstGeom>
+          <a:noFill/>
+          <a:ln>
+            <a:noFill/>
+          </a:ln>
+        </p:spPr>
+        <p:txBody>
+          <a:bodyPr wrap="square" rtlCol="0">
+            <a:spAutoFit/>
+          </a:bodyPr>
+          <a:lstStyle/>
+          <a:p>
+            <a:r>
+              <a:rPr lang="pt-PT" sz="1600" dirty="0"/>
+              <a:t>PESQUISAR INICIATIVA:</a:t>
+            </a:r>
+          </a:p>
+        </p:txBody>
+      </p:sp>
+      <p:sp>
+        <p:nvSpPr>
+          <p:cNvPr id="17" name="CaixaDeTexto 16">
+            <a:extLst>
+              <a:ext uri="{FF2B5EF4-FFF2-40B4-BE49-F238E27FC236}">
+                <a16:creationId xmlns:a16="http://schemas.microsoft.com/office/drawing/2014/main" id="{EDCB1898-19F3-FC43-B511-33D496CC9645}"/>
+              </a:ext>
+            </a:extLst>
+          </p:cNvPr>
+          <p:cNvSpPr txBox="1"/>
+          <p:nvPr/>
+        </p:nvSpPr>
+        <p:spPr>
+          <a:xfrm>
+            <a:off x="3944618" y="4560892"/>
+            <a:ext cx="4293619" cy="246221"/>
+          </a:xfrm>
+          <a:prstGeom prst="rect">
+            <a:avLst/>
+          </a:prstGeom>
+          <a:noFill/>
+          <a:ln>
+            <a:noFill/>
+          </a:ln>
+        </p:spPr>
+        <p:txBody>
+          <a:bodyPr wrap="square" rtlCol="0">
+            <a:spAutoFit/>
+          </a:bodyPr>
+          <a:lstStyle/>
+          <a:p>
+            <a:r>
+              <a:rPr lang="pt-PT" sz="1000" dirty="0"/>
+              <a:t>PODES PESQUISAR POR TEMA, NOME, DATA OU AUTOR.</a:t>
+            </a:r>
+          </a:p>
+        </p:txBody>
+      </p:sp>
+      <p:sp>
+        <p:nvSpPr>
+          <p:cNvPr id="18" name="CaixaDeTexto 17">
+            <a:extLst>
+              <a:ext uri="{FF2B5EF4-FFF2-40B4-BE49-F238E27FC236}">
+                <a16:creationId xmlns:a16="http://schemas.microsoft.com/office/drawing/2014/main" id="{8B43FA62-5966-3247-A171-3F8A04FB28CD}"/>
+              </a:ext>
+            </a:extLst>
+          </p:cNvPr>
+          <p:cNvSpPr txBox="1"/>
+          <p:nvPr/>
+        </p:nvSpPr>
+        <p:spPr>
+          <a:xfrm>
+            <a:off x="9470836" y="2921837"/>
+            <a:ext cx="2220686" cy="1938992"/>
+          </a:xfrm>
+          <a:prstGeom prst="rect">
+            <a:avLst/>
+          </a:prstGeom>
+          <a:noFill/>
+          <a:ln>
+            <a:noFill/>
+          </a:ln>
+        </p:spPr>
+        <p:txBody>
+          <a:bodyPr wrap="square" rtlCol="0">
+            <a:spAutoFit/>
+          </a:bodyPr>
+          <a:lstStyle/>
+          <a:p>
+            <a:pPr algn="just"/>
+            <a:r>
+              <a:rPr lang="pt-PT" sz="1200" dirty="0"/>
+              <a:t>Neste retângulo vai escrevendo e apagando automaticamente a cinzento algumas sugestões.</a:t>
+            </a:r>
+          </a:p>
+          <a:p>
+            <a:pPr algn="just"/>
+            <a:r>
+              <a:rPr lang="pt-PT" sz="1200" dirty="0"/>
+              <a:t>Exemplo:</a:t>
+            </a:r>
+          </a:p>
+          <a:p>
+            <a:pPr marL="171450" indent="-171450" algn="just">
+              <a:buFontTx/>
+              <a:buChar char="-"/>
+            </a:pPr>
+            <a:r>
+              <a:rPr lang="pt-PT" sz="1200" dirty="0"/>
+              <a:t>Voto de pesar X</a:t>
+            </a:r>
+          </a:p>
+          <a:p>
+            <a:pPr marL="171450" indent="-171450" algn="just">
+              <a:buFontTx/>
+              <a:buChar char="-"/>
+            </a:pPr>
+            <a:r>
+              <a:rPr lang="pt-PT" sz="1200" dirty="0"/>
+              <a:t>Deputado Y</a:t>
+            </a:r>
+          </a:p>
+          <a:p>
+            <a:pPr marL="171450" indent="-171450" algn="just">
+              <a:buFontTx/>
+              <a:buChar char="-"/>
+            </a:pPr>
+            <a:r>
+              <a:rPr lang="pt-PT" sz="1200" dirty="0"/>
+              <a:t>Lei Z</a:t>
+            </a:r>
+          </a:p>
+          <a:p>
+            <a:pPr marL="171450" indent="-171450" algn="just">
+              <a:buFontTx/>
+              <a:buChar char="-"/>
+            </a:pPr>
+            <a:r>
+              <a:rPr lang="pt-PT" sz="1200" dirty="0"/>
+              <a:t>DD-MM-AAAA</a:t>
+            </a:r>
+          </a:p>
+          <a:p>
+            <a:pPr marL="171450" indent="-171450" algn="just">
+              <a:buFontTx/>
+              <a:buChar char="-"/>
+            </a:pPr>
+            <a:r>
+              <a:rPr lang="pt-PT" sz="1200" dirty="0"/>
+              <a:t>Inquérito W</a:t>
+            </a:r>
+          </a:p>
+        </p:txBody>
+      </p:sp>
+      <p:cxnSp>
+        <p:nvCxnSpPr>
+          <p:cNvPr id="22" name="Conexão Reta Unidirecional 21">
+            <a:extLst>
+              <a:ext uri="{FF2B5EF4-FFF2-40B4-BE49-F238E27FC236}">
+                <a16:creationId xmlns:a16="http://schemas.microsoft.com/office/drawing/2014/main" id="{A0B7DE3F-C71D-5542-8015-32DFFC8E5F91}"/>
+              </a:ext>
+            </a:extLst>
+          </p:cNvPr>
+          <p:cNvCxnSpPr>
+            <a:stCxn id="15" idx="3"/>
+            <a:endCxn id="18" idx="1"/>
+          </p:cNvCxnSpPr>
+          <p:nvPr/>
+        </p:nvCxnSpPr>
+        <p:spPr>
+          <a:xfrm flipV="1">
+            <a:off x="8241285" y="3891333"/>
+            <a:ext cx="1229551" cy="481227"/>
+          </a:xfrm>
+          <a:prstGeom prst="straightConnector1">
+            <a:avLst/>
+          </a:prstGeom>
+          <a:ln>
+            <a:tailEnd type="triangle"/>
+          </a:ln>
+        </p:spPr>
+        <p:style>
+          <a:lnRef idx="1">
+            <a:schemeClr val="dk1"/>
+          </a:lnRef>
+          <a:fillRef idx="0">
+            <a:schemeClr val="dk1"/>
+          </a:fillRef>
+          <a:effectRef idx="0">
+            <a:schemeClr val="dk1"/>
+          </a:effectRef>
+          <a:fontRef idx="minor">
+            <a:schemeClr val="tx1"/>
+          </a:fontRef>
+        </p:style>
+      </p:cxnSp>
+      <p:sp>
+        <p:nvSpPr>
+          <p:cNvPr id="25" name="Seta para Baixo 24">
+            <a:extLst>
+              <a:ext uri="{FF2B5EF4-FFF2-40B4-BE49-F238E27FC236}">
+                <a16:creationId xmlns:a16="http://schemas.microsoft.com/office/drawing/2014/main" id="{99484007-2BD2-C04D-A8C9-69B905316F39}"/>
+              </a:ext>
+            </a:extLst>
+          </p:cNvPr>
+          <p:cNvSpPr/>
+          <p:nvPr/>
+        </p:nvSpPr>
+        <p:spPr>
+          <a:xfrm>
+            <a:off x="1696839" y="4860829"/>
+            <a:ext cx="1021277" cy="981830"/>
+          </a:xfrm>
+          <a:prstGeom prst="downArrow">
+            <a:avLst/>
+          </a:prstGeom>
+          <a:solidFill>
+            <a:schemeClr val="tx1"/>
+          </a:solidFill>
+          <a:ln>
+            <a:solidFill>
+              <a:schemeClr val="tx1"/>
+            </a:solidFill>
+          </a:ln>
+        </p:spPr>
+        <p:style>
+          <a:lnRef idx="2">
+            <a:schemeClr val="accent1">
+              <a:shade val="50000"/>
+            </a:schemeClr>
+          </a:lnRef>
+          <a:fillRef idx="1">
+            <a:schemeClr val="accent1"/>
+          </a:fillRef>
+          <a:effectRef idx="0">
+            <a:schemeClr val="accent1"/>
+          </a:effectRef>
+          <a:fontRef idx="minor">
+            <a:schemeClr val="lt1"/>
+          </a:fontRef>
+        </p:style>
+        <p:txBody>
+          <a:bodyPr rtlCol="0" anchor="ctr"/>
+          <a:lstStyle/>
+          <a:p>
+            <a:pPr algn="ctr"/>
+            <a:endParaRPr lang="pt-PT"/>
+          </a:p>
+        </p:txBody>
+      </p:sp>
+      <p:sp>
+        <p:nvSpPr>
+          <p:cNvPr id="28" name="CaixaDeTexto 27">
+            <a:extLst>
+              <a:ext uri="{FF2B5EF4-FFF2-40B4-BE49-F238E27FC236}">
+                <a16:creationId xmlns:a16="http://schemas.microsoft.com/office/drawing/2014/main" id="{70A361EF-9195-644F-BFA4-A6A6EC22B39D}"/>
+              </a:ext>
+            </a:extLst>
+          </p:cNvPr>
+          <p:cNvSpPr txBox="1"/>
+          <p:nvPr/>
+        </p:nvSpPr>
+        <p:spPr>
+          <a:xfrm>
+            <a:off x="6091427" y="5099487"/>
+            <a:ext cx="2881980" cy="338554"/>
+          </a:xfrm>
+          <a:prstGeom prst="rect">
+            <a:avLst/>
+          </a:prstGeom>
+          <a:noFill/>
+          <a:ln>
+            <a:noFill/>
+          </a:ln>
+        </p:spPr>
+        <p:txBody>
+          <a:bodyPr wrap="square" rtlCol="0">
+            <a:spAutoFit/>
+          </a:bodyPr>
+          <a:lstStyle/>
+          <a:p>
+            <a:r>
+              <a:rPr lang="pt-PT" sz="1600" dirty="0"/>
+              <a:t>NO DIA DE HOJE:</a:t>
+            </a:r>
+          </a:p>
+        </p:txBody>
+      </p:sp>
+      <p:sp>
+        <p:nvSpPr>
+          <p:cNvPr id="29" name="CaixaDeTexto 28">
+            <a:extLst>
+              <a:ext uri="{FF2B5EF4-FFF2-40B4-BE49-F238E27FC236}">
+                <a16:creationId xmlns:a16="http://schemas.microsoft.com/office/drawing/2014/main" id="{AA600F41-1457-9D40-9C7F-6FE3243F7359}"/>
+              </a:ext>
+            </a:extLst>
+          </p:cNvPr>
+          <p:cNvSpPr txBox="1"/>
+          <p:nvPr/>
+        </p:nvSpPr>
+        <p:spPr>
+          <a:xfrm>
+            <a:off x="6091426" y="5509292"/>
+            <a:ext cx="2731939" cy="646331"/>
+          </a:xfrm>
+          <a:prstGeom prst="rect">
+            <a:avLst/>
+          </a:prstGeom>
+          <a:noFill/>
+          <a:ln>
+            <a:solidFill>
+              <a:schemeClr val="tx1"/>
+            </a:solidFill>
+          </a:ln>
+        </p:spPr>
+        <p:txBody>
+          <a:bodyPr wrap="square" rtlCol="0">
+            <a:spAutoFit/>
+          </a:bodyPr>
+          <a:lstStyle/>
+          <a:p>
+            <a:r>
+              <a:rPr lang="pt-PT" sz="1200" dirty="0"/>
+              <a:t>Em 1999 – Apresentada X</a:t>
+            </a:r>
+          </a:p>
+          <a:p>
+            <a:r>
+              <a:rPr lang="pt-PT" sz="1200" dirty="0"/>
+              <a:t>Em 2005 – Votada Y</a:t>
+            </a:r>
+          </a:p>
+          <a:p>
+            <a:r>
+              <a:rPr lang="pt-PT" sz="1200" dirty="0"/>
+              <a:t>Em 2010 – Discutida Z</a:t>
+            </a:r>
+          </a:p>
+        </p:txBody>
+      </p:sp>
+      <p:sp>
+        <p:nvSpPr>
+          <p:cNvPr id="30" name="CaixaDeTexto 29">
+            <a:extLst>
+              <a:ext uri="{FF2B5EF4-FFF2-40B4-BE49-F238E27FC236}">
+                <a16:creationId xmlns:a16="http://schemas.microsoft.com/office/drawing/2014/main" id="{1E32BD07-2773-D54E-93DE-E0C6AFD681E6}"/>
+              </a:ext>
+            </a:extLst>
+          </p:cNvPr>
+          <p:cNvSpPr txBox="1"/>
+          <p:nvPr/>
+        </p:nvSpPr>
+        <p:spPr>
+          <a:xfrm>
+            <a:off x="3367944" y="5099487"/>
+            <a:ext cx="2881980" cy="338554"/>
+          </a:xfrm>
+          <a:prstGeom prst="rect">
+            <a:avLst/>
+          </a:prstGeom>
+          <a:noFill/>
+          <a:ln>
+            <a:noFill/>
+          </a:ln>
+        </p:spPr>
+        <p:txBody>
+          <a:bodyPr wrap="square" rtlCol="0">
+            <a:spAutoFit/>
+          </a:bodyPr>
+          <a:lstStyle/>
+          <a:p>
+            <a:r>
+              <a:rPr lang="pt-PT" sz="1600" dirty="0"/>
+              <a:t>ESTA SEMANA:</a:t>
+            </a:r>
+          </a:p>
+        </p:txBody>
+      </p:sp>
+      <p:sp>
+        <p:nvSpPr>
+          <p:cNvPr id="31" name="CaixaDeTexto 30">
+            <a:extLst>
+              <a:ext uri="{FF2B5EF4-FFF2-40B4-BE49-F238E27FC236}">
+                <a16:creationId xmlns:a16="http://schemas.microsoft.com/office/drawing/2014/main" id="{50791E05-56D1-7149-982F-CFC636B6A664}"/>
+              </a:ext>
+            </a:extLst>
+          </p:cNvPr>
+          <p:cNvSpPr txBox="1"/>
+          <p:nvPr/>
+        </p:nvSpPr>
+        <p:spPr>
+          <a:xfrm>
+            <a:off x="3359487" y="5509292"/>
+            <a:ext cx="2581898" cy="646331"/>
+          </a:xfrm>
+          <a:prstGeom prst="rect">
+            <a:avLst/>
+          </a:prstGeom>
+          <a:noFill/>
+          <a:ln>
+            <a:solidFill>
+              <a:schemeClr val="tx1"/>
+            </a:solidFill>
+          </a:ln>
+        </p:spPr>
+        <p:txBody>
+          <a:bodyPr wrap="square" rtlCol="0">
+            <a:spAutoFit/>
+          </a:bodyPr>
+          <a:lstStyle/>
+          <a:p>
+            <a:r>
+              <a:rPr lang="pt-PT" sz="1200" dirty="0"/>
+              <a:t>18:</a:t>
+            </a:r>
+          </a:p>
+          <a:p>
+            <a:pPr marL="171450" indent="-171450">
+              <a:buFontTx/>
+              <a:buChar char="-"/>
+            </a:pPr>
+            <a:r>
+              <a:rPr lang="pt-PT" sz="1200" dirty="0"/>
+              <a:t>Apresentada X</a:t>
+            </a:r>
+          </a:p>
+          <a:p>
+            <a:pPr marL="171450" indent="-171450">
+              <a:buFontTx/>
+              <a:buChar char="-"/>
+            </a:pPr>
+            <a:r>
+              <a:rPr lang="pt-PT" sz="1200" dirty="0"/>
+              <a:t>Deputado Y substituído por Z</a:t>
+            </a:r>
+          </a:p>
+        </p:txBody>
+      </p:sp>
+    </p:spTree>
+    <p:extLst>
+      <p:ext uri="{BB962C8B-B14F-4D97-AF65-F5344CB8AC3E}">
+        <p14:creationId xmlns:p14="http://schemas.microsoft.com/office/powerpoint/2010/main" val="560364065"/>
+      </p:ext>
+    </p:extLst>
+  </p:cSld>
+  <p:clrMapOvr>
+    <a:masterClrMapping/>
+  </p:clrMapOvr>
+</p:sld>
+</file>
+
+<file path=ppt/slides/slide5.xml><?xml version="1.0" encoding="utf-8"?>
+<p:sld xmlns:a="http://schemas.openxmlformats.org/drawingml/2006/main" xmlns:r="http://schemas.openxmlformats.org/officeDocument/2006/relationships" xmlns:p="http://schemas.openxmlformats.org/presentationml/2006/main">
+  <p:cSld>
+    <p:bg>
+      <p:bgPr>
+        <a:solidFill>
+          <a:schemeClr val="bg1"/>
+        </a:solidFill>
+        <a:effectLst/>
+      </p:bgPr>
+    </p:bg>
+    <p:spTree>
+      <p:nvGrpSpPr>
+        <p:cNvPr id="1" name=""/>
+        <p:cNvGrpSpPr/>
+        <p:nvPr/>
+      </p:nvGrpSpPr>
+      <p:grpSpPr>
+        <a:xfrm>
+          <a:off x="0" y="0"/>
+          <a:ext cx="0" cy="0"/>
+          <a:chOff x="0" y="0"/>
+          <a:chExt cx="0" cy="0"/>
+        </a:xfrm>
+      </p:grpSpPr>
+      <p:sp>
+        <p:nvSpPr>
+          <p:cNvPr id="2" name="Título 1">
+            <a:extLst>
+              <a:ext uri="{FF2B5EF4-FFF2-40B4-BE49-F238E27FC236}">
+                <a16:creationId xmlns:a16="http://schemas.microsoft.com/office/drawing/2014/main" id="{3F8B59C9-2C43-E94B-A032-AEC26714766E}"/>
+              </a:ext>
+            </a:extLst>
+          </p:cNvPr>
+          <p:cNvSpPr>
+            <a:spLocks noGrp="1"/>
+          </p:cNvSpPr>
+          <p:nvPr>
+            <p:ph type="title"/>
+          </p:nvPr>
+        </p:nvSpPr>
+        <p:spPr>
+          <a:xfrm>
+            <a:off x="1198182" y="381000"/>
+            <a:ext cx="10003218" cy="1600124"/>
+          </a:xfrm>
+        </p:spPr>
+        <p:txBody>
+          <a:bodyPr>
+            <a:normAutofit/>
+          </a:bodyPr>
+          <a:lstStyle/>
+          <a:p>
+            <a:r>
+              <a:rPr lang="pt-PT" dirty="0"/>
+              <a:t>DESENHO</a:t>
+            </a:r>
+          </a:p>
+        </p:txBody>
+      </p:sp>
+      <p:sp>
+        <p:nvSpPr>
+          <p:cNvPr id="4" name="CaixaDeTexto 3">
+            <a:extLst>
+              <a:ext uri="{FF2B5EF4-FFF2-40B4-BE49-F238E27FC236}">
+                <a16:creationId xmlns:a16="http://schemas.microsoft.com/office/drawing/2014/main" id="{4ED75CBD-E052-1941-AA78-D8031480C64B}"/>
+              </a:ext>
+            </a:extLst>
+          </p:cNvPr>
+          <p:cNvSpPr txBox="1"/>
+          <p:nvPr/>
+        </p:nvSpPr>
+        <p:spPr>
+          <a:xfrm>
+            <a:off x="3215545" y="2921837"/>
+            <a:ext cx="5757862" cy="3240000"/>
+          </a:xfrm>
+          <a:prstGeom prst="rect">
+            <a:avLst/>
+          </a:prstGeom>
+          <a:noFill/>
+          <a:ln>
+            <a:solidFill>
+              <a:schemeClr val="tx1"/>
+            </a:solidFill>
+          </a:ln>
+        </p:spPr>
+        <p:txBody>
+          <a:bodyPr wrap="square" rtlCol="0">
+            <a:spAutoFit/>
+          </a:bodyPr>
+          <a:lstStyle/>
+          <a:p>
+            <a:endParaRPr lang="pt-PT" dirty="0"/>
+          </a:p>
+        </p:txBody>
+      </p:sp>
+      <p:sp>
+        <p:nvSpPr>
+          <p:cNvPr id="9" name="CaixaDeTexto 8">
+            <a:extLst>
+              <a:ext uri="{FF2B5EF4-FFF2-40B4-BE49-F238E27FC236}">
+                <a16:creationId xmlns:a16="http://schemas.microsoft.com/office/drawing/2014/main" id="{D4F4E78E-AED3-EF46-88B1-C8E8F7E5F161}"/>
+              </a:ext>
+            </a:extLst>
+          </p:cNvPr>
+          <p:cNvSpPr txBox="1"/>
+          <p:nvPr/>
+        </p:nvSpPr>
+        <p:spPr>
+          <a:xfrm>
+            <a:off x="3215546" y="2921837"/>
+            <a:ext cx="5757862" cy="640760"/>
+          </a:xfrm>
+          <a:prstGeom prst="rect">
+            <a:avLst/>
+          </a:prstGeom>
+          <a:noFill/>
+          <a:ln>
+            <a:solidFill>
+              <a:schemeClr val="tx1"/>
+            </a:solidFill>
+          </a:ln>
+        </p:spPr>
+        <p:txBody>
+          <a:bodyPr wrap="square" rtlCol="0">
+            <a:spAutoFit/>
+          </a:bodyPr>
+          <a:lstStyle/>
+          <a:p>
+            <a:endParaRPr lang="pt-PT" dirty="0"/>
+          </a:p>
+        </p:txBody>
+      </p:sp>
+      <p:sp>
+        <p:nvSpPr>
+          <p:cNvPr id="11" name="CaixaDeTexto 10">
+            <a:extLst>
+              <a:ext uri="{FF2B5EF4-FFF2-40B4-BE49-F238E27FC236}">
+                <a16:creationId xmlns:a16="http://schemas.microsoft.com/office/drawing/2014/main" id="{F3E664B0-BF11-3F46-A50F-16C91FA5708A}"/>
+              </a:ext>
+            </a:extLst>
+          </p:cNvPr>
+          <p:cNvSpPr txBox="1"/>
+          <p:nvPr/>
+        </p:nvSpPr>
+        <p:spPr>
+          <a:xfrm>
+            <a:off x="3367944" y="3074237"/>
+            <a:ext cx="2723483" cy="338554"/>
+          </a:xfrm>
+          <a:prstGeom prst="rect">
+            <a:avLst/>
+          </a:prstGeom>
+          <a:noFill/>
+          <a:ln>
+            <a:noFill/>
+          </a:ln>
+        </p:spPr>
+        <p:txBody>
+          <a:bodyPr wrap="square" rtlCol="0">
+            <a:spAutoFit/>
+          </a:bodyPr>
+          <a:lstStyle/>
+          <a:p>
+            <a:r>
+              <a:rPr lang="pt-PT" sz="1600" dirty="0"/>
+              <a:t>PARLARQUIVO (LOGO)</a:t>
+            </a:r>
+          </a:p>
+        </p:txBody>
+      </p:sp>
+      <p:sp>
+        <p:nvSpPr>
+          <p:cNvPr id="13" name="CaixaDeTexto 12">
+            <a:extLst>
+              <a:ext uri="{FF2B5EF4-FFF2-40B4-BE49-F238E27FC236}">
+                <a16:creationId xmlns:a16="http://schemas.microsoft.com/office/drawing/2014/main" id="{5033E058-BE04-7442-BFF6-90DFF0C3C897}"/>
+              </a:ext>
+            </a:extLst>
+          </p:cNvPr>
+          <p:cNvSpPr txBox="1"/>
+          <p:nvPr/>
+        </p:nvSpPr>
+        <p:spPr>
+          <a:xfrm>
+            <a:off x="6094476" y="3072940"/>
+            <a:ext cx="2728890" cy="338554"/>
+          </a:xfrm>
+          <a:prstGeom prst="rect">
+            <a:avLst/>
+          </a:prstGeom>
+          <a:noFill/>
+          <a:ln>
+            <a:noFill/>
+          </a:ln>
+        </p:spPr>
+        <p:txBody>
+          <a:bodyPr wrap="square" rtlCol="0">
+            <a:spAutoFit/>
+          </a:bodyPr>
+          <a:lstStyle/>
+          <a:p>
+            <a:pPr algn="r"/>
+            <a:r>
+              <a:rPr lang="pt-PT" sz="1600" dirty="0"/>
+              <a:t>SOBRE   CONTACTOS </a:t>
+            </a:r>
+          </a:p>
+        </p:txBody>
+      </p:sp>
+      <p:sp>
+        <p:nvSpPr>
+          <p:cNvPr id="16" name="CaixaDeTexto 15">
+            <a:extLst>
+              <a:ext uri="{FF2B5EF4-FFF2-40B4-BE49-F238E27FC236}">
+                <a16:creationId xmlns:a16="http://schemas.microsoft.com/office/drawing/2014/main" id="{B4C545C9-BAA8-844C-AE83-4D3D469C0493}"/>
+              </a:ext>
+            </a:extLst>
+          </p:cNvPr>
+          <p:cNvSpPr txBox="1"/>
+          <p:nvPr/>
+        </p:nvSpPr>
+        <p:spPr>
+          <a:xfrm>
+            <a:off x="6091427" y="3793478"/>
+            <a:ext cx="2881980" cy="338554"/>
+          </a:xfrm>
+          <a:prstGeom prst="rect">
+            <a:avLst/>
+          </a:prstGeom>
+          <a:noFill/>
+          <a:ln>
+            <a:noFill/>
+          </a:ln>
+        </p:spPr>
+        <p:txBody>
+          <a:bodyPr wrap="square" rtlCol="0">
+            <a:spAutoFit/>
+          </a:bodyPr>
+          <a:lstStyle/>
+          <a:p>
+            <a:r>
+              <a:rPr lang="pt-PT" sz="1600" dirty="0"/>
+              <a:t>NO DIA DE HOJE:</a:t>
+            </a:r>
+          </a:p>
+        </p:txBody>
+      </p:sp>
+      <p:sp>
+        <p:nvSpPr>
+          <p:cNvPr id="25" name="Seta para Baixo 24">
+            <a:extLst>
+              <a:ext uri="{FF2B5EF4-FFF2-40B4-BE49-F238E27FC236}">
+                <a16:creationId xmlns:a16="http://schemas.microsoft.com/office/drawing/2014/main" id="{99484007-2BD2-C04D-A8C9-69B905316F39}"/>
+              </a:ext>
+            </a:extLst>
+          </p:cNvPr>
+          <p:cNvSpPr/>
+          <p:nvPr/>
+        </p:nvSpPr>
+        <p:spPr>
+          <a:xfrm>
+            <a:off x="1696839" y="4860829"/>
+            <a:ext cx="1021277" cy="981830"/>
+          </a:xfrm>
+          <a:prstGeom prst="downArrow">
+            <a:avLst/>
+          </a:prstGeom>
+          <a:solidFill>
+            <a:schemeClr val="tx1"/>
+          </a:solidFill>
+          <a:ln>
+            <a:solidFill>
+              <a:schemeClr val="tx1"/>
+            </a:solidFill>
+          </a:ln>
+        </p:spPr>
+        <p:style>
+          <a:lnRef idx="2">
+            <a:schemeClr val="accent1">
+              <a:shade val="50000"/>
+            </a:schemeClr>
+          </a:lnRef>
+          <a:fillRef idx="1">
+            <a:schemeClr val="accent1"/>
+          </a:fillRef>
+          <a:effectRef idx="0">
+            <a:schemeClr val="accent1"/>
+          </a:effectRef>
+          <a:fontRef idx="minor">
+            <a:schemeClr val="lt1"/>
+          </a:fontRef>
+        </p:style>
+        <p:txBody>
+          <a:bodyPr rtlCol="0" anchor="ctr"/>
+          <a:lstStyle/>
+          <a:p>
+            <a:pPr algn="ctr"/>
+            <a:endParaRPr lang="pt-PT"/>
+          </a:p>
+        </p:txBody>
+      </p:sp>
+      <p:sp>
+        <p:nvSpPr>
+          <p:cNvPr id="19" name="CaixaDeTexto 18">
+            <a:extLst>
+              <a:ext uri="{FF2B5EF4-FFF2-40B4-BE49-F238E27FC236}">
+                <a16:creationId xmlns:a16="http://schemas.microsoft.com/office/drawing/2014/main" id="{4E73C74B-22E6-6842-9F72-ABAEB7A037C7}"/>
+              </a:ext>
+            </a:extLst>
+          </p:cNvPr>
+          <p:cNvSpPr txBox="1"/>
+          <p:nvPr/>
+        </p:nvSpPr>
+        <p:spPr>
+          <a:xfrm>
+            <a:off x="6091426" y="4203283"/>
+            <a:ext cx="2731939" cy="1754326"/>
+          </a:xfrm>
+          <a:prstGeom prst="rect">
+            <a:avLst/>
+          </a:prstGeom>
+          <a:noFill/>
+          <a:ln>
+            <a:solidFill>
+              <a:schemeClr val="tx1"/>
+            </a:solidFill>
+          </a:ln>
+        </p:spPr>
+        <p:txBody>
+          <a:bodyPr wrap="square" rtlCol="0">
+            <a:spAutoFit/>
+          </a:bodyPr>
+          <a:lstStyle/>
+          <a:p>
+            <a:r>
+              <a:rPr lang="pt-PT" sz="1200" dirty="0"/>
+              <a:t>Em 1999 – Apresentada X</a:t>
+            </a:r>
+          </a:p>
+          <a:p>
+            <a:r>
+              <a:rPr lang="pt-PT" sz="1200" dirty="0"/>
+              <a:t>Em 2005 – Votada Y</a:t>
+            </a:r>
+          </a:p>
+          <a:p>
+            <a:r>
+              <a:rPr lang="pt-PT" sz="1200" dirty="0"/>
+              <a:t>Em 2010 – Discutida Z</a:t>
+            </a:r>
+          </a:p>
+          <a:p>
+            <a:r>
+              <a:rPr lang="pt-PT" sz="1200" dirty="0"/>
+              <a:t>Em 2011 – Apresentada X</a:t>
+            </a:r>
+          </a:p>
+          <a:p>
+            <a:r>
+              <a:rPr lang="pt-PT" sz="1200" dirty="0"/>
+              <a:t>Em 2012 – Votada Y</a:t>
+            </a:r>
+          </a:p>
+          <a:p>
+            <a:r>
+              <a:rPr lang="pt-PT" sz="1200" dirty="0"/>
+              <a:t>Em 2013 – Discutida Z</a:t>
+            </a:r>
+          </a:p>
+          <a:p>
+            <a:r>
+              <a:rPr lang="pt-PT" sz="1200" dirty="0"/>
+              <a:t>Em 2014 – Apresentada X</a:t>
+            </a:r>
+          </a:p>
+          <a:p>
+            <a:r>
+              <a:rPr lang="pt-PT" sz="1200" dirty="0"/>
+              <a:t>Em 2015 – Votada Y</a:t>
+            </a:r>
+          </a:p>
+          <a:p>
+            <a:r>
+              <a:rPr lang="pt-PT" sz="1200" dirty="0"/>
+              <a:t>Em 2016 – Discutida Z</a:t>
+            </a:r>
+          </a:p>
+        </p:txBody>
+      </p:sp>
+      <p:sp>
+        <p:nvSpPr>
+          <p:cNvPr id="20" name="CaixaDeTexto 19">
+            <a:extLst>
+              <a:ext uri="{FF2B5EF4-FFF2-40B4-BE49-F238E27FC236}">
+                <a16:creationId xmlns:a16="http://schemas.microsoft.com/office/drawing/2014/main" id="{A82D0C7E-1958-AA40-8B4B-B5D29687BB36}"/>
+              </a:ext>
+            </a:extLst>
+          </p:cNvPr>
+          <p:cNvSpPr txBox="1"/>
+          <p:nvPr/>
+        </p:nvSpPr>
+        <p:spPr>
+          <a:xfrm>
+            <a:off x="3367944" y="3793478"/>
+            <a:ext cx="2881980" cy="338554"/>
+          </a:xfrm>
+          <a:prstGeom prst="rect">
+            <a:avLst/>
+          </a:prstGeom>
+          <a:noFill/>
+          <a:ln>
+            <a:noFill/>
+          </a:ln>
+        </p:spPr>
+        <p:txBody>
+          <a:bodyPr wrap="square" rtlCol="0">
+            <a:spAutoFit/>
+          </a:bodyPr>
+          <a:lstStyle/>
+          <a:p>
+            <a:r>
+              <a:rPr lang="pt-PT" sz="1600" dirty="0"/>
+              <a:t>ESTA SEMANA:</a:t>
+            </a:r>
+          </a:p>
+        </p:txBody>
+      </p:sp>
+      <p:sp>
+        <p:nvSpPr>
+          <p:cNvPr id="21" name="CaixaDeTexto 20">
+            <a:extLst>
+              <a:ext uri="{FF2B5EF4-FFF2-40B4-BE49-F238E27FC236}">
+                <a16:creationId xmlns:a16="http://schemas.microsoft.com/office/drawing/2014/main" id="{FE67EEB8-EF34-FD47-A322-B171F2A5BE0A}"/>
+              </a:ext>
+            </a:extLst>
+          </p:cNvPr>
+          <p:cNvSpPr txBox="1"/>
+          <p:nvPr/>
+        </p:nvSpPr>
+        <p:spPr>
+          <a:xfrm>
+            <a:off x="3359487" y="4203283"/>
+            <a:ext cx="2581898" cy="1754326"/>
+          </a:xfrm>
+          <a:prstGeom prst="rect">
+            <a:avLst/>
+          </a:prstGeom>
+          <a:noFill/>
+          <a:ln>
+            <a:solidFill>
+              <a:schemeClr val="tx1"/>
+            </a:solidFill>
+          </a:ln>
+        </p:spPr>
+        <p:txBody>
+          <a:bodyPr wrap="square" rtlCol="0">
+            <a:spAutoFit/>
+          </a:bodyPr>
+          <a:lstStyle/>
+          <a:p>
+            <a:r>
+              <a:rPr lang="pt-PT" sz="1200" dirty="0"/>
+              <a:t>18:</a:t>
+            </a:r>
+          </a:p>
+          <a:p>
+            <a:pPr marL="171450" indent="-171450">
+              <a:buFontTx/>
+              <a:buChar char="-"/>
+            </a:pPr>
+            <a:r>
+              <a:rPr lang="pt-PT" sz="1200" dirty="0"/>
+              <a:t>Apresentada X</a:t>
+            </a:r>
+          </a:p>
+          <a:p>
+            <a:pPr marL="171450" indent="-171450">
+              <a:buFontTx/>
+              <a:buChar char="-"/>
+            </a:pPr>
+            <a:r>
+              <a:rPr lang="pt-PT" sz="1200" dirty="0"/>
+              <a:t>Deputado Y substituído por Z</a:t>
+            </a:r>
+          </a:p>
+          <a:p>
+            <a:pPr marL="171450" indent="-171450">
+              <a:buFontTx/>
+              <a:buChar char="-"/>
+            </a:pPr>
+            <a:endParaRPr lang="pt-PT" sz="1200" dirty="0"/>
+          </a:p>
+          <a:p>
+            <a:r>
+              <a:rPr lang="pt-PT" sz="1200" dirty="0"/>
+              <a:t>19</a:t>
+            </a:r>
+          </a:p>
+          <a:p>
+            <a:pPr marL="171450" indent="-171450">
+              <a:buFontTx/>
+              <a:buChar char="-"/>
+            </a:pPr>
+            <a:r>
+              <a:rPr lang="pt-PT" sz="1200" dirty="0"/>
+              <a:t>Início Comissão Inquérito W</a:t>
+            </a:r>
+          </a:p>
+          <a:p>
+            <a:pPr marL="171450" indent="-171450">
+              <a:buFontTx/>
+              <a:buChar char="-"/>
+            </a:pPr>
+            <a:endParaRPr lang="pt-PT" sz="1200" dirty="0"/>
+          </a:p>
+          <a:p>
+            <a:r>
+              <a:rPr lang="pt-PT" sz="1200" dirty="0"/>
+              <a:t>20</a:t>
+            </a:r>
+          </a:p>
+          <a:p>
+            <a:r>
+              <a:rPr lang="pt-PT" sz="1200" dirty="0"/>
+              <a:t>- Votadas P</a:t>
+            </a:r>
+          </a:p>
+        </p:txBody>
+      </p:sp>
+    </p:spTree>
+    <p:extLst>
+      <p:ext uri="{BB962C8B-B14F-4D97-AF65-F5344CB8AC3E}">
+        <p14:creationId xmlns:p14="http://schemas.microsoft.com/office/powerpoint/2010/main" val="2872390960"/>
+      </p:ext>
+    </p:extLst>
+  </p:cSld>
+  <p:clrMapOvr>
+    <a:masterClrMapping/>
+  </p:clrMapOvr>
+</p:sld>
+</file>
+
 <file path=ppt/theme/theme1.xml><?xml version="1.0" encoding="utf-8"?>
-<a:theme xmlns:a="http://schemas.openxmlformats.org/drawingml/2006/main" name="BlockprintVTI">
+<a:theme xmlns:a="http://schemas.openxmlformats.org/drawingml/2006/main" name="Tema do Office">
   <a:themeElements>
-    <a:clrScheme name="AnalogousFromRegularSeedLeftStep">
+    <a:clrScheme name="Office">
       <a:dk1>
-        <a:srgbClr val="000000"/>
+        <a:sysClr val="windowText" lastClr="000000"/>
       </a:dk1>
       <a:lt1>
-        <a:srgbClr val="FFFFFF"/>
+        <a:sysClr val="window" lastClr="FFFFFF"/>
       </a:lt1>
       <a:dk2>
-        <a:srgbClr val="171735"/>
+        <a:srgbClr val="44546A"/>
       </a:dk2>
       <a:lt2>
-        <a:srgbClr val="F0F3F1"/>
+        <a:srgbClr val="E7E6E6"/>
       </a:lt2>
       <a:accent1>
-        <a:srgbClr val="CF40A8"/>
+        <a:srgbClr val="4472C4"/>
       </a:accent1>
       <a:accent2>
-        <a:srgbClr val="A92FBE"/>
+        <a:srgbClr val="ED7D31"/>
       </a:accent2>
       <a:accent3>
-        <a:srgbClr val="7F40CF"/>
+        <a:srgbClr val="A5A5A5"/>
       </a:accent3>
       <a:accent4>
-        <a:srgbClr val="3835C0"/>
+        <a:srgbClr val="FFC000"/>
       </a:accent4>
       <a:accent5>
-        <a:srgbClr val="4079CF"/>
+        <a:srgbClr val="5B9BD5"/>
       </a:accent5>
       <a:accent6>
-        <a:srgbClr val="2FA2BE"/>
+        <a:srgbClr val="70AD47"/>
       </a:accent6>
       <a:hlink>
-        <a:srgbClr val="349D51"/>
+        <a:srgbClr val="0563C1"/>
       </a:hlink>
       <a:folHlink>
-        <a:srgbClr val="7F7F7F"/>
+        <a:srgbClr val="954F72"/>
       </a:folHlink>
     </a:clrScheme>
-    <a:fontScheme name="Custom 56">
+    <a:fontScheme name="Office">
       <a:majorFont>
-        <a:latin typeface="Avenir Next LT Pro"/>
+        <a:latin typeface="Calibri Light" panose="020F0302020204030204"/>
         <a:ea typeface=""/>
         <a:cs typeface=""/>
+        <a:font script="Jpan" typeface="游ゴシック Light"/>
+        <a:font script="Hang" typeface="맑은 고딕"/>
+        <a:font script="Hans" typeface="等线 Light"/>
+        <a:font script="Hant" typeface="新細明體"/>
+        <a:font script="Arab" typeface="Times New Roman"/>
+        <a:font script="Hebr" typeface="Times New Roman"/>
+        <a:font script="Thai" typeface="Angsana New"/>
+        <a:font script="Ethi" typeface="Nyala"/>
+        <a:font script="Beng" typeface="Vrinda"/>
+        <a:font script="Gujr" typeface="Shruti"/>
+        <a:font script="Khmr" typeface="MoolBoran"/>
+        <a:font script="Knda" typeface="Tunga"/>
+        <a:font script="Guru" typeface="Raavi"/>
+        <a:font script="Cans" typeface="Euphemia"/>
+        <a:font script="Cher" typeface="Plantagenet Cherokee"/>
+        <a:font script="Yiii" typeface="Microsoft Yi Baiti"/>
+        <a:font script="Tibt" typeface="Microsoft Himalaya"/>
+        <a:font script="Thaa" typeface="MV Boli"/>
+        <a:font script="Deva" typeface="Mangal"/>
+        <a:font script="Telu" typeface="Gautami"/>
+        <a:font script="Taml" typeface="Latha"/>
+        <a:font script="Syrc" typeface="Estrangelo Edessa"/>
+        <a:font script="Orya" typeface="Kalinga"/>
+        <a:font script="Mlym" typeface="Kartika"/>
+        <a:font script="Laoo" typeface="DokChampa"/>
+        <a:font script="Sinh" typeface="Iskoola Pota"/>
+        <a:font script="Mong" typeface="Mongolian Baiti"/>
+        <a:font script="Viet" typeface="Times New Roman"/>
+        <a:font script="Uigh" typeface="Microsoft Uighur"/>
+        <a:font script="Geor" typeface="Sylfaen"/>
+        <a:font script="Armn" typeface="Arial"/>
+        <a:font script="Bugi" typeface="Leelawadee UI"/>
+        <a:font script="Bopo" typeface="Microsoft JhengHei"/>
+        <a:font script="Java" typeface="Javanese Text"/>
+        <a:font script="Lisu" typeface="Segoe UI"/>
+        <a:font script="Mymr" typeface="Myanmar Text"/>
+        <a:font script="Nkoo" typeface="Ebrima"/>
+        <a:font script="Olck" typeface="Nirmala UI"/>
+        <a:font script="Osma" typeface="Ebrima"/>
+        <a:font script="Phag" typeface="Phagspa"/>
+        <a:font script="Syrn" typeface="Estrangelo Edessa"/>
+        <a:font script="Syrj" typeface="Estrangelo Edessa"/>
+        <a:font script="Syre" typeface="Estrangelo Edessa"/>
+        <a:font script="Sora" typeface="Nirmala UI"/>
+        <a:font script="Tale" typeface="Microsoft Tai Le"/>
+        <a:font script="Talu" typeface="Microsoft New Tai Lue"/>
+        <a:font script="Tfng" typeface="Ebrima"/>
       </a:majorFont>
       <a:minorFont>
-        <a:latin typeface="Avenir Next LT Pro"/>
+        <a:latin typeface="Calibri" panose="020F0502020204030204"/>
         <a:ea typeface=""/>
         <a:cs typeface=""/>
+        <a:font script="Jpan" typeface="游ゴシック"/>
+        <a:font script="Hang" typeface="맑은 고딕"/>
+        <a:font script="Hans" typeface="等线"/>
+        <a:font script="Hant" typeface="新細明體"/>
+        <a:font script="Arab" typeface="Arial"/>
+        <a:font script="Hebr" typeface="Arial"/>
+        <a:font script="Thai" typeface="Cordia New"/>
+        <a:font script="Ethi" typeface="Nyala"/>
+        <a:font script="Beng" typeface="Vrinda"/>
+        <a:font script="Gujr" typeface="Shruti"/>
+        <a:font script="Khmr" typeface="DaunPenh"/>
+        <a:font script="Knda" typeface="Tunga"/>
+        <a:font script="Guru" typeface="Raavi"/>
+        <a:font script="Cans" typeface="Euphemia"/>
+        <a:font script="Cher" typeface="Plantagenet Cherokee"/>
+        <a:font script="Yiii" typeface="Microsoft Yi Baiti"/>
+        <a:font script="Tibt" typeface="Microsoft Himalaya"/>
+        <a:font script="Thaa" typeface="MV Boli"/>
+        <a:font script="Deva" typeface="Mangal"/>
+        <a:font script="Telu" typeface="Gautami"/>
+        <a:font script="Taml" typeface="Latha"/>
+        <a:font script="Syrc" typeface="Estrangelo Edessa"/>
+        <a:font script="Orya" typeface="Kalinga"/>
+        <a:font script="Mlym" typeface="Kartika"/>
+        <a:font script="Laoo" typeface="DokChampa"/>
+        <a:font script="Sinh" typeface="Iskoola Pota"/>
+        <a:font script="Mong" typeface="Mongolian Baiti"/>
+        <a:font script="Viet" typeface="Arial"/>
+        <a:font script="Uigh" typeface="Microsoft Uighur"/>
+        <a:font script="Geor" typeface="Sylfaen"/>
+        <a:font script="Armn" typeface="Arial"/>
+        <a:font script="Bugi" typeface="Leelawadee UI"/>
+        <a:font script="Bopo" typeface="Microsoft JhengHei"/>
+        <a:font script="Java" typeface="Javanese Text"/>
+        <a:font script="Lisu" typeface="Segoe UI"/>
+        <a:font script="Mymr" typeface="Myanmar Text"/>
+        <a:font script="Nkoo" typeface="Ebrima"/>
+        <a:font script="Olck" typeface="Nirmala UI"/>
+        <a:font script="Osma" typeface="Ebrima"/>
+        <a:font script="Phag" typeface="Phagspa"/>
+        <a:font script="Syrn" typeface="Estrangelo Edessa"/>
+        <a:font script="Syrj" typeface="Estrangelo Edessa"/>
+        <a:font script="Syre" typeface="Estrangelo Edessa"/>
+        <a:font script="Sora" typeface="Nirmala UI"/>
+        <a:font script="Tale" typeface="Microsoft Tai Le"/>
+        <a:font script="Talu" typeface="Microsoft New Tai Lue"/>
+        <a:font script="Tfng" typeface="Ebrima"/>
       </a:minorFont>
     </a:fontScheme>
     <a:fmtScheme name="Office">
@@ -4266,7 +5276,7 @@
   <a:extraClrSchemeLst/>
   <a:extLst>
     <a:ext uri="{05A4C25C-085E-4340-85A3-A5531E510DB2}">
-      <thm15:themeFamily xmlns:thm15="http://schemas.microsoft.com/office/thememl/2012/main" name="BlockprintVTI" id="{AA8C8908-6BA4-477C-AEA4-CB6C32A1FE3B}" vid="{36392749-7C1D-4938-93BB-440CD2A1B0AB}"/>
+      <thm15:themeFamily xmlns:thm15="http://schemas.microsoft.com/office/thememl/2012/main" name="Office Theme" id="{62F939B6-93AF-4DB8-9C6B-D6C7DFDC589F}" vid="{4A3C46E8-61CC-4603-A589-7422A47A8E4A}"/>
     </a:ext>
   </a:extLst>
 </a:theme>

</xml_diff>